<commit_message>
Adicionei o desenho da arquitetura
</commit_message>
<xml_diff>
--- a/apresentacao.pptx
+++ b/apresentacao.pptx
@@ -253,7 +253,7 @@
           <a:p>
             <a:fld id="{DFB47B2A-792C-4857-B3CB-F38595D2BBF3}" type="datetimeFigureOut">
               <a:rPr lang="pt-BR" smtClean="0"/>
-              <a:t>05/07/2018</a:t>
+              <a:t>06/07/2018</a:t>
             </a:fld>
             <a:endParaRPr lang="pt-BR"/>
           </a:p>
@@ -423,7 +423,7 @@
           <a:p>
             <a:fld id="{DFB47B2A-792C-4857-B3CB-F38595D2BBF3}" type="datetimeFigureOut">
               <a:rPr lang="pt-BR" smtClean="0"/>
-              <a:t>05/07/2018</a:t>
+              <a:t>06/07/2018</a:t>
             </a:fld>
             <a:endParaRPr lang="pt-BR"/>
           </a:p>
@@ -603,7 +603,7 @@
           <a:p>
             <a:fld id="{DFB47B2A-792C-4857-B3CB-F38595D2BBF3}" type="datetimeFigureOut">
               <a:rPr lang="pt-BR" smtClean="0"/>
-              <a:t>05/07/2018</a:t>
+              <a:t>06/07/2018</a:t>
             </a:fld>
             <a:endParaRPr lang="pt-BR"/>
           </a:p>
@@ -773,7 +773,7 @@
           <a:p>
             <a:fld id="{DFB47B2A-792C-4857-B3CB-F38595D2BBF3}" type="datetimeFigureOut">
               <a:rPr lang="pt-BR" smtClean="0"/>
-              <a:t>05/07/2018</a:t>
+              <a:t>06/07/2018</a:t>
             </a:fld>
             <a:endParaRPr lang="pt-BR"/>
           </a:p>
@@ -1019,7 +1019,7 @@
           <a:p>
             <a:fld id="{DFB47B2A-792C-4857-B3CB-F38595D2BBF3}" type="datetimeFigureOut">
               <a:rPr lang="pt-BR" smtClean="0"/>
-              <a:t>05/07/2018</a:t>
+              <a:t>06/07/2018</a:t>
             </a:fld>
             <a:endParaRPr lang="pt-BR"/>
           </a:p>
@@ -1251,7 +1251,7 @@
           <a:p>
             <a:fld id="{DFB47B2A-792C-4857-B3CB-F38595D2BBF3}" type="datetimeFigureOut">
               <a:rPr lang="pt-BR" smtClean="0"/>
-              <a:t>05/07/2018</a:t>
+              <a:t>06/07/2018</a:t>
             </a:fld>
             <a:endParaRPr lang="pt-BR"/>
           </a:p>
@@ -1618,7 +1618,7 @@
           <a:p>
             <a:fld id="{DFB47B2A-792C-4857-B3CB-F38595D2BBF3}" type="datetimeFigureOut">
               <a:rPr lang="pt-BR" smtClean="0"/>
-              <a:t>05/07/2018</a:t>
+              <a:t>06/07/2018</a:t>
             </a:fld>
             <a:endParaRPr lang="pt-BR"/>
           </a:p>
@@ -1736,7 +1736,7 @@
           <a:p>
             <a:fld id="{DFB47B2A-792C-4857-B3CB-F38595D2BBF3}" type="datetimeFigureOut">
               <a:rPr lang="pt-BR" smtClean="0"/>
-              <a:t>05/07/2018</a:t>
+              <a:t>06/07/2018</a:t>
             </a:fld>
             <a:endParaRPr lang="pt-BR"/>
           </a:p>
@@ -1831,7 +1831,7 @@
           <a:p>
             <a:fld id="{DFB47B2A-792C-4857-B3CB-F38595D2BBF3}" type="datetimeFigureOut">
               <a:rPr lang="pt-BR" smtClean="0"/>
-              <a:t>05/07/2018</a:t>
+              <a:t>06/07/2018</a:t>
             </a:fld>
             <a:endParaRPr lang="pt-BR"/>
           </a:p>
@@ -2108,7 +2108,7 @@
           <a:p>
             <a:fld id="{DFB47B2A-792C-4857-B3CB-F38595D2BBF3}" type="datetimeFigureOut">
               <a:rPr lang="pt-BR" smtClean="0"/>
-              <a:t>05/07/2018</a:t>
+              <a:t>06/07/2018</a:t>
             </a:fld>
             <a:endParaRPr lang="pt-BR"/>
           </a:p>
@@ -2361,7 +2361,7 @@
           <a:p>
             <a:fld id="{DFB47B2A-792C-4857-B3CB-F38595D2BBF3}" type="datetimeFigureOut">
               <a:rPr lang="pt-BR" smtClean="0"/>
-              <a:t>05/07/2018</a:t>
+              <a:t>06/07/2018</a:t>
             </a:fld>
             <a:endParaRPr lang="pt-BR"/>
           </a:p>
@@ -2574,7 +2574,7 @@
           <a:p>
             <a:fld id="{DFB47B2A-792C-4857-B3CB-F38595D2BBF3}" type="datetimeFigureOut">
               <a:rPr lang="pt-BR" smtClean="0"/>
-              <a:t>05/07/2018</a:t>
+              <a:t>06/07/2018</a:t>
             </a:fld>
             <a:endParaRPr lang="pt-BR"/>
           </a:p>
@@ -3023,8 +3023,8 @@
           <a:p>
             <a:pPr algn="r"/>
             <a:r>
-              <a:rPr lang="pt-BR" smtClean="0"/>
-              <a:t>Júlio </a:t>
+              <a:rPr lang="pt-BR" dirty="0" smtClean="0"/>
+              <a:t>Julio </a:t>
             </a:r>
             <a:r>
               <a:rPr lang="pt-BR" dirty="0" smtClean="0"/>
@@ -3396,25 +3396,514 @@
           </a:p>
         </p:txBody>
       </p:sp>
-      <p:sp>
-        <p:nvSpPr>
-          <p:cNvPr id="3" name="Espaço Reservado para Conteúdo 2"/>
-          <p:cNvSpPr>
-            <a:spLocks noGrp="1"/>
-          </p:cNvSpPr>
-          <p:nvPr>
-            <p:ph idx="1"/>
-          </p:nvPr>
-        </p:nvSpPr>
-        <p:spPr/>
-        <p:txBody>
-          <a:bodyPr/>
-          <a:lstStyle/>
-          <a:p>
-            <a:endParaRPr lang="pt-BR" dirty="0"/>
-          </a:p>
-        </p:txBody>
-      </p:sp>
+      <p:pic>
+        <p:nvPicPr>
+          <p:cNvPr id="1026" name="Picture 2" descr="Resultado de imagem para hadoop icon"/>
+          <p:cNvPicPr>
+            <a:picLocks noChangeAspect="1" noChangeArrowheads="1"/>
+          </p:cNvPicPr>
+          <p:nvPr/>
+        </p:nvPicPr>
+        <p:blipFill>
+          <a:blip r:embed="rId2" cstate="print">
+            <a:extLst>
+              <a:ext uri="{28A0092B-C50C-407E-A947-70E740481C1C}">
+                <a14:useLocalDpi xmlns:a14="http://schemas.microsoft.com/office/drawing/2010/main" val="0"/>
+              </a:ext>
+            </a:extLst>
+          </a:blip>
+          <a:srcRect/>
+          <a:stretch>
+            <a:fillRect/>
+          </a:stretch>
+        </p:blipFill>
+        <p:spPr bwMode="auto">
+          <a:xfrm>
+            <a:off x="838200" y="4960072"/>
+            <a:ext cx="1375056" cy="1320054"/>
+          </a:xfrm>
+          <a:prstGeom prst="rect">
+            <a:avLst/>
+          </a:prstGeom>
+          <a:noFill/>
+          <a:extLst>
+            <a:ext uri="{909E8E84-426E-40DD-AFC4-6F175D3DCCD1}">
+              <a14:hiddenFill xmlns:a14="http://schemas.microsoft.com/office/drawing/2010/main">
+                <a:solidFill>
+                  <a:srgbClr val="FFFFFF"/>
+                </a:solidFill>
+              </a14:hiddenFill>
+            </a:ext>
+          </a:extLst>
+        </p:spPr>
+      </p:pic>
+      <p:pic>
+        <p:nvPicPr>
+          <p:cNvPr id="1028" name="Picture 4" descr="Imagem relacionada"/>
+          <p:cNvPicPr>
+            <a:picLocks noChangeAspect="1" noChangeArrowheads="1"/>
+          </p:cNvPicPr>
+          <p:nvPr/>
+        </p:nvPicPr>
+        <p:blipFill>
+          <a:blip r:embed="rId3">
+            <a:extLst>
+              <a:ext uri="{28A0092B-C50C-407E-A947-70E740481C1C}">
+                <a14:useLocalDpi xmlns:a14="http://schemas.microsoft.com/office/drawing/2010/main" val="0"/>
+              </a:ext>
+            </a:extLst>
+          </a:blip>
+          <a:srcRect/>
+          <a:stretch>
+            <a:fillRect/>
+          </a:stretch>
+        </p:blipFill>
+        <p:spPr bwMode="auto">
+          <a:xfrm>
+            <a:off x="2160468" y="4691413"/>
+            <a:ext cx="1882545" cy="1698882"/>
+          </a:xfrm>
+          <a:prstGeom prst="rect">
+            <a:avLst/>
+          </a:prstGeom>
+          <a:noFill/>
+          <a:extLst>
+            <a:ext uri="{909E8E84-426E-40DD-AFC4-6F175D3DCCD1}">
+              <a14:hiddenFill xmlns:a14="http://schemas.microsoft.com/office/drawing/2010/main">
+                <a:solidFill>
+                  <a:srgbClr val="FFFFFF"/>
+                </a:solidFill>
+              </a14:hiddenFill>
+            </a:ext>
+          </a:extLst>
+        </p:spPr>
+      </p:pic>
+      <p:pic>
+        <p:nvPicPr>
+          <p:cNvPr id="1030" name="Picture 6" descr="Resultado de imagem para gcloud icon"/>
+          <p:cNvPicPr>
+            <a:picLocks noChangeAspect="1" noChangeArrowheads="1"/>
+          </p:cNvPicPr>
+          <p:nvPr/>
+        </p:nvPicPr>
+        <p:blipFill>
+          <a:blip r:embed="rId4">
+            <a:extLst>
+              <a:ext uri="{28A0092B-C50C-407E-A947-70E740481C1C}">
+                <a14:useLocalDpi xmlns:a14="http://schemas.microsoft.com/office/drawing/2010/main" val="0"/>
+              </a:ext>
+            </a:extLst>
+          </a:blip>
+          <a:srcRect/>
+          <a:stretch>
+            <a:fillRect/>
+          </a:stretch>
+        </p:blipFill>
+        <p:spPr bwMode="auto">
+          <a:xfrm>
+            <a:off x="1755147" y="1771757"/>
+            <a:ext cx="891370" cy="891370"/>
+          </a:xfrm>
+          <a:prstGeom prst="rect">
+            <a:avLst/>
+          </a:prstGeom>
+          <a:noFill/>
+          <a:extLst>
+            <a:ext uri="{909E8E84-426E-40DD-AFC4-6F175D3DCCD1}">
+              <a14:hiddenFill xmlns:a14="http://schemas.microsoft.com/office/drawing/2010/main">
+                <a:solidFill>
+                  <a:srgbClr val="FFFFFF"/>
+                </a:solidFill>
+              </a14:hiddenFill>
+            </a:ext>
+          </a:extLst>
+        </p:spPr>
+      </p:pic>
+      <p:pic>
+        <p:nvPicPr>
+          <p:cNvPr id="1034" name="Picture 10" descr="network, Servers, Multimedia, Database, files, Hosting, storage, technology, Server, networking Icon"/>
+          <p:cNvPicPr>
+            <a:picLocks noChangeAspect="1" noChangeArrowheads="1"/>
+          </p:cNvPicPr>
+          <p:nvPr/>
+        </p:nvPicPr>
+        <p:blipFill>
+          <a:blip r:embed="rId5" cstate="print">
+            <a:extLst>
+              <a:ext uri="{28A0092B-C50C-407E-A947-70E740481C1C}">
+                <a14:useLocalDpi xmlns:a14="http://schemas.microsoft.com/office/drawing/2010/main" val="0"/>
+              </a:ext>
+            </a:extLst>
+          </a:blip>
+          <a:srcRect/>
+          <a:stretch>
+            <a:fillRect/>
+          </a:stretch>
+        </p:blipFill>
+        <p:spPr bwMode="auto">
+          <a:xfrm>
+            <a:off x="1090862" y="2663127"/>
+            <a:ext cx="2219941" cy="2219941"/>
+          </a:xfrm>
+          <a:prstGeom prst="rect">
+            <a:avLst/>
+          </a:prstGeom>
+          <a:noFill/>
+          <a:extLst>
+            <a:ext uri="{909E8E84-426E-40DD-AFC4-6F175D3DCCD1}">
+              <a14:hiddenFill xmlns:a14="http://schemas.microsoft.com/office/drawing/2010/main">
+                <a:solidFill>
+                  <a:srgbClr val="FFFFFF"/>
+                </a:solidFill>
+              </a14:hiddenFill>
+            </a:ext>
+          </a:extLst>
+        </p:spPr>
+      </p:pic>
+      <p:pic>
+        <p:nvPicPr>
+          <p:cNvPr id="1036" name="Picture 12" descr="Server Storage, Hosting, Cloud storage, Server, web, network, Computer Icon"/>
+          <p:cNvPicPr>
+            <a:picLocks noChangeAspect="1" noChangeArrowheads="1"/>
+          </p:cNvPicPr>
+          <p:nvPr/>
+        </p:nvPicPr>
+        <p:blipFill>
+          <a:blip r:embed="rId6">
+            <a:extLst>
+              <a:ext uri="{28A0092B-C50C-407E-A947-70E740481C1C}">
+                <a14:useLocalDpi xmlns:a14="http://schemas.microsoft.com/office/drawing/2010/main" val="0"/>
+              </a:ext>
+            </a:extLst>
+          </a:blip>
+          <a:srcRect/>
+          <a:stretch>
+            <a:fillRect/>
+          </a:stretch>
+        </p:blipFill>
+        <p:spPr bwMode="auto">
+          <a:xfrm>
+            <a:off x="4945411" y="2875892"/>
+            <a:ext cx="1794410" cy="1794410"/>
+          </a:xfrm>
+          <a:prstGeom prst="rect">
+            <a:avLst/>
+          </a:prstGeom>
+          <a:noFill/>
+          <a:extLst>
+            <a:ext uri="{909E8E84-426E-40DD-AFC4-6F175D3DCCD1}">
+              <a14:hiddenFill xmlns:a14="http://schemas.microsoft.com/office/drawing/2010/main">
+                <a:solidFill>
+                  <a:srgbClr val="FFFFFF"/>
+                </a:solidFill>
+              </a14:hiddenFill>
+            </a:ext>
+          </a:extLst>
+        </p:spPr>
+      </p:pic>
+      <p:sp>
+        <p:nvSpPr>
+          <p:cNvPr id="5" name="CaixaDeTexto 4"/>
+          <p:cNvSpPr txBox="1"/>
+          <p:nvPr/>
+        </p:nvSpPr>
+        <p:spPr>
+          <a:xfrm>
+            <a:off x="4801209" y="2312912"/>
+            <a:ext cx="2082814" cy="461665"/>
+          </a:xfrm>
+          <a:prstGeom prst="rect">
+            <a:avLst/>
+          </a:prstGeom>
+          <a:noFill/>
+        </p:spPr>
+        <p:txBody>
+          <a:bodyPr wrap="none" rtlCol="0">
+            <a:spAutoFit/>
+          </a:bodyPr>
+          <a:lstStyle/>
+          <a:p>
+            <a:r>
+              <a:rPr lang="pt-BR" sz="2400" b="1" dirty="0" smtClean="0"/>
+              <a:t>MASTER NODE</a:t>
+            </a:r>
+            <a:endParaRPr lang="pt-BR" sz="2400" b="1" dirty="0"/>
+          </a:p>
+        </p:txBody>
+      </p:sp>
+      <p:pic>
+        <p:nvPicPr>
+          <p:cNvPr id="1038" name="Picture 14" descr="Resultado de imagem para jupyter icon"/>
+          <p:cNvPicPr>
+            <a:picLocks noChangeAspect="1" noChangeArrowheads="1"/>
+          </p:cNvPicPr>
+          <p:nvPr/>
+        </p:nvPicPr>
+        <p:blipFill>
+          <a:blip r:embed="rId7" cstate="print">
+            <a:extLst>
+              <a:ext uri="{28A0092B-C50C-407E-A947-70E740481C1C}">
+                <a14:useLocalDpi xmlns:a14="http://schemas.microsoft.com/office/drawing/2010/main" val="0"/>
+              </a:ext>
+            </a:extLst>
+          </a:blip>
+          <a:srcRect/>
+          <a:stretch>
+            <a:fillRect/>
+          </a:stretch>
+        </p:blipFill>
+        <p:spPr bwMode="auto">
+          <a:xfrm>
+            <a:off x="5165547" y="4771617"/>
+            <a:ext cx="1354138" cy="1354138"/>
+          </a:xfrm>
+          <a:prstGeom prst="rect">
+            <a:avLst/>
+          </a:prstGeom>
+          <a:noFill/>
+          <a:extLst>
+            <a:ext uri="{909E8E84-426E-40DD-AFC4-6F175D3DCCD1}">
+              <a14:hiddenFill xmlns:a14="http://schemas.microsoft.com/office/drawing/2010/main">
+                <a:solidFill>
+                  <a:srgbClr val="FFFFFF"/>
+                </a:solidFill>
+              </a14:hiddenFill>
+            </a:ext>
+          </a:extLst>
+        </p:spPr>
+      </p:pic>
+      <p:pic>
+        <p:nvPicPr>
+          <p:cNvPr id="1040" name="Picture 16" descr="Laptop Screen, Computer, Laptop, Open Laptop, laptop computer, technology Icon"/>
+          <p:cNvPicPr>
+            <a:picLocks noChangeAspect="1" noChangeArrowheads="1"/>
+          </p:cNvPicPr>
+          <p:nvPr/>
+        </p:nvPicPr>
+        <p:blipFill>
+          <a:blip r:embed="rId8">
+            <a:extLst>
+              <a:ext uri="{28A0092B-C50C-407E-A947-70E740481C1C}">
+                <a14:useLocalDpi xmlns:a14="http://schemas.microsoft.com/office/drawing/2010/main" val="0"/>
+              </a:ext>
+            </a:extLst>
+          </a:blip>
+          <a:srcRect/>
+          <a:stretch>
+            <a:fillRect/>
+          </a:stretch>
+        </p:blipFill>
+        <p:spPr bwMode="auto">
+          <a:xfrm>
+            <a:off x="9674412" y="2875892"/>
+            <a:ext cx="1792128" cy="1792128"/>
+          </a:xfrm>
+          <a:prstGeom prst="rect">
+            <a:avLst/>
+          </a:prstGeom>
+          <a:noFill/>
+          <a:extLst>
+            <a:ext uri="{909E8E84-426E-40DD-AFC4-6F175D3DCCD1}">
+              <a14:hiddenFill xmlns:a14="http://schemas.microsoft.com/office/drawing/2010/main">
+                <a:solidFill>
+                  <a:srgbClr val="FFFFFF"/>
+                </a:solidFill>
+              </a14:hiddenFill>
+            </a:ext>
+          </a:extLst>
+        </p:spPr>
+      </p:pic>
+      <p:pic>
+        <p:nvPicPr>
+          <p:cNvPr id="1042" name="Picture 18" descr="Arrows, right, line, Arrow, Left Icon"/>
+          <p:cNvPicPr>
+            <a:picLocks noChangeAspect="1" noChangeArrowheads="1"/>
+          </p:cNvPicPr>
+          <p:nvPr/>
+        </p:nvPicPr>
+        <p:blipFill>
+          <a:blip r:embed="rId9">
+            <a:extLst>
+              <a:ext uri="{28A0092B-C50C-407E-A947-70E740481C1C}">
+                <a14:useLocalDpi xmlns:a14="http://schemas.microsoft.com/office/drawing/2010/main" val="0"/>
+              </a:ext>
+            </a:extLst>
+          </a:blip>
+          <a:srcRect/>
+          <a:stretch>
+            <a:fillRect/>
+          </a:stretch>
+        </p:blipFill>
+        <p:spPr bwMode="auto">
+          <a:xfrm>
+            <a:off x="6943850" y="2543744"/>
+            <a:ext cx="2438400" cy="2438400"/>
+          </a:xfrm>
+          <a:prstGeom prst="rect">
+            <a:avLst/>
+          </a:prstGeom>
+          <a:noFill/>
+          <a:extLst>
+            <a:ext uri="{909E8E84-426E-40DD-AFC4-6F175D3DCCD1}">
+              <a14:hiddenFill xmlns:a14="http://schemas.microsoft.com/office/drawing/2010/main">
+                <a:solidFill>
+                  <a:srgbClr val="FFFFFF"/>
+                </a:solidFill>
+              </a14:hiddenFill>
+            </a:ext>
+          </a:extLst>
+        </p:spPr>
+      </p:pic>
+      <p:sp>
+        <p:nvSpPr>
+          <p:cNvPr id="14" name="CaixaDeTexto 13"/>
+          <p:cNvSpPr txBox="1"/>
+          <p:nvPr/>
+        </p:nvSpPr>
+        <p:spPr>
+          <a:xfrm>
+            <a:off x="7737805" y="4309952"/>
+            <a:ext cx="850489" cy="461665"/>
+          </a:xfrm>
+          <a:prstGeom prst="rect">
+            <a:avLst/>
+          </a:prstGeom>
+          <a:noFill/>
+        </p:spPr>
+        <p:txBody>
+          <a:bodyPr wrap="none" rtlCol="0">
+            <a:spAutoFit/>
+          </a:bodyPr>
+          <a:lstStyle/>
+          <a:p>
+            <a:r>
+              <a:rPr lang="pt-BR" sz="2400" b="1" dirty="0" smtClean="0"/>
+              <a:t>HTTP</a:t>
+            </a:r>
+            <a:endParaRPr lang="pt-BR" sz="2400" b="1" dirty="0"/>
+          </a:p>
+        </p:txBody>
+      </p:sp>
+      <p:sp>
+        <p:nvSpPr>
+          <p:cNvPr id="6" name="Elipse 5"/>
+          <p:cNvSpPr/>
+          <p:nvPr/>
+        </p:nvSpPr>
+        <p:spPr>
+          <a:xfrm>
+            <a:off x="4611037" y="1904007"/>
+            <a:ext cx="2439758" cy="2763715"/>
+          </a:xfrm>
+          <a:prstGeom prst="ellipse">
+            <a:avLst/>
+          </a:prstGeom>
+          <a:noFill/>
+          <a:ln w="38100">
+            <a:solidFill>
+              <a:srgbClr val="FF0000"/>
+            </a:solidFill>
+          </a:ln>
+        </p:spPr>
+        <p:style>
+          <a:lnRef idx="2">
+            <a:schemeClr val="accent1">
+              <a:shade val="50000"/>
+            </a:schemeClr>
+          </a:lnRef>
+          <a:fillRef idx="1">
+            <a:schemeClr val="accent1"/>
+          </a:fillRef>
+          <a:effectRef idx="0">
+            <a:schemeClr val="accent1"/>
+          </a:effectRef>
+          <a:fontRef idx="minor">
+            <a:schemeClr val="lt1"/>
+          </a:fontRef>
+        </p:style>
+        <p:txBody>
+          <a:bodyPr rtlCol="0" anchor="ctr"/>
+          <a:lstStyle/>
+          <a:p>
+            <a:pPr algn="ctr"/>
+            <a:endParaRPr lang="pt-BR"/>
+          </a:p>
+        </p:txBody>
+      </p:sp>
+      <p:cxnSp>
+        <p:nvCxnSpPr>
+          <p:cNvPr id="8" name="Conector reto 7"/>
+          <p:cNvCxnSpPr>
+            <a:endCxn id="6" idx="1"/>
+          </p:cNvCxnSpPr>
+          <p:nvPr/>
+        </p:nvCxnSpPr>
+        <p:spPr>
+          <a:xfrm flipV="1">
+            <a:off x="3216925" y="2308744"/>
+            <a:ext cx="1751406" cy="1238688"/>
+          </a:xfrm>
+          <a:prstGeom prst="line">
+            <a:avLst/>
+          </a:prstGeom>
+          <a:ln w="19050">
+            <a:solidFill>
+              <a:srgbClr val="FF0000"/>
+            </a:solidFill>
+          </a:ln>
+        </p:spPr>
+        <p:style>
+          <a:lnRef idx="1">
+            <a:schemeClr val="accent1"/>
+          </a:lnRef>
+          <a:fillRef idx="0">
+            <a:schemeClr val="accent1"/>
+          </a:fillRef>
+          <a:effectRef idx="0">
+            <a:schemeClr val="accent1"/>
+          </a:effectRef>
+          <a:fontRef idx="minor">
+            <a:schemeClr val="tx1"/>
+          </a:fontRef>
+        </p:style>
+      </p:cxnSp>
+      <p:cxnSp>
+        <p:nvCxnSpPr>
+          <p:cNvPr id="10" name="Conector reto 9"/>
+          <p:cNvCxnSpPr>
+            <a:endCxn id="6" idx="3"/>
+          </p:cNvCxnSpPr>
+          <p:nvPr/>
+        </p:nvCxnSpPr>
+        <p:spPr>
+          <a:xfrm>
+            <a:off x="3216925" y="4021157"/>
+            <a:ext cx="1751406" cy="241828"/>
+          </a:xfrm>
+          <a:prstGeom prst="line">
+            <a:avLst/>
+          </a:prstGeom>
+          <a:ln w="19050">
+            <a:solidFill>
+              <a:srgbClr val="FF0000"/>
+            </a:solidFill>
+          </a:ln>
+        </p:spPr>
+        <p:style>
+          <a:lnRef idx="1">
+            <a:schemeClr val="accent1"/>
+          </a:lnRef>
+          <a:fillRef idx="0">
+            <a:schemeClr val="accent1"/>
+          </a:fillRef>
+          <a:effectRef idx="0">
+            <a:schemeClr val="accent1"/>
+          </a:effectRef>
+          <a:fontRef idx="minor">
+            <a:schemeClr val="tx1"/>
+          </a:fontRef>
+        </p:style>
+      </p:cxnSp>
     </p:spTree>
     <p:extLst>
       <p:ext uri="{BB962C8B-B14F-4D97-AF65-F5344CB8AC3E}">

</xml_diff>

<commit_message>
Slide apresentação concluído + jupyters de todos os temas
</commit_message>
<xml_diff>
--- a/apresentacao.pptx
+++ b/apresentacao.pptx
@@ -4,18 +4,35 @@
   <p:sldMasterIdLst>
     <p:sldMasterId id="2147483648" r:id="rId1"/>
   </p:sldMasterIdLst>
+  <p:notesMasterIdLst>
+    <p:notesMasterId r:id="rId27"/>
+  </p:notesMasterIdLst>
   <p:sldIdLst>
     <p:sldId id="256" r:id="rId2"/>
-    <p:sldId id="257" r:id="rId3"/>
-    <p:sldId id="258" r:id="rId4"/>
-    <p:sldId id="259" r:id="rId5"/>
-    <p:sldId id="260" r:id="rId6"/>
-    <p:sldId id="261" r:id="rId7"/>
-    <p:sldId id="262" r:id="rId8"/>
-    <p:sldId id="263" r:id="rId9"/>
-    <p:sldId id="264" r:id="rId10"/>
-    <p:sldId id="265" r:id="rId11"/>
-    <p:sldId id="266" r:id="rId12"/>
+    <p:sldId id="258" r:id="rId3"/>
+    <p:sldId id="257" r:id="rId4"/>
+    <p:sldId id="273" r:id="rId5"/>
+    <p:sldId id="274" r:id="rId6"/>
+    <p:sldId id="275" r:id="rId7"/>
+    <p:sldId id="276" r:id="rId8"/>
+    <p:sldId id="277" r:id="rId9"/>
+    <p:sldId id="278" r:id="rId10"/>
+    <p:sldId id="279" r:id="rId11"/>
+    <p:sldId id="280" r:id="rId12"/>
+    <p:sldId id="281" r:id="rId13"/>
+    <p:sldId id="282" r:id="rId14"/>
+    <p:sldId id="283" r:id="rId15"/>
+    <p:sldId id="284" r:id="rId16"/>
+    <p:sldId id="272" r:id="rId17"/>
+    <p:sldId id="259" r:id="rId18"/>
+    <p:sldId id="260" r:id="rId19"/>
+    <p:sldId id="261" r:id="rId20"/>
+    <p:sldId id="262" r:id="rId21"/>
+    <p:sldId id="263" r:id="rId22"/>
+    <p:sldId id="264" r:id="rId23"/>
+    <p:sldId id="265" r:id="rId24"/>
+    <p:sldId id="266" r:id="rId25"/>
+    <p:sldId id="285" r:id="rId26"/>
   </p:sldIdLst>
   <p:sldSz cx="12192000" cy="6858000"/>
   <p:notesSz cx="6858000" cy="9144000"/>
@@ -122,6 +139,444 @@
 </p:presentation>
 </file>
 
+<file path=ppt/revisionInfo.xml><?xml version="1.0" encoding="utf-8"?>
+<p1510:revInfo xmlns:a="http://schemas.openxmlformats.org/drawingml/2006/main" xmlns:r="http://schemas.openxmlformats.org/officeDocument/2006/relationships" xmlns:p1510="http://schemas.microsoft.com/office/powerpoint/2015/10/main"/>
+</file>
+
+<file path=ppt/notesMasters/notesMaster1.xml><?xml version="1.0" encoding="utf-8"?>
+<p:notesMaster xmlns:a="http://schemas.openxmlformats.org/drawingml/2006/main" xmlns:r="http://schemas.openxmlformats.org/officeDocument/2006/relationships" xmlns:p="http://schemas.openxmlformats.org/presentationml/2006/main">
+  <p:cSld>
+    <p:bg>
+      <p:bgRef idx="1001">
+        <a:schemeClr val="bg1"/>
+      </p:bgRef>
+    </p:bg>
+    <p:spTree>
+      <p:nvGrpSpPr>
+        <p:cNvPr id="1" name=""/>
+        <p:cNvGrpSpPr/>
+        <p:nvPr/>
+      </p:nvGrpSpPr>
+      <p:grpSpPr>
+        <a:xfrm>
+          <a:off x="0" y="0"/>
+          <a:ext cx="0" cy="0"/>
+          <a:chOff x="0" y="0"/>
+          <a:chExt cx="0" cy="0"/>
+        </a:xfrm>
+      </p:grpSpPr>
+      <p:sp>
+        <p:nvSpPr>
+          <p:cNvPr id="2" name="Header Placeholder 1"/>
+          <p:cNvSpPr>
+            <a:spLocks noGrp="1"/>
+          </p:cNvSpPr>
+          <p:nvPr>
+            <p:ph type="hdr" sz="quarter"/>
+          </p:nvPr>
+        </p:nvSpPr>
+        <p:spPr>
+          <a:xfrm>
+            <a:off x="0" y="0"/>
+            <a:ext cx="2971800" cy="458788"/>
+          </a:xfrm>
+          <a:prstGeom prst="rect">
+            <a:avLst/>
+          </a:prstGeom>
+        </p:spPr>
+        <p:txBody>
+          <a:bodyPr vert="horz" lIns="91440" tIns="45720" rIns="91440" bIns="45720" rtlCol="0"/>
+          <a:lstStyle>
+            <a:lvl1pPr algn="l">
+              <a:defRPr sz="1200"/>
+            </a:lvl1pPr>
+          </a:lstStyle>
+          <a:p>
+            <a:endParaRPr lang="pt-BR"/>
+          </a:p>
+        </p:txBody>
+      </p:sp>
+      <p:sp>
+        <p:nvSpPr>
+          <p:cNvPr id="3" name="Date Placeholder 2"/>
+          <p:cNvSpPr>
+            <a:spLocks noGrp="1"/>
+          </p:cNvSpPr>
+          <p:nvPr>
+            <p:ph type="dt" idx="1"/>
+          </p:nvPr>
+        </p:nvSpPr>
+        <p:spPr>
+          <a:xfrm>
+            <a:off x="3884613" y="0"/>
+            <a:ext cx="2971800" cy="458788"/>
+          </a:xfrm>
+          <a:prstGeom prst="rect">
+            <a:avLst/>
+          </a:prstGeom>
+        </p:spPr>
+        <p:txBody>
+          <a:bodyPr vert="horz" lIns="91440" tIns="45720" rIns="91440" bIns="45720" rtlCol="0"/>
+          <a:lstStyle>
+            <a:lvl1pPr algn="r">
+              <a:defRPr sz="1200"/>
+            </a:lvl1pPr>
+          </a:lstStyle>
+          <a:p>
+            <a:fld id="{A9CE1991-9D90-4792-BF2D-5D8D655139C7}" type="datetimeFigureOut">
+              <a:rPr lang="pt-BR" smtClean="0"/>
+              <a:t>06/07/2018</a:t>
+            </a:fld>
+            <a:endParaRPr lang="pt-BR"/>
+          </a:p>
+        </p:txBody>
+      </p:sp>
+      <p:sp>
+        <p:nvSpPr>
+          <p:cNvPr id="4" name="Slide Image Placeholder 3"/>
+          <p:cNvSpPr>
+            <a:spLocks noGrp="1" noRot="1" noChangeAspect="1"/>
+          </p:cNvSpPr>
+          <p:nvPr>
+            <p:ph type="sldImg" idx="2"/>
+          </p:nvPr>
+        </p:nvSpPr>
+        <p:spPr>
+          <a:xfrm>
+            <a:off x="685800" y="1143000"/>
+            <a:ext cx="5486400" cy="3086100"/>
+          </a:xfrm>
+          <a:prstGeom prst="rect">
+            <a:avLst/>
+          </a:prstGeom>
+          <a:noFill/>
+          <a:ln w="12700">
+            <a:solidFill>
+              <a:prstClr val="black"/>
+            </a:solidFill>
+          </a:ln>
+        </p:spPr>
+        <p:txBody>
+          <a:bodyPr vert="horz" lIns="91440" tIns="45720" rIns="91440" bIns="45720" rtlCol="0" anchor="ctr"/>
+          <a:lstStyle/>
+          <a:p>
+            <a:endParaRPr lang="pt-BR"/>
+          </a:p>
+        </p:txBody>
+      </p:sp>
+      <p:sp>
+        <p:nvSpPr>
+          <p:cNvPr id="5" name="Notes Placeholder 4"/>
+          <p:cNvSpPr>
+            <a:spLocks noGrp="1"/>
+          </p:cNvSpPr>
+          <p:nvPr>
+            <p:ph type="body" sz="quarter" idx="3"/>
+          </p:nvPr>
+        </p:nvSpPr>
+        <p:spPr>
+          <a:xfrm>
+            <a:off x="685800" y="4400550"/>
+            <a:ext cx="5486400" cy="3600450"/>
+          </a:xfrm>
+          <a:prstGeom prst="rect">
+            <a:avLst/>
+          </a:prstGeom>
+        </p:spPr>
+        <p:txBody>
+          <a:bodyPr vert="horz" lIns="91440" tIns="45720" rIns="91440" bIns="45720" rtlCol="0"/>
+          <a:lstStyle/>
+          <a:p>
+            <a:pPr lvl="0"/>
+            <a:r>
+              <a:rPr lang="en-US"/>
+              <a:t>Edit Master text styles</a:t>
+            </a:r>
+          </a:p>
+          <a:p>
+            <a:pPr lvl="1"/>
+            <a:r>
+              <a:rPr lang="en-US"/>
+              <a:t>Second level</a:t>
+            </a:r>
+          </a:p>
+          <a:p>
+            <a:pPr lvl="2"/>
+            <a:r>
+              <a:rPr lang="en-US"/>
+              <a:t>Third level</a:t>
+            </a:r>
+          </a:p>
+          <a:p>
+            <a:pPr lvl="3"/>
+            <a:r>
+              <a:rPr lang="en-US"/>
+              <a:t>Fourth level</a:t>
+            </a:r>
+          </a:p>
+          <a:p>
+            <a:pPr lvl="4"/>
+            <a:r>
+              <a:rPr lang="en-US"/>
+              <a:t>Fifth level</a:t>
+            </a:r>
+            <a:endParaRPr lang="pt-BR"/>
+          </a:p>
+        </p:txBody>
+      </p:sp>
+      <p:sp>
+        <p:nvSpPr>
+          <p:cNvPr id="6" name="Footer Placeholder 5"/>
+          <p:cNvSpPr>
+            <a:spLocks noGrp="1"/>
+          </p:cNvSpPr>
+          <p:nvPr>
+            <p:ph type="ftr" sz="quarter" idx="4"/>
+          </p:nvPr>
+        </p:nvSpPr>
+        <p:spPr>
+          <a:xfrm>
+            <a:off x="0" y="8685213"/>
+            <a:ext cx="2971800" cy="458787"/>
+          </a:xfrm>
+          <a:prstGeom prst="rect">
+            <a:avLst/>
+          </a:prstGeom>
+        </p:spPr>
+        <p:txBody>
+          <a:bodyPr vert="horz" lIns="91440" tIns="45720" rIns="91440" bIns="45720" rtlCol="0" anchor="b"/>
+          <a:lstStyle>
+            <a:lvl1pPr algn="l">
+              <a:defRPr sz="1200"/>
+            </a:lvl1pPr>
+          </a:lstStyle>
+          <a:p>
+            <a:endParaRPr lang="pt-BR"/>
+          </a:p>
+        </p:txBody>
+      </p:sp>
+      <p:sp>
+        <p:nvSpPr>
+          <p:cNvPr id="7" name="Slide Number Placeholder 6"/>
+          <p:cNvSpPr>
+            <a:spLocks noGrp="1"/>
+          </p:cNvSpPr>
+          <p:nvPr>
+            <p:ph type="sldNum" sz="quarter" idx="5"/>
+          </p:nvPr>
+        </p:nvSpPr>
+        <p:spPr>
+          <a:xfrm>
+            <a:off x="3884613" y="8685213"/>
+            <a:ext cx="2971800" cy="458787"/>
+          </a:xfrm>
+          <a:prstGeom prst="rect">
+            <a:avLst/>
+          </a:prstGeom>
+        </p:spPr>
+        <p:txBody>
+          <a:bodyPr vert="horz" lIns="91440" tIns="45720" rIns="91440" bIns="45720" rtlCol="0" anchor="b"/>
+          <a:lstStyle>
+            <a:lvl1pPr algn="r">
+              <a:defRPr sz="1200"/>
+            </a:lvl1pPr>
+          </a:lstStyle>
+          <a:p>
+            <a:fld id="{53464B15-064D-4369-BCA4-E8218B20B9AB}" type="slidenum">
+              <a:rPr lang="pt-BR" smtClean="0"/>
+              <a:t>‹#›</a:t>
+            </a:fld>
+            <a:endParaRPr lang="pt-BR"/>
+          </a:p>
+        </p:txBody>
+      </p:sp>
+    </p:spTree>
+    <p:extLst>
+      <p:ext uri="{BB962C8B-B14F-4D97-AF65-F5344CB8AC3E}">
+        <p14:creationId xmlns:p14="http://schemas.microsoft.com/office/powerpoint/2010/main" val="644480799"/>
+      </p:ext>
+    </p:extLst>
+  </p:cSld>
+  <p:clrMap bg1="lt1" tx1="dk1" bg2="lt2" tx2="dk2" accent1="accent1" accent2="accent2" accent3="accent3" accent4="accent4" accent5="accent5" accent6="accent6" hlink="hlink" folHlink="folHlink"/>
+  <p:notesStyle>
+    <a:lvl1pPr marL="0" algn="l" defTabSz="914400" rtl="0" eaLnBrk="1" latinLnBrk="0" hangingPunct="1">
+      <a:defRPr sz="1200" kern="1200">
+        <a:solidFill>
+          <a:schemeClr val="tx1"/>
+        </a:solidFill>
+        <a:latin typeface="+mn-lt"/>
+        <a:ea typeface="+mn-ea"/>
+        <a:cs typeface="+mn-cs"/>
+      </a:defRPr>
+    </a:lvl1pPr>
+    <a:lvl2pPr marL="457200" algn="l" defTabSz="914400" rtl="0" eaLnBrk="1" latinLnBrk="0" hangingPunct="1">
+      <a:defRPr sz="1200" kern="1200">
+        <a:solidFill>
+          <a:schemeClr val="tx1"/>
+        </a:solidFill>
+        <a:latin typeface="+mn-lt"/>
+        <a:ea typeface="+mn-ea"/>
+        <a:cs typeface="+mn-cs"/>
+      </a:defRPr>
+    </a:lvl2pPr>
+    <a:lvl3pPr marL="914400" algn="l" defTabSz="914400" rtl="0" eaLnBrk="1" latinLnBrk="0" hangingPunct="1">
+      <a:defRPr sz="1200" kern="1200">
+        <a:solidFill>
+          <a:schemeClr val="tx1"/>
+        </a:solidFill>
+        <a:latin typeface="+mn-lt"/>
+        <a:ea typeface="+mn-ea"/>
+        <a:cs typeface="+mn-cs"/>
+      </a:defRPr>
+    </a:lvl3pPr>
+    <a:lvl4pPr marL="1371600" algn="l" defTabSz="914400" rtl="0" eaLnBrk="1" latinLnBrk="0" hangingPunct="1">
+      <a:defRPr sz="1200" kern="1200">
+        <a:solidFill>
+          <a:schemeClr val="tx1"/>
+        </a:solidFill>
+        <a:latin typeface="+mn-lt"/>
+        <a:ea typeface="+mn-ea"/>
+        <a:cs typeface="+mn-cs"/>
+      </a:defRPr>
+    </a:lvl4pPr>
+    <a:lvl5pPr marL="1828800" algn="l" defTabSz="914400" rtl="0" eaLnBrk="1" latinLnBrk="0" hangingPunct="1">
+      <a:defRPr sz="1200" kern="1200">
+        <a:solidFill>
+          <a:schemeClr val="tx1"/>
+        </a:solidFill>
+        <a:latin typeface="+mn-lt"/>
+        <a:ea typeface="+mn-ea"/>
+        <a:cs typeface="+mn-cs"/>
+      </a:defRPr>
+    </a:lvl5pPr>
+    <a:lvl6pPr marL="2286000" algn="l" defTabSz="914400" rtl="0" eaLnBrk="1" latinLnBrk="0" hangingPunct="1">
+      <a:defRPr sz="1200" kern="1200">
+        <a:solidFill>
+          <a:schemeClr val="tx1"/>
+        </a:solidFill>
+        <a:latin typeface="+mn-lt"/>
+        <a:ea typeface="+mn-ea"/>
+        <a:cs typeface="+mn-cs"/>
+      </a:defRPr>
+    </a:lvl6pPr>
+    <a:lvl7pPr marL="2743200" algn="l" defTabSz="914400" rtl="0" eaLnBrk="1" latinLnBrk="0" hangingPunct="1">
+      <a:defRPr sz="1200" kern="1200">
+        <a:solidFill>
+          <a:schemeClr val="tx1"/>
+        </a:solidFill>
+        <a:latin typeface="+mn-lt"/>
+        <a:ea typeface="+mn-ea"/>
+        <a:cs typeface="+mn-cs"/>
+      </a:defRPr>
+    </a:lvl7pPr>
+    <a:lvl8pPr marL="3200400" algn="l" defTabSz="914400" rtl="0" eaLnBrk="1" latinLnBrk="0" hangingPunct="1">
+      <a:defRPr sz="1200" kern="1200">
+        <a:solidFill>
+          <a:schemeClr val="tx1"/>
+        </a:solidFill>
+        <a:latin typeface="+mn-lt"/>
+        <a:ea typeface="+mn-ea"/>
+        <a:cs typeface="+mn-cs"/>
+      </a:defRPr>
+    </a:lvl8pPr>
+    <a:lvl9pPr marL="3657600" algn="l" defTabSz="914400" rtl="0" eaLnBrk="1" latinLnBrk="0" hangingPunct="1">
+      <a:defRPr sz="1200" kern="1200">
+        <a:solidFill>
+          <a:schemeClr val="tx1"/>
+        </a:solidFill>
+        <a:latin typeface="+mn-lt"/>
+        <a:ea typeface="+mn-ea"/>
+        <a:cs typeface="+mn-cs"/>
+      </a:defRPr>
+    </a:lvl9pPr>
+  </p:notesStyle>
+</p:notesMaster>
+</file>
+
+<file path=ppt/notesSlides/notesSlide1.xml><?xml version="1.0" encoding="utf-8"?>
+<p:notes xmlns:a="http://schemas.openxmlformats.org/drawingml/2006/main" xmlns:r="http://schemas.openxmlformats.org/officeDocument/2006/relationships" xmlns:p="http://schemas.openxmlformats.org/presentationml/2006/main">
+  <p:cSld>
+    <p:spTree>
+      <p:nvGrpSpPr>
+        <p:cNvPr id="1" name=""/>
+        <p:cNvGrpSpPr/>
+        <p:nvPr/>
+      </p:nvGrpSpPr>
+      <p:grpSpPr>
+        <a:xfrm>
+          <a:off x="0" y="0"/>
+          <a:ext cx="0" cy="0"/>
+          <a:chOff x="0" y="0"/>
+          <a:chExt cx="0" cy="0"/>
+        </a:xfrm>
+      </p:grpSpPr>
+      <p:sp>
+        <p:nvSpPr>
+          <p:cNvPr id="2" name="Slide Image Placeholder 1"/>
+          <p:cNvSpPr>
+            <a:spLocks noGrp="1" noRot="1" noChangeAspect="1"/>
+          </p:cNvSpPr>
+          <p:nvPr>
+            <p:ph type="sldImg"/>
+          </p:nvPr>
+        </p:nvSpPr>
+        <p:spPr/>
+      </p:sp>
+      <p:sp>
+        <p:nvSpPr>
+          <p:cNvPr id="3" name="Notes Placeholder 2"/>
+          <p:cNvSpPr>
+            <a:spLocks noGrp="1"/>
+          </p:cNvSpPr>
+          <p:nvPr>
+            <p:ph type="body" idx="1"/>
+          </p:nvPr>
+        </p:nvSpPr>
+        <p:spPr/>
+        <p:txBody>
+          <a:bodyPr/>
+          <a:lstStyle/>
+          <a:p>
+            <a:endParaRPr lang="pt-BR" dirty="0"/>
+          </a:p>
+        </p:txBody>
+      </p:sp>
+      <p:sp>
+        <p:nvSpPr>
+          <p:cNvPr id="4" name="Slide Number Placeholder 3"/>
+          <p:cNvSpPr>
+            <a:spLocks noGrp="1"/>
+          </p:cNvSpPr>
+          <p:nvPr>
+            <p:ph type="sldNum" sz="quarter" idx="10"/>
+          </p:nvPr>
+        </p:nvSpPr>
+        <p:spPr/>
+        <p:txBody>
+          <a:bodyPr/>
+          <a:lstStyle/>
+          <a:p>
+            <a:fld id="{53464B15-064D-4369-BCA4-E8218B20B9AB}" type="slidenum">
+              <a:rPr lang="pt-BR" smtClean="0"/>
+              <a:t>3</a:t>
+            </a:fld>
+            <a:endParaRPr lang="pt-BR"/>
+          </a:p>
+        </p:txBody>
+      </p:sp>
+    </p:spTree>
+    <p:extLst>
+      <p:ext uri="{BB962C8B-B14F-4D97-AF65-F5344CB8AC3E}">
+        <p14:creationId xmlns:p14="http://schemas.microsoft.com/office/powerpoint/2010/main" val="2161463821"/>
+      </p:ext>
+    </p:extLst>
+  </p:cSld>
+  <p:clrMapOvr>
+    <a:masterClrMapping/>
+  </p:clrMapOvr>
+</p:notes>
+</file>
+
 <file path=ppt/slideLayouts/slideLayout1.xml><?xml version="1.0" encoding="utf-8"?>
 <p:sldLayout xmlns:a="http://schemas.openxmlformats.org/drawingml/2006/main" xmlns:r="http://schemas.openxmlformats.org/officeDocument/2006/relationships" xmlns:p="http://schemas.openxmlformats.org/presentationml/2006/main" type="title" preserve="1">
   <p:cSld name="Slide de título">
@@ -164,10 +619,9 @@
           </a:lstStyle>
           <a:p>
             <a:r>
-              <a:rPr lang="pt-BR" smtClean="0"/>
+              <a:rPr lang="pt-BR"/>
               <a:t>Clique para editar o título mestre</a:t>
             </a:r>
-            <a:endParaRPr lang="pt-BR"/>
           </a:p>
         </p:txBody>
       </p:sp>
@@ -229,10 +683,9 @@
           </a:lstStyle>
           <a:p>
             <a:r>
-              <a:rPr lang="pt-BR" smtClean="0"/>
+              <a:rPr lang="pt-BR"/>
               <a:t>Clique para editar o estilo do subtítulo mestre</a:t>
             </a:r>
-            <a:endParaRPr lang="pt-BR"/>
           </a:p>
         </p:txBody>
       </p:sp>
@@ -295,7 +748,7 @@
           <a:p>
             <a:fld id="{1D74CD81-846E-42DB-BD4B-54247C8E2E62}" type="slidenum">
               <a:rPr lang="pt-BR" smtClean="0"/>
-              <a:t>‹nº›</a:t>
+              <a:t>‹#›</a:t>
             </a:fld>
             <a:endParaRPr lang="pt-BR"/>
           </a:p>
@@ -347,10 +800,9 @@
           <a:lstStyle/>
           <a:p>
             <a:r>
-              <a:rPr lang="pt-BR" smtClean="0"/>
+              <a:rPr lang="pt-BR"/>
               <a:t>Clique para editar o título mestre</a:t>
             </a:r>
-            <a:endParaRPr lang="pt-BR"/>
           </a:p>
         </p:txBody>
       </p:sp>
@@ -371,38 +823,37 @@
           <a:p>
             <a:pPr lvl="0"/>
             <a:r>
-              <a:rPr lang="pt-BR" smtClean="0"/>
+              <a:rPr lang="pt-BR"/>
               <a:t>Clique para editar o texto mestre</a:t>
             </a:r>
           </a:p>
           <a:p>
             <a:pPr lvl="1"/>
             <a:r>
-              <a:rPr lang="pt-BR" smtClean="0"/>
+              <a:rPr lang="pt-BR"/>
               <a:t>Segundo nível</a:t>
             </a:r>
           </a:p>
           <a:p>
             <a:pPr lvl="2"/>
             <a:r>
-              <a:rPr lang="pt-BR" smtClean="0"/>
+              <a:rPr lang="pt-BR"/>
               <a:t>Terceiro nível</a:t>
             </a:r>
           </a:p>
           <a:p>
             <a:pPr lvl="3"/>
             <a:r>
-              <a:rPr lang="pt-BR" smtClean="0"/>
+              <a:rPr lang="pt-BR"/>
               <a:t>Quarto nível</a:t>
             </a:r>
           </a:p>
           <a:p>
             <a:pPr lvl="4"/>
             <a:r>
-              <a:rPr lang="pt-BR" smtClean="0"/>
+              <a:rPr lang="pt-BR"/>
               <a:t>Quinto nível</a:t>
             </a:r>
-            <a:endParaRPr lang="pt-BR"/>
           </a:p>
         </p:txBody>
       </p:sp>
@@ -465,7 +916,7 @@
           <a:p>
             <a:fld id="{1D74CD81-846E-42DB-BD4B-54247C8E2E62}" type="slidenum">
               <a:rPr lang="pt-BR" smtClean="0"/>
-              <a:t>‹nº›</a:t>
+              <a:t>‹#›</a:t>
             </a:fld>
             <a:endParaRPr lang="pt-BR"/>
           </a:p>
@@ -522,10 +973,9 @@
           <a:lstStyle/>
           <a:p>
             <a:r>
-              <a:rPr lang="pt-BR" smtClean="0"/>
+              <a:rPr lang="pt-BR"/>
               <a:t>Clique para editar o título mestre</a:t>
             </a:r>
-            <a:endParaRPr lang="pt-BR"/>
           </a:p>
         </p:txBody>
       </p:sp>
@@ -551,38 +1001,37 @@
           <a:p>
             <a:pPr lvl="0"/>
             <a:r>
-              <a:rPr lang="pt-BR" smtClean="0"/>
+              <a:rPr lang="pt-BR"/>
               <a:t>Clique para editar o texto mestre</a:t>
             </a:r>
           </a:p>
           <a:p>
             <a:pPr lvl="1"/>
             <a:r>
-              <a:rPr lang="pt-BR" smtClean="0"/>
+              <a:rPr lang="pt-BR"/>
               <a:t>Segundo nível</a:t>
             </a:r>
           </a:p>
           <a:p>
             <a:pPr lvl="2"/>
             <a:r>
-              <a:rPr lang="pt-BR" smtClean="0"/>
+              <a:rPr lang="pt-BR"/>
               <a:t>Terceiro nível</a:t>
             </a:r>
           </a:p>
           <a:p>
             <a:pPr lvl="3"/>
             <a:r>
-              <a:rPr lang="pt-BR" smtClean="0"/>
+              <a:rPr lang="pt-BR"/>
               <a:t>Quarto nível</a:t>
             </a:r>
           </a:p>
           <a:p>
             <a:pPr lvl="4"/>
             <a:r>
-              <a:rPr lang="pt-BR" smtClean="0"/>
+              <a:rPr lang="pt-BR"/>
               <a:t>Quinto nível</a:t>
             </a:r>
-            <a:endParaRPr lang="pt-BR"/>
           </a:p>
         </p:txBody>
       </p:sp>
@@ -645,7 +1094,7 @@
           <a:p>
             <a:fld id="{1D74CD81-846E-42DB-BD4B-54247C8E2E62}" type="slidenum">
               <a:rPr lang="pt-BR" smtClean="0"/>
-              <a:t>‹nº›</a:t>
+              <a:t>‹#›</a:t>
             </a:fld>
             <a:endParaRPr lang="pt-BR"/>
           </a:p>
@@ -697,10 +1146,9 @@
           <a:lstStyle/>
           <a:p>
             <a:r>
-              <a:rPr lang="pt-BR" smtClean="0"/>
+              <a:rPr lang="pt-BR"/>
               <a:t>Clique para editar o título mestre</a:t>
             </a:r>
-            <a:endParaRPr lang="pt-BR"/>
           </a:p>
         </p:txBody>
       </p:sp>
@@ -721,38 +1169,37 @@
           <a:p>
             <a:pPr lvl="0"/>
             <a:r>
-              <a:rPr lang="pt-BR" smtClean="0"/>
+              <a:rPr lang="pt-BR"/>
               <a:t>Clique para editar o texto mestre</a:t>
             </a:r>
           </a:p>
           <a:p>
             <a:pPr lvl="1"/>
             <a:r>
-              <a:rPr lang="pt-BR" smtClean="0"/>
+              <a:rPr lang="pt-BR"/>
               <a:t>Segundo nível</a:t>
             </a:r>
           </a:p>
           <a:p>
             <a:pPr lvl="2"/>
             <a:r>
-              <a:rPr lang="pt-BR" smtClean="0"/>
+              <a:rPr lang="pt-BR"/>
               <a:t>Terceiro nível</a:t>
             </a:r>
           </a:p>
           <a:p>
             <a:pPr lvl="3"/>
             <a:r>
-              <a:rPr lang="pt-BR" smtClean="0"/>
+              <a:rPr lang="pt-BR"/>
               <a:t>Quarto nível</a:t>
             </a:r>
           </a:p>
           <a:p>
             <a:pPr lvl="4"/>
             <a:r>
-              <a:rPr lang="pt-BR" smtClean="0"/>
+              <a:rPr lang="pt-BR"/>
               <a:t>Quinto nível</a:t>
             </a:r>
-            <a:endParaRPr lang="pt-BR"/>
           </a:p>
         </p:txBody>
       </p:sp>
@@ -815,7 +1262,7 @@
           <a:p>
             <a:fld id="{1D74CD81-846E-42DB-BD4B-54247C8E2E62}" type="slidenum">
               <a:rPr lang="pt-BR" smtClean="0"/>
-              <a:t>‹nº›</a:t>
+              <a:t>‹#›</a:t>
             </a:fld>
             <a:endParaRPr lang="pt-BR"/>
           </a:p>
@@ -876,10 +1323,9 @@
           </a:lstStyle>
           <a:p>
             <a:r>
-              <a:rPr lang="pt-BR" smtClean="0"/>
+              <a:rPr lang="pt-BR"/>
               <a:t>Clique para editar o título mestre</a:t>
             </a:r>
-            <a:endParaRPr lang="pt-BR"/>
           </a:p>
         </p:txBody>
       </p:sp>
@@ -996,7 +1442,7 @@
           <a:p>
             <a:pPr lvl="0"/>
             <a:r>
-              <a:rPr lang="pt-BR" smtClean="0"/>
+              <a:rPr lang="pt-BR"/>
               <a:t>Clique para editar o texto mestre</a:t>
             </a:r>
           </a:p>
@@ -1061,7 +1507,7 @@
           <a:p>
             <a:fld id="{1D74CD81-846E-42DB-BD4B-54247C8E2E62}" type="slidenum">
               <a:rPr lang="pt-BR" smtClean="0"/>
-              <a:t>‹nº›</a:t>
+              <a:t>‹#›</a:t>
             </a:fld>
             <a:endParaRPr lang="pt-BR"/>
           </a:p>
@@ -1113,10 +1559,9 @@
           <a:lstStyle/>
           <a:p>
             <a:r>
-              <a:rPr lang="pt-BR" smtClean="0"/>
+              <a:rPr lang="pt-BR"/>
               <a:t>Clique para editar o título mestre</a:t>
             </a:r>
-            <a:endParaRPr lang="pt-BR"/>
           </a:p>
         </p:txBody>
       </p:sp>
@@ -1142,38 +1587,37 @@
           <a:p>
             <a:pPr lvl="0"/>
             <a:r>
-              <a:rPr lang="pt-BR" smtClean="0"/>
+              <a:rPr lang="pt-BR"/>
               <a:t>Clique para editar o texto mestre</a:t>
             </a:r>
           </a:p>
           <a:p>
             <a:pPr lvl="1"/>
             <a:r>
-              <a:rPr lang="pt-BR" smtClean="0"/>
+              <a:rPr lang="pt-BR"/>
               <a:t>Segundo nível</a:t>
             </a:r>
           </a:p>
           <a:p>
             <a:pPr lvl="2"/>
             <a:r>
-              <a:rPr lang="pt-BR" smtClean="0"/>
+              <a:rPr lang="pt-BR"/>
               <a:t>Terceiro nível</a:t>
             </a:r>
           </a:p>
           <a:p>
             <a:pPr lvl="3"/>
             <a:r>
-              <a:rPr lang="pt-BR" smtClean="0"/>
+              <a:rPr lang="pt-BR"/>
               <a:t>Quarto nível</a:t>
             </a:r>
           </a:p>
           <a:p>
             <a:pPr lvl="4"/>
             <a:r>
-              <a:rPr lang="pt-BR" smtClean="0"/>
+              <a:rPr lang="pt-BR"/>
               <a:t>Quinto nível</a:t>
             </a:r>
-            <a:endParaRPr lang="pt-BR"/>
           </a:p>
         </p:txBody>
       </p:sp>
@@ -1199,38 +1643,37 @@
           <a:p>
             <a:pPr lvl="0"/>
             <a:r>
-              <a:rPr lang="pt-BR" smtClean="0"/>
+              <a:rPr lang="pt-BR"/>
               <a:t>Clique para editar o texto mestre</a:t>
             </a:r>
           </a:p>
           <a:p>
             <a:pPr lvl="1"/>
             <a:r>
-              <a:rPr lang="pt-BR" smtClean="0"/>
+              <a:rPr lang="pt-BR"/>
               <a:t>Segundo nível</a:t>
             </a:r>
           </a:p>
           <a:p>
             <a:pPr lvl="2"/>
             <a:r>
-              <a:rPr lang="pt-BR" smtClean="0"/>
+              <a:rPr lang="pt-BR"/>
               <a:t>Terceiro nível</a:t>
             </a:r>
           </a:p>
           <a:p>
             <a:pPr lvl="3"/>
             <a:r>
-              <a:rPr lang="pt-BR" smtClean="0"/>
+              <a:rPr lang="pt-BR"/>
               <a:t>Quarto nível</a:t>
             </a:r>
           </a:p>
           <a:p>
             <a:pPr lvl="4"/>
             <a:r>
-              <a:rPr lang="pt-BR" smtClean="0"/>
+              <a:rPr lang="pt-BR"/>
               <a:t>Quinto nível</a:t>
             </a:r>
-            <a:endParaRPr lang="pt-BR"/>
           </a:p>
         </p:txBody>
       </p:sp>
@@ -1293,7 +1736,7 @@
           <a:p>
             <a:fld id="{1D74CD81-846E-42DB-BD4B-54247C8E2E62}" type="slidenum">
               <a:rPr lang="pt-BR" smtClean="0"/>
-              <a:t>‹nº›</a:t>
+              <a:t>‹#›</a:t>
             </a:fld>
             <a:endParaRPr lang="pt-BR"/>
           </a:p>
@@ -1350,10 +1793,9 @@
           <a:lstStyle/>
           <a:p>
             <a:r>
-              <a:rPr lang="pt-BR" smtClean="0"/>
+              <a:rPr lang="pt-BR"/>
               <a:t>Clique para editar o título mestre</a:t>
             </a:r>
-            <a:endParaRPr lang="pt-BR"/>
           </a:p>
         </p:txBody>
       </p:sp>
@@ -1416,7 +1858,7 @@
           <a:p>
             <a:pPr lvl="0"/>
             <a:r>
-              <a:rPr lang="pt-BR" smtClean="0"/>
+              <a:rPr lang="pt-BR"/>
               <a:t>Clique para editar o texto mestre</a:t>
             </a:r>
           </a:p>
@@ -1444,38 +1886,37 @@
           <a:p>
             <a:pPr lvl="0"/>
             <a:r>
-              <a:rPr lang="pt-BR" smtClean="0"/>
+              <a:rPr lang="pt-BR"/>
               <a:t>Clique para editar o texto mestre</a:t>
             </a:r>
           </a:p>
           <a:p>
             <a:pPr lvl="1"/>
             <a:r>
-              <a:rPr lang="pt-BR" smtClean="0"/>
+              <a:rPr lang="pt-BR"/>
               <a:t>Segundo nível</a:t>
             </a:r>
           </a:p>
           <a:p>
             <a:pPr lvl="2"/>
             <a:r>
-              <a:rPr lang="pt-BR" smtClean="0"/>
+              <a:rPr lang="pt-BR"/>
               <a:t>Terceiro nível</a:t>
             </a:r>
           </a:p>
           <a:p>
             <a:pPr lvl="3"/>
             <a:r>
-              <a:rPr lang="pt-BR" smtClean="0"/>
+              <a:rPr lang="pt-BR"/>
               <a:t>Quarto nível</a:t>
             </a:r>
           </a:p>
           <a:p>
             <a:pPr lvl="4"/>
             <a:r>
-              <a:rPr lang="pt-BR" smtClean="0"/>
+              <a:rPr lang="pt-BR"/>
               <a:t>Quinto nível</a:t>
             </a:r>
-            <a:endParaRPr lang="pt-BR"/>
           </a:p>
         </p:txBody>
       </p:sp>
@@ -1538,7 +1979,7 @@
           <a:p>
             <a:pPr lvl="0"/>
             <a:r>
-              <a:rPr lang="pt-BR" smtClean="0"/>
+              <a:rPr lang="pt-BR"/>
               <a:t>Clique para editar o texto mestre</a:t>
             </a:r>
           </a:p>
@@ -1566,38 +2007,37 @@
           <a:p>
             <a:pPr lvl="0"/>
             <a:r>
-              <a:rPr lang="pt-BR" smtClean="0"/>
+              <a:rPr lang="pt-BR"/>
               <a:t>Clique para editar o texto mestre</a:t>
             </a:r>
           </a:p>
           <a:p>
             <a:pPr lvl="1"/>
             <a:r>
-              <a:rPr lang="pt-BR" smtClean="0"/>
+              <a:rPr lang="pt-BR"/>
               <a:t>Segundo nível</a:t>
             </a:r>
           </a:p>
           <a:p>
             <a:pPr lvl="2"/>
             <a:r>
-              <a:rPr lang="pt-BR" smtClean="0"/>
+              <a:rPr lang="pt-BR"/>
               <a:t>Terceiro nível</a:t>
             </a:r>
           </a:p>
           <a:p>
             <a:pPr lvl="3"/>
             <a:r>
-              <a:rPr lang="pt-BR" smtClean="0"/>
+              <a:rPr lang="pt-BR"/>
               <a:t>Quarto nível</a:t>
             </a:r>
           </a:p>
           <a:p>
             <a:pPr lvl="4"/>
             <a:r>
-              <a:rPr lang="pt-BR" smtClean="0"/>
+              <a:rPr lang="pt-BR"/>
               <a:t>Quinto nível</a:t>
             </a:r>
-            <a:endParaRPr lang="pt-BR"/>
           </a:p>
         </p:txBody>
       </p:sp>
@@ -1660,7 +2100,7 @@
           <a:p>
             <a:fld id="{1D74CD81-846E-42DB-BD4B-54247C8E2E62}" type="slidenum">
               <a:rPr lang="pt-BR" smtClean="0"/>
-              <a:t>‹nº›</a:t>
+              <a:t>‹#›</a:t>
             </a:fld>
             <a:endParaRPr lang="pt-BR"/>
           </a:p>
@@ -1712,10 +2152,9 @@
           <a:lstStyle/>
           <a:p>
             <a:r>
-              <a:rPr lang="pt-BR" smtClean="0"/>
+              <a:rPr lang="pt-BR"/>
               <a:t>Clique para editar o título mestre</a:t>
             </a:r>
-            <a:endParaRPr lang="pt-BR"/>
           </a:p>
         </p:txBody>
       </p:sp>
@@ -1778,7 +2217,7 @@
           <a:p>
             <a:fld id="{1D74CD81-846E-42DB-BD4B-54247C8E2E62}" type="slidenum">
               <a:rPr lang="pt-BR" smtClean="0"/>
-              <a:t>‹nº›</a:t>
+              <a:t>‹#›</a:t>
             </a:fld>
             <a:endParaRPr lang="pt-BR"/>
           </a:p>
@@ -1873,7 +2312,7 @@
           <a:p>
             <a:fld id="{1D74CD81-846E-42DB-BD4B-54247C8E2E62}" type="slidenum">
               <a:rPr lang="pt-BR" smtClean="0"/>
-              <a:t>‹nº›</a:t>
+              <a:t>‹#›</a:t>
             </a:fld>
             <a:endParaRPr lang="pt-BR"/>
           </a:p>
@@ -1934,10 +2373,9 @@
           </a:lstStyle>
           <a:p>
             <a:r>
-              <a:rPr lang="pt-BR" smtClean="0"/>
+              <a:rPr lang="pt-BR"/>
               <a:t>Clique para editar o título mestre</a:t>
             </a:r>
-            <a:endParaRPr lang="pt-BR"/>
           </a:p>
         </p:txBody>
       </p:sp>
@@ -1991,38 +2429,37 @@
           <a:p>
             <a:pPr lvl="0"/>
             <a:r>
-              <a:rPr lang="pt-BR" smtClean="0"/>
+              <a:rPr lang="pt-BR"/>
               <a:t>Clique para editar o texto mestre</a:t>
             </a:r>
           </a:p>
           <a:p>
             <a:pPr lvl="1"/>
             <a:r>
-              <a:rPr lang="pt-BR" smtClean="0"/>
+              <a:rPr lang="pt-BR"/>
               <a:t>Segundo nível</a:t>
             </a:r>
           </a:p>
           <a:p>
             <a:pPr lvl="2"/>
             <a:r>
-              <a:rPr lang="pt-BR" smtClean="0"/>
+              <a:rPr lang="pt-BR"/>
               <a:t>Terceiro nível</a:t>
             </a:r>
           </a:p>
           <a:p>
             <a:pPr lvl="3"/>
             <a:r>
-              <a:rPr lang="pt-BR" smtClean="0"/>
+              <a:rPr lang="pt-BR"/>
               <a:t>Quarto nível</a:t>
             </a:r>
           </a:p>
           <a:p>
             <a:pPr lvl="4"/>
             <a:r>
-              <a:rPr lang="pt-BR" smtClean="0"/>
+              <a:rPr lang="pt-BR"/>
               <a:t>Quinto nível</a:t>
             </a:r>
-            <a:endParaRPr lang="pt-BR"/>
           </a:p>
         </p:txBody>
       </p:sp>
@@ -2085,7 +2522,7 @@
           <a:p>
             <a:pPr lvl="0"/>
             <a:r>
-              <a:rPr lang="pt-BR" smtClean="0"/>
+              <a:rPr lang="pt-BR"/>
               <a:t>Clique para editar o texto mestre</a:t>
             </a:r>
           </a:p>
@@ -2150,7 +2587,7 @@
           <a:p>
             <a:fld id="{1D74CD81-846E-42DB-BD4B-54247C8E2E62}" type="slidenum">
               <a:rPr lang="pt-BR" smtClean="0"/>
-              <a:t>‹nº›</a:t>
+              <a:t>‹#›</a:t>
             </a:fld>
             <a:endParaRPr lang="pt-BR"/>
           </a:p>
@@ -2211,10 +2648,9 @@
           </a:lstStyle>
           <a:p>
             <a:r>
-              <a:rPr lang="pt-BR" smtClean="0"/>
+              <a:rPr lang="pt-BR"/>
               <a:t>Clique para editar o título mestre</a:t>
             </a:r>
-            <a:endParaRPr lang="pt-BR"/>
           </a:p>
         </p:txBody>
       </p:sp>
@@ -2338,7 +2774,7 @@
           <a:p>
             <a:pPr lvl="0"/>
             <a:r>
-              <a:rPr lang="pt-BR" smtClean="0"/>
+              <a:rPr lang="pt-BR"/>
               <a:t>Clique para editar o texto mestre</a:t>
             </a:r>
           </a:p>
@@ -2403,7 +2839,7 @@
           <a:p>
             <a:fld id="{1D74CD81-846E-42DB-BD4B-54247C8E2E62}" type="slidenum">
               <a:rPr lang="pt-BR" smtClean="0"/>
-              <a:t>‹nº›</a:t>
+              <a:t>‹#›</a:t>
             </a:fld>
             <a:endParaRPr lang="pt-BR"/>
           </a:p>
@@ -2470,10 +2906,9 @@
           <a:lstStyle/>
           <a:p>
             <a:r>
-              <a:rPr lang="pt-BR" smtClean="0"/>
+              <a:rPr lang="pt-BR"/>
               <a:t>Clique para editar o título mestre</a:t>
             </a:r>
-            <a:endParaRPr lang="pt-BR"/>
           </a:p>
         </p:txBody>
       </p:sp>
@@ -2504,38 +2939,37 @@
           <a:p>
             <a:pPr lvl="0"/>
             <a:r>
-              <a:rPr lang="pt-BR" smtClean="0"/>
+              <a:rPr lang="pt-BR"/>
               <a:t>Clique para editar o texto mestre</a:t>
             </a:r>
           </a:p>
           <a:p>
             <a:pPr lvl="1"/>
             <a:r>
-              <a:rPr lang="pt-BR" smtClean="0"/>
+              <a:rPr lang="pt-BR"/>
               <a:t>Segundo nível</a:t>
             </a:r>
           </a:p>
           <a:p>
             <a:pPr lvl="2"/>
             <a:r>
-              <a:rPr lang="pt-BR" smtClean="0"/>
+              <a:rPr lang="pt-BR"/>
               <a:t>Terceiro nível</a:t>
             </a:r>
           </a:p>
           <a:p>
             <a:pPr lvl="3"/>
             <a:r>
-              <a:rPr lang="pt-BR" smtClean="0"/>
+              <a:rPr lang="pt-BR"/>
               <a:t>Quarto nível</a:t>
             </a:r>
           </a:p>
           <a:p>
             <a:pPr lvl="4"/>
             <a:r>
-              <a:rPr lang="pt-BR" smtClean="0"/>
+              <a:rPr lang="pt-BR"/>
               <a:t>Quinto nível</a:t>
             </a:r>
-            <a:endParaRPr lang="pt-BR"/>
           </a:p>
         </p:txBody>
       </p:sp>
@@ -2652,7 +3086,7 @@
           <a:p>
             <a:fld id="{1D74CD81-846E-42DB-BD4B-54247C8E2E62}" type="slidenum">
               <a:rPr lang="pt-BR" smtClean="0"/>
-              <a:t>‹nº›</a:t>
+              <a:t>‹#›</a:t>
             </a:fld>
             <a:endParaRPr lang="pt-BR"/>
           </a:p>
@@ -2979,6 +3413,36 @@
           <a:chExt cx="0" cy="0"/>
         </a:xfrm>
       </p:grpSpPr>
+      <p:pic>
+        <p:nvPicPr>
+          <p:cNvPr id="4" name="Picture 3">
+            <a:extLst>
+              <a:ext uri="{FF2B5EF4-FFF2-40B4-BE49-F238E27FC236}">
+                <a16:creationId xmlns:a16="http://schemas.microsoft.com/office/drawing/2014/main" id="{D0B08CBF-2C69-4E4F-8975-61CBFAE2A12C}"/>
+              </a:ext>
+            </a:extLst>
+          </p:cNvPr>
+          <p:cNvPicPr>
+            <a:picLocks noChangeAspect="1"/>
+          </p:cNvPicPr>
+          <p:nvPr/>
+        </p:nvPicPr>
+        <p:blipFill>
+          <a:blip r:embed="rId2"/>
+          <a:stretch>
+            <a:fillRect/>
+          </a:stretch>
+        </p:blipFill>
+        <p:spPr>
+          <a:xfrm>
+            <a:off x="4965661" y="2362259"/>
+            <a:ext cx="5467676" cy="3491879"/>
+          </a:xfrm>
+          <a:prstGeom prst="rect">
+            <a:avLst/>
+          </a:prstGeom>
+        </p:spPr>
+      </p:pic>
       <p:sp>
         <p:nvSpPr>
           <p:cNvPr id="2" name="Título 1"/>
@@ -2989,20 +3453,20 @@
             <p:ph type="ctrTitle"/>
           </p:nvPr>
         </p:nvSpPr>
-        <p:spPr/>
+        <p:spPr>
+          <a:xfrm>
+            <a:off x="2022764" y="947986"/>
+            <a:ext cx="5514109" cy="2387600"/>
+          </a:xfrm>
+        </p:spPr>
         <p:txBody>
           <a:bodyPr/>
           <a:lstStyle/>
           <a:p>
             <a:r>
-              <a:rPr lang="pt-BR" dirty="0" smtClean="0"/>
-              <a:t>Projeto de </a:t>
-            </a:r>
-            <a:r>
-              <a:rPr lang="pt-BR" dirty="0" err="1" smtClean="0"/>
-              <a:t>BigData</a:t>
-            </a:r>
-            <a:endParaRPr lang="pt-BR" dirty="0"/>
+              <a:rPr lang="pt-BR" dirty="0"/>
+              <a:t>Projeto de   </a:t>
+            </a:r>
           </a:p>
         </p:txBody>
       </p:sp>
@@ -3016,39 +3480,39 @@
             <p:ph type="subTitle" idx="1"/>
           </p:nvPr>
         </p:nvSpPr>
-        <p:spPr/>
+        <p:spPr>
+          <a:xfrm>
+            <a:off x="623455" y="3731347"/>
+            <a:ext cx="4342206" cy="1655762"/>
+          </a:xfrm>
+        </p:spPr>
         <p:txBody>
           <a:bodyPr/>
           <a:lstStyle/>
           <a:p>
             <a:pPr algn="r"/>
             <a:r>
-              <a:rPr lang="pt-BR" dirty="0" smtClean="0"/>
-              <a:t>Julio </a:t>
-            </a:r>
-            <a:r>
-              <a:rPr lang="pt-BR" dirty="0" smtClean="0"/>
-              <a:t>Sales</a:t>
+              <a:rPr lang="pt-BR" dirty="0"/>
+              <a:t>Julio Sales</a:t>
             </a:r>
           </a:p>
           <a:p>
             <a:pPr algn="r"/>
             <a:r>
-              <a:rPr lang="pt-BR" dirty="0" err="1" smtClean="0"/>
+              <a:rPr lang="pt-BR" dirty="0" err="1"/>
               <a:t>Mácio</a:t>
             </a:r>
             <a:r>
-              <a:rPr lang="pt-BR" dirty="0" smtClean="0"/>
+              <a:rPr lang="pt-BR" dirty="0"/>
               <a:t> Matheus</a:t>
             </a:r>
           </a:p>
           <a:p>
             <a:pPr algn="r"/>
             <a:r>
-              <a:rPr lang="pt-BR" dirty="0" smtClean="0"/>
+              <a:rPr lang="pt-BR" dirty="0"/>
               <a:t>Victor Outtes</a:t>
             </a:r>
-            <a:endParaRPr lang="pt-BR" dirty="0"/>
           </a:p>
         </p:txBody>
       </p:sp>
@@ -3062,13 +3526,6 @@
   <p:clrMapOvr>
     <a:masterClrMapping/>
   </p:clrMapOvr>
-  <p:timing>
-    <p:tnLst>
-      <p:par>
-        <p:cTn id="1" dur="indefinite" restart="never" nodeType="tmRoot"/>
-      </p:par>
-    </p:tnLst>
-  </p:timing>
 </p:sld>
 </file>
 
@@ -3099,16 +3556,1793 @@
             <p:ph type="title"/>
           </p:nvPr>
         </p:nvSpPr>
+        <p:spPr>
+          <a:xfrm>
+            <a:off x="838200" y="365125"/>
+            <a:ext cx="10515600" cy="1218015"/>
+          </a:xfrm>
+        </p:spPr>
+        <p:txBody>
+          <a:bodyPr>
+            <a:normAutofit fontScale="90000"/>
+          </a:bodyPr>
+          <a:lstStyle/>
+          <a:p>
+            <a:r>
+              <a:rPr lang="pt-BR" dirty="0"/>
+              <a:t>Priorização na manutenção de estruturas de linhas de transmissão</a:t>
+            </a:r>
+          </a:p>
+        </p:txBody>
+      </p:sp>
+      <p:pic>
+        <p:nvPicPr>
+          <p:cNvPr id="4" name="Imagem 3"/>
+          <p:cNvPicPr>
+            <a:picLocks noChangeAspect="1"/>
+          </p:cNvPicPr>
+          <p:nvPr/>
+        </p:nvPicPr>
+        <p:blipFill>
+          <a:blip r:embed="rId2"/>
+          <a:stretch>
+            <a:fillRect/>
+          </a:stretch>
+        </p:blipFill>
+        <p:spPr>
+          <a:xfrm>
+            <a:off x="838200" y="1583141"/>
+            <a:ext cx="10982325" cy="1023582"/>
+          </a:xfrm>
+          <a:prstGeom prst="rect">
+            <a:avLst/>
+          </a:prstGeom>
+        </p:spPr>
+      </p:pic>
+      <p:pic>
+        <p:nvPicPr>
+          <p:cNvPr id="6" name="Imagem 5"/>
+          <p:cNvPicPr>
+            <a:picLocks noChangeAspect="1"/>
+          </p:cNvPicPr>
+          <p:nvPr/>
+        </p:nvPicPr>
+        <p:blipFill>
+          <a:blip r:embed="rId3"/>
+          <a:stretch>
+            <a:fillRect/>
+          </a:stretch>
+        </p:blipFill>
+        <p:spPr>
+          <a:xfrm>
+            <a:off x="942975" y="2606723"/>
+            <a:ext cx="10877550" cy="981075"/>
+          </a:xfrm>
+          <a:prstGeom prst="rect">
+            <a:avLst/>
+          </a:prstGeom>
+        </p:spPr>
+      </p:pic>
+      <p:pic>
+        <p:nvPicPr>
+          <p:cNvPr id="7" name="Imagem 6"/>
+          <p:cNvPicPr>
+            <a:picLocks noChangeAspect="1"/>
+          </p:cNvPicPr>
+          <p:nvPr/>
+        </p:nvPicPr>
+        <p:blipFill>
+          <a:blip r:embed="rId4"/>
+          <a:stretch>
+            <a:fillRect/>
+          </a:stretch>
+        </p:blipFill>
+        <p:spPr>
+          <a:xfrm>
+            <a:off x="914399" y="3587798"/>
+            <a:ext cx="10829925" cy="933450"/>
+          </a:xfrm>
+          <a:prstGeom prst="rect">
+            <a:avLst/>
+          </a:prstGeom>
+        </p:spPr>
+      </p:pic>
+      <p:pic>
+        <p:nvPicPr>
+          <p:cNvPr id="8" name="Imagem 7"/>
+          <p:cNvPicPr>
+            <a:picLocks noChangeAspect="1"/>
+          </p:cNvPicPr>
+          <p:nvPr/>
+        </p:nvPicPr>
+        <p:blipFill>
+          <a:blip r:embed="rId5"/>
+          <a:stretch>
+            <a:fillRect/>
+          </a:stretch>
+        </p:blipFill>
+        <p:spPr>
+          <a:xfrm>
+            <a:off x="914399" y="4568873"/>
+            <a:ext cx="10868025" cy="952500"/>
+          </a:xfrm>
+          <a:prstGeom prst="rect">
+            <a:avLst/>
+          </a:prstGeom>
+        </p:spPr>
+      </p:pic>
+      <p:pic>
+        <p:nvPicPr>
+          <p:cNvPr id="9" name="Imagem 8"/>
+          <p:cNvPicPr>
+            <a:picLocks noChangeAspect="1"/>
+          </p:cNvPicPr>
+          <p:nvPr/>
+        </p:nvPicPr>
+        <p:blipFill>
+          <a:blip r:embed="rId6"/>
+          <a:stretch>
+            <a:fillRect/>
+          </a:stretch>
+        </p:blipFill>
+        <p:spPr>
+          <a:xfrm>
+            <a:off x="923924" y="5568998"/>
+            <a:ext cx="10858500" cy="866775"/>
+          </a:xfrm>
+          <a:prstGeom prst="rect">
+            <a:avLst/>
+          </a:prstGeom>
+        </p:spPr>
+      </p:pic>
+      <p:sp>
+        <p:nvSpPr>
+          <p:cNvPr id="10" name="Retângulo 9"/>
+          <p:cNvSpPr/>
+          <p:nvPr/>
+        </p:nvSpPr>
+        <p:spPr>
+          <a:xfrm>
+            <a:off x="10590663" y="1671707"/>
+            <a:ext cx="1446662" cy="4879217"/>
+          </a:xfrm>
+          <a:prstGeom prst="rect">
+            <a:avLst/>
+          </a:prstGeom>
+          <a:noFill/>
+          <a:ln w="38100">
+            <a:solidFill>
+              <a:srgbClr val="FF0000"/>
+            </a:solidFill>
+          </a:ln>
+        </p:spPr>
+        <p:style>
+          <a:lnRef idx="2">
+            <a:schemeClr val="accent1">
+              <a:shade val="50000"/>
+            </a:schemeClr>
+          </a:lnRef>
+          <a:fillRef idx="1">
+            <a:schemeClr val="accent1"/>
+          </a:fillRef>
+          <a:effectRef idx="0">
+            <a:schemeClr val="accent1"/>
+          </a:effectRef>
+          <a:fontRef idx="minor">
+            <a:schemeClr val="lt1"/>
+          </a:fontRef>
+        </p:style>
+        <p:txBody>
+          <a:bodyPr rtlCol="0" anchor="ctr"/>
+          <a:lstStyle/>
+          <a:p>
+            <a:pPr algn="ctr"/>
+            <a:endParaRPr lang="pt-BR"/>
+          </a:p>
+        </p:txBody>
+      </p:sp>
+    </p:spTree>
+    <p:extLst>
+      <p:ext uri="{BB962C8B-B14F-4D97-AF65-F5344CB8AC3E}">
+        <p14:creationId xmlns:p14="http://schemas.microsoft.com/office/powerpoint/2010/main" val="4098655666"/>
+      </p:ext>
+    </p:extLst>
+  </p:cSld>
+  <p:clrMapOvr>
+    <a:masterClrMapping/>
+  </p:clrMapOvr>
+</p:sld>
+</file>
+
+<file path=ppt/slides/slide11.xml><?xml version="1.0" encoding="utf-8"?>
+<p:sld xmlns:a="http://schemas.openxmlformats.org/drawingml/2006/main" xmlns:r="http://schemas.openxmlformats.org/officeDocument/2006/relationships" xmlns:p="http://schemas.openxmlformats.org/presentationml/2006/main">
+  <p:cSld>
+    <p:spTree>
+      <p:nvGrpSpPr>
+        <p:cNvPr id="1" name=""/>
+        <p:cNvGrpSpPr/>
+        <p:nvPr/>
+      </p:nvGrpSpPr>
+      <p:grpSpPr>
+        <a:xfrm>
+          <a:off x="0" y="0"/>
+          <a:ext cx="0" cy="0"/>
+          <a:chOff x="0" y="0"/>
+          <a:chExt cx="0" cy="0"/>
+        </a:xfrm>
+      </p:grpSpPr>
+      <p:sp>
+        <p:nvSpPr>
+          <p:cNvPr id="2" name="Título 1"/>
+          <p:cNvSpPr>
+            <a:spLocks noGrp="1"/>
+          </p:cNvSpPr>
+          <p:nvPr>
+            <p:ph type="title"/>
+          </p:nvPr>
+        </p:nvSpPr>
         <p:spPr/>
         <p:txBody>
           <a:bodyPr/>
           <a:lstStyle/>
           <a:p>
             <a:r>
-              <a:rPr lang="pt-BR" dirty="0" smtClean="0"/>
+              <a:rPr lang="pt-BR" dirty="0"/>
+              <a:t>Detecção de fraudes em operações de cartão de crédito</a:t>
+            </a:r>
+          </a:p>
+        </p:txBody>
+      </p:sp>
+      <p:sp>
+        <p:nvSpPr>
+          <p:cNvPr id="3" name="Espaço Reservado para Conteúdo 2"/>
+          <p:cNvSpPr>
+            <a:spLocks noGrp="1"/>
+          </p:cNvSpPr>
+          <p:nvPr>
+            <p:ph idx="1"/>
+          </p:nvPr>
+        </p:nvSpPr>
+        <p:spPr>
+          <a:xfrm>
+            <a:off x="838200" y="1825625"/>
+            <a:ext cx="10515600" cy="2030279"/>
+          </a:xfrm>
+        </p:spPr>
+        <p:txBody>
+          <a:bodyPr>
+            <a:normAutofit fontScale="85000" lnSpcReduction="20000"/>
+          </a:bodyPr>
+          <a:lstStyle/>
+          <a:p>
+            <a:r>
+              <a:rPr lang="pt-BR" dirty="0"/>
+              <a:t>Contexto dos dados</a:t>
+            </a:r>
+          </a:p>
+          <a:p>
+            <a:pPr lvl="1"/>
+            <a:r>
+              <a:rPr lang="pt-BR" dirty="0"/>
+              <a:t>É importante que as empresas de cartão de crédito consigam reconhecer transações fraudulentas, para que os clientes não sejam cobrados por itens que não compraram.</a:t>
+            </a:r>
+          </a:p>
+          <a:p>
+            <a:pPr lvl="1"/>
+            <a:r>
+              <a:rPr lang="pt-BR" dirty="0"/>
+              <a:t>Detalhes sobre o dataset: </a:t>
+            </a:r>
+            <a:r>
+              <a:rPr lang="pt-BR" u="sng" dirty="0">
+                <a:solidFill>
+                  <a:srgbClr val="337AB7"/>
+                </a:solidFill>
+                <a:latin typeface="Helvetica Neue"/>
+                <a:hlinkClick r:id="rId2"/>
+              </a:rPr>
+              <a:t>https://www.kaggle.com/mlg-ulb/creditcardfraud</a:t>
+            </a:r>
+            <a:endParaRPr lang="pt-BR" dirty="0"/>
+          </a:p>
+          <a:p>
+            <a:r>
+              <a:rPr lang="pt-BR" dirty="0"/>
+              <a:t>Dados inseridos no hadoop com o comando haddop –put</a:t>
+            </a:r>
+          </a:p>
+          <a:p>
+            <a:r>
+              <a:rPr lang="pt-BR" dirty="0"/>
+              <a:t>Abaixo podemos ver o dataset dentro do hadoop com o comando hadoop -ls</a:t>
+            </a:r>
+          </a:p>
+        </p:txBody>
+      </p:sp>
+      <p:pic>
+        <p:nvPicPr>
+          <p:cNvPr id="7" name="Picture 6">
+            <a:extLst>
+              <a:ext uri="{FF2B5EF4-FFF2-40B4-BE49-F238E27FC236}">
+                <a16:creationId xmlns:a16="http://schemas.microsoft.com/office/drawing/2014/main" id="{D35EFB7B-5F14-4EEA-8C1F-2C9EA20115B8}"/>
+              </a:ext>
+            </a:extLst>
+          </p:cNvPr>
+          <p:cNvPicPr>
+            <a:picLocks noChangeAspect="1"/>
+          </p:cNvPicPr>
+          <p:nvPr/>
+        </p:nvPicPr>
+        <p:blipFill>
+          <a:blip r:embed="rId3"/>
+          <a:stretch>
+            <a:fillRect/>
+          </a:stretch>
+        </p:blipFill>
+        <p:spPr>
+          <a:xfrm>
+            <a:off x="1140288" y="4531153"/>
+            <a:ext cx="9911424" cy="981792"/>
+          </a:xfrm>
+          <a:prstGeom prst="rect">
+            <a:avLst/>
+          </a:prstGeom>
+        </p:spPr>
+      </p:pic>
+      <p:sp>
+        <p:nvSpPr>
+          <p:cNvPr id="8" name="Rectangle 7">
+            <a:extLst>
+              <a:ext uri="{FF2B5EF4-FFF2-40B4-BE49-F238E27FC236}">
+                <a16:creationId xmlns:a16="http://schemas.microsoft.com/office/drawing/2014/main" id="{2C7FA203-340B-43FD-A82C-1C29153EEAA2}"/>
+              </a:ext>
+            </a:extLst>
+          </p:cNvPr>
+          <p:cNvSpPr/>
+          <p:nvPr/>
+        </p:nvSpPr>
+        <p:spPr>
+          <a:xfrm>
+            <a:off x="1140288" y="4994031"/>
+            <a:ext cx="8580487" cy="267286"/>
+          </a:xfrm>
+          <a:prstGeom prst="rect">
+            <a:avLst/>
+          </a:prstGeom>
+          <a:noFill/>
+          <a:ln>
+            <a:solidFill>
+              <a:schemeClr val="accent2">
+                <a:lumMod val="75000"/>
+              </a:schemeClr>
+            </a:solidFill>
+          </a:ln>
+        </p:spPr>
+        <p:style>
+          <a:lnRef idx="2">
+            <a:schemeClr val="accent1">
+              <a:shade val="50000"/>
+            </a:schemeClr>
+          </a:lnRef>
+          <a:fillRef idx="1">
+            <a:schemeClr val="accent1"/>
+          </a:fillRef>
+          <a:effectRef idx="0">
+            <a:schemeClr val="accent1"/>
+          </a:effectRef>
+          <a:fontRef idx="minor">
+            <a:schemeClr val="lt1"/>
+          </a:fontRef>
+        </p:style>
+        <p:txBody>
+          <a:bodyPr rtlCol="0" anchor="ctr"/>
+          <a:lstStyle/>
+          <a:p>
+            <a:pPr algn="ctr"/>
+            <a:endParaRPr lang="pt-BR"/>
+          </a:p>
+        </p:txBody>
+      </p:sp>
+    </p:spTree>
+    <p:extLst>
+      <p:ext uri="{BB962C8B-B14F-4D97-AF65-F5344CB8AC3E}">
+        <p14:creationId xmlns:p14="http://schemas.microsoft.com/office/powerpoint/2010/main" val="2912055686"/>
+      </p:ext>
+    </p:extLst>
+  </p:cSld>
+  <p:clrMapOvr>
+    <a:masterClrMapping/>
+  </p:clrMapOvr>
+</p:sld>
+</file>
+
+<file path=ppt/slides/slide12.xml><?xml version="1.0" encoding="utf-8"?>
+<p:sld xmlns:a="http://schemas.openxmlformats.org/drawingml/2006/main" xmlns:r="http://schemas.openxmlformats.org/officeDocument/2006/relationships" xmlns:p="http://schemas.openxmlformats.org/presentationml/2006/main">
+  <p:cSld>
+    <p:spTree>
+      <p:nvGrpSpPr>
+        <p:cNvPr id="1" name=""/>
+        <p:cNvGrpSpPr/>
+        <p:nvPr/>
+      </p:nvGrpSpPr>
+      <p:grpSpPr>
+        <a:xfrm>
+          <a:off x="0" y="0"/>
+          <a:ext cx="0" cy="0"/>
+          <a:chOff x="0" y="0"/>
+          <a:chExt cx="0" cy="0"/>
+        </a:xfrm>
+      </p:grpSpPr>
+      <p:sp>
+        <p:nvSpPr>
+          <p:cNvPr id="2" name="Título 1"/>
+          <p:cNvSpPr>
+            <a:spLocks noGrp="1"/>
+          </p:cNvSpPr>
+          <p:nvPr>
+            <p:ph type="title"/>
+          </p:nvPr>
+        </p:nvSpPr>
+        <p:spPr/>
+        <p:txBody>
+          <a:bodyPr/>
+          <a:lstStyle/>
+          <a:p>
+            <a:r>
+              <a:rPr lang="pt-BR" dirty="0"/>
+              <a:t>Detecção de fraudes em operações de cartão de crédito</a:t>
+            </a:r>
+          </a:p>
+        </p:txBody>
+      </p:sp>
+      <p:pic>
+        <p:nvPicPr>
+          <p:cNvPr id="3" name="Picture 2">
+            <a:extLst>
+              <a:ext uri="{FF2B5EF4-FFF2-40B4-BE49-F238E27FC236}">
+                <a16:creationId xmlns:a16="http://schemas.microsoft.com/office/drawing/2014/main" id="{11153B86-C0C6-404D-BAB1-80BF603F5B2F}"/>
+              </a:ext>
+            </a:extLst>
+          </p:cNvPr>
+          <p:cNvPicPr>
+            <a:picLocks noChangeAspect="1"/>
+          </p:cNvPicPr>
+          <p:nvPr/>
+        </p:nvPicPr>
+        <p:blipFill>
+          <a:blip r:embed="rId2"/>
+          <a:stretch>
+            <a:fillRect/>
+          </a:stretch>
+        </p:blipFill>
+        <p:spPr>
+          <a:xfrm>
+            <a:off x="689418" y="2295598"/>
+            <a:ext cx="11286482" cy="2928204"/>
+          </a:xfrm>
+          <a:prstGeom prst="rect">
+            <a:avLst/>
+          </a:prstGeom>
+        </p:spPr>
+      </p:pic>
+      <p:sp>
+        <p:nvSpPr>
+          <p:cNvPr id="8" name="TextBox 7">
+            <a:extLst>
+              <a:ext uri="{FF2B5EF4-FFF2-40B4-BE49-F238E27FC236}">
+                <a16:creationId xmlns:a16="http://schemas.microsoft.com/office/drawing/2014/main" id="{DA246A99-3B4A-499C-9476-F3F4E0882E69}"/>
+              </a:ext>
+            </a:extLst>
+          </p:cNvPr>
+          <p:cNvSpPr txBox="1"/>
+          <p:nvPr/>
+        </p:nvSpPr>
+        <p:spPr>
+          <a:xfrm>
+            <a:off x="696888" y="5828712"/>
+            <a:ext cx="2956244" cy="369332"/>
+          </a:xfrm>
+          <a:prstGeom prst="rect">
+            <a:avLst/>
+          </a:prstGeom>
+          <a:noFill/>
+        </p:spPr>
+        <p:txBody>
+          <a:bodyPr wrap="square" rtlCol="0">
+            <a:spAutoFit/>
+          </a:bodyPr>
+          <a:lstStyle/>
+          <a:p>
+            <a:r>
+              <a:rPr lang="pt-BR" b="1" dirty="0"/>
+              <a:t>Detalhes sobre o dataset</a:t>
+            </a:r>
+          </a:p>
+        </p:txBody>
+      </p:sp>
+    </p:spTree>
+    <p:extLst>
+      <p:ext uri="{BB962C8B-B14F-4D97-AF65-F5344CB8AC3E}">
+        <p14:creationId xmlns:p14="http://schemas.microsoft.com/office/powerpoint/2010/main" val="2714923712"/>
+      </p:ext>
+    </p:extLst>
+  </p:cSld>
+  <p:clrMapOvr>
+    <a:masterClrMapping/>
+  </p:clrMapOvr>
+</p:sld>
+</file>
+
+<file path=ppt/slides/slide13.xml><?xml version="1.0" encoding="utf-8"?>
+<p:sld xmlns:a="http://schemas.openxmlformats.org/drawingml/2006/main" xmlns:r="http://schemas.openxmlformats.org/officeDocument/2006/relationships" xmlns:p="http://schemas.openxmlformats.org/presentationml/2006/main">
+  <p:cSld>
+    <p:spTree>
+      <p:nvGrpSpPr>
+        <p:cNvPr id="1" name=""/>
+        <p:cNvGrpSpPr/>
+        <p:nvPr/>
+      </p:nvGrpSpPr>
+      <p:grpSpPr>
+        <a:xfrm>
+          <a:off x="0" y="0"/>
+          <a:ext cx="0" cy="0"/>
+          <a:chOff x="0" y="0"/>
+          <a:chExt cx="0" cy="0"/>
+        </a:xfrm>
+      </p:grpSpPr>
+      <p:sp>
+        <p:nvSpPr>
+          <p:cNvPr id="2" name="Título 1"/>
+          <p:cNvSpPr>
+            <a:spLocks noGrp="1"/>
+          </p:cNvSpPr>
+          <p:nvPr>
+            <p:ph type="title"/>
+          </p:nvPr>
+        </p:nvSpPr>
+        <p:spPr/>
+        <p:txBody>
+          <a:bodyPr/>
+          <a:lstStyle/>
+          <a:p>
+            <a:r>
+              <a:rPr lang="pt-BR" dirty="0"/>
+              <a:t>Detecção de fraudes em operações de cartão de crédito</a:t>
+            </a:r>
+          </a:p>
+        </p:txBody>
+      </p:sp>
+      <p:pic>
+        <p:nvPicPr>
+          <p:cNvPr id="5" name="Picture 4">
+            <a:extLst>
+              <a:ext uri="{FF2B5EF4-FFF2-40B4-BE49-F238E27FC236}">
+                <a16:creationId xmlns:a16="http://schemas.microsoft.com/office/drawing/2014/main" id="{3442A079-A479-4D18-93E1-A1BC45998E4D}"/>
+              </a:ext>
+            </a:extLst>
+          </p:cNvPr>
+          <p:cNvPicPr>
+            <a:picLocks noChangeAspect="1"/>
+          </p:cNvPicPr>
+          <p:nvPr/>
+        </p:nvPicPr>
+        <p:blipFill>
+          <a:blip r:embed="rId2"/>
+          <a:stretch>
+            <a:fillRect/>
+          </a:stretch>
+        </p:blipFill>
+        <p:spPr>
+          <a:xfrm>
+            <a:off x="652165" y="2131254"/>
+            <a:ext cx="11363623" cy="3242606"/>
+          </a:xfrm>
+          <a:prstGeom prst="rect">
+            <a:avLst/>
+          </a:prstGeom>
+        </p:spPr>
+      </p:pic>
+    </p:spTree>
+    <p:extLst>
+      <p:ext uri="{BB962C8B-B14F-4D97-AF65-F5344CB8AC3E}">
+        <p14:creationId xmlns:p14="http://schemas.microsoft.com/office/powerpoint/2010/main" val="3246501659"/>
+      </p:ext>
+    </p:extLst>
+  </p:cSld>
+  <p:clrMapOvr>
+    <a:masterClrMapping/>
+  </p:clrMapOvr>
+</p:sld>
+</file>
+
+<file path=ppt/slides/slide14.xml><?xml version="1.0" encoding="utf-8"?>
+<p:sld xmlns:a="http://schemas.openxmlformats.org/drawingml/2006/main" xmlns:r="http://schemas.openxmlformats.org/officeDocument/2006/relationships" xmlns:p="http://schemas.openxmlformats.org/presentationml/2006/main">
+  <p:cSld>
+    <p:spTree>
+      <p:nvGrpSpPr>
+        <p:cNvPr id="1" name=""/>
+        <p:cNvGrpSpPr/>
+        <p:nvPr/>
+      </p:nvGrpSpPr>
+      <p:grpSpPr>
+        <a:xfrm>
+          <a:off x="0" y="0"/>
+          <a:ext cx="0" cy="0"/>
+          <a:chOff x="0" y="0"/>
+          <a:chExt cx="0" cy="0"/>
+        </a:xfrm>
+      </p:grpSpPr>
+      <p:sp>
+        <p:nvSpPr>
+          <p:cNvPr id="2" name="Título 1"/>
+          <p:cNvSpPr>
+            <a:spLocks noGrp="1"/>
+          </p:cNvSpPr>
+          <p:nvPr>
+            <p:ph type="title"/>
+          </p:nvPr>
+        </p:nvSpPr>
+        <p:spPr/>
+        <p:txBody>
+          <a:bodyPr/>
+          <a:lstStyle/>
+          <a:p>
+            <a:r>
+              <a:rPr lang="pt-BR" dirty="0"/>
+              <a:t>Detecção de fraudes em operações de cartão de crédito</a:t>
+            </a:r>
+          </a:p>
+        </p:txBody>
+      </p:sp>
+      <p:pic>
+        <p:nvPicPr>
+          <p:cNvPr id="3" name="Picture 2">
+            <a:extLst>
+              <a:ext uri="{FF2B5EF4-FFF2-40B4-BE49-F238E27FC236}">
+                <a16:creationId xmlns:a16="http://schemas.microsoft.com/office/drawing/2014/main" id="{595C47C8-75ED-4305-BD9D-D26196DE2A04}"/>
+              </a:ext>
+            </a:extLst>
+          </p:cNvPr>
+          <p:cNvPicPr>
+            <a:picLocks noChangeAspect="1"/>
+          </p:cNvPicPr>
+          <p:nvPr/>
+        </p:nvPicPr>
+        <p:blipFill>
+          <a:blip r:embed="rId2"/>
+          <a:stretch>
+            <a:fillRect/>
+          </a:stretch>
+        </p:blipFill>
+        <p:spPr>
+          <a:xfrm>
+            <a:off x="838200" y="2173457"/>
+            <a:ext cx="10398152" cy="3101928"/>
+          </a:xfrm>
+          <a:prstGeom prst="rect">
+            <a:avLst/>
+          </a:prstGeom>
+        </p:spPr>
+      </p:pic>
+    </p:spTree>
+    <p:extLst>
+      <p:ext uri="{BB962C8B-B14F-4D97-AF65-F5344CB8AC3E}">
+        <p14:creationId xmlns:p14="http://schemas.microsoft.com/office/powerpoint/2010/main" val="3204867216"/>
+      </p:ext>
+    </p:extLst>
+  </p:cSld>
+  <p:clrMapOvr>
+    <a:masterClrMapping/>
+  </p:clrMapOvr>
+</p:sld>
+</file>
+
+<file path=ppt/slides/slide15.xml><?xml version="1.0" encoding="utf-8"?>
+<p:sld xmlns:a="http://schemas.openxmlformats.org/drawingml/2006/main" xmlns:r="http://schemas.openxmlformats.org/officeDocument/2006/relationships" xmlns:p="http://schemas.openxmlformats.org/presentationml/2006/main">
+  <p:cSld>
+    <p:spTree>
+      <p:nvGrpSpPr>
+        <p:cNvPr id="1" name=""/>
+        <p:cNvGrpSpPr/>
+        <p:nvPr/>
+      </p:nvGrpSpPr>
+      <p:grpSpPr>
+        <a:xfrm>
+          <a:off x="0" y="0"/>
+          <a:ext cx="0" cy="0"/>
+          <a:chOff x="0" y="0"/>
+          <a:chExt cx="0" cy="0"/>
+        </a:xfrm>
+      </p:grpSpPr>
+      <p:sp>
+        <p:nvSpPr>
+          <p:cNvPr id="2" name="Título 1"/>
+          <p:cNvSpPr>
+            <a:spLocks noGrp="1"/>
+          </p:cNvSpPr>
+          <p:nvPr>
+            <p:ph type="title"/>
+          </p:nvPr>
+        </p:nvSpPr>
+        <p:spPr/>
+        <p:txBody>
+          <a:bodyPr/>
+          <a:lstStyle/>
+          <a:p>
+            <a:r>
+              <a:rPr lang="pt-BR" dirty="0"/>
+              <a:t>Detecção de fraudes em operações de cartão de crédito</a:t>
+            </a:r>
+          </a:p>
+        </p:txBody>
+      </p:sp>
+      <p:pic>
+        <p:nvPicPr>
+          <p:cNvPr id="4" name="Picture 3">
+            <a:extLst>
+              <a:ext uri="{FF2B5EF4-FFF2-40B4-BE49-F238E27FC236}">
+                <a16:creationId xmlns:a16="http://schemas.microsoft.com/office/drawing/2014/main" id="{B7176E3D-5257-4393-B380-98CC497E8CFE}"/>
+              </a:ext>
+            </a:extLst>
+          </p:cNvPr>
+          <p:cNvPicPr>
+            <a:picLocks noChangeAspect="1"/>
+          </p:cNvPicPr>
+          <p:nvPr/>
+        </p:nvPicPr>
+        <p:blipFill>
+          <a:blip r:embed="rId2"/>
+          <a:stretch>
+            <a:fillRect/>
+          </a:stretch>
+        </p:blipFill>
+        <p:spPr>
+          <a:xfrm>
+            <a:off x="1012874" y="1690688"/>
+            <a:ext cx="9884898" cy="4617944"/>
+          </a:xfrm>
+          <a:prstGeom prst="rect">
+            <a:avLst/>
+          </a:prstGeom>
+        </p:spPr>
+      </p:pic>
+    </p:spTree>
+    <p:extLst>
+      <p:ext uri="{BB962C8B-B14F-4D97-AF65-F5344CB8AC3E}">
+        <p14:creationId xmlns:p14="http://schemas.microsoft.com/office/powerpoint/2010/main" val="2811689718"/>
+      </p:ext>
+    </p:extLst>
+  </p:cSld>
+  <p:clrMapOvr>
+    <a:masterClrMapping/>
+  </p:clrMapOvr>
+</p:sld>
+</file>
+
+<file path=ppt/slides/slide16.xml><?xml version="1.0" encoding="utf-8"?>
+<p:sld xmlns:a="http://schemas.openxmlformats.org/drawingml/2006/main" xmlns:r="http://schemas.openxmlformats.org/officeDocument/2006/relationships" xmlns:p="http://schemas.openxmlformats.org/presentationml/2006/main">
+  <p:cSld>
+    <p:spTree>
+      <p:nvGrpSpPr>
+        <p:cNvPr id="1" name=""/>
+        <p:cNvGrpSpPr/>
+        <p:nvPr/>
+      </p:nvGrpSpPr>
+      <p:grpSpPr>
+        <a:xfrm>
+          <a:off x="0" y="0"/>
+          <a:ext cx="0" cy="0"/>
+          <a:chOff x="0" y="0"/>
+          <a:chExt cx="0" cy="0"/>
+        </a:xfrm>
+      </p:grpSpPr>
+      <p:sp>
+        <p:nvSpPr>
+          <p:cNvPr id="2" name="Título 1"/>
+          <p:cNvSpPr>
+            <a:spLocks noGrp="1"/>
+          </p:cNvSpPr>
+          <p:nvPr>
+            <p:ph type="title"/>
+          </p:nvPr>
+        </p:nvSpPr>
+        <p:spPr/>
+        <p:txBody>
+          <a:bodyPr/>
+          <a:lstStyle/>
+          <a:p>
+            <a:r>
+              <a:rPr lang="pt-BR" dirty="0"/>
               <a:t>Previsão de Fechamento das Ações do Google</a:t>
             </a:r>
+          </a:p>
+        </p:txBody>
+      </p:sp>
+      <p:sp>
+        <p:nvSpPr>
+          <p:cNvPr id="3" name="Espaço Reservado para Conteúdo 2"/>
+          <p:cNvSpPr>
+            <a:spLocks noGrp="1"/>
+          </p:cNvSpPr>
+          <p:nvPr>
+            <p:ph idx="1"/>
+          </p:nvPr>
+        </p:nvSpPr>
+        <p:spPr>
+          <a:xfrm>
+            <a:off x="838200" y="1825625"/>
+            <a:ext cx="10515600" cy="2030279"/>
+          </a:xfrm>
+        </p:spPr>
+        <p:txBody>
+          <a:bodyPr/>
+          <a:lstStyle/>
+          <a:p>
+            <a:r>
+              <a:rPr lang="pt-BR" dirty="0"/>
+              <a:t>Série histórica do papel GOOG (</a:t>
+            </a:r>
+            <a:r>
+              <a:rPr lang="pt-BR" dirty="0" err="1"/>
+              <a:t>Alphabet</a:t>
+            </a:r>
+            <a:r>
+              <a:rPr lang="pt-BR" dirty="0"/>
+              <a:t> Inc.)</a:t>
+            </a:r>
+          </a:p>
+          <a:p>
+            <a:pPr lvl="1"/>
+            <a:r>
+              <a:rPr lang="pt-BR" dirty="0">
+                <a:hlinkClick r:id="rId2"/>
+              </a:rPr>
+              <a:t>https://finance.yahoo.com/quote/GOOG/history?p=GOOG</a:t>
+            </a:r>
             <a:endParaRPr lang="pt-BR" dirty="0"/>
+          </a:p>
+          <a:p>
+            <a:r>
+              <a:rPr lang="pt-BR" dirty="0"/>
+              <a:t>Exportação como CSV</a:t>
+            </a:r>
+          </a:p>
+          <a:p>
+            <a:r>
+              <a:rPr lang="pt-BR" dirty="0"/>
+              <a:t>Adicionado no cluster (</a:t>
+            </a:r>
+            <a:r>
+              <a:rPr lang="pt-BR" dirty="0" err="1"/>
+              <a:t>hadoop</a:t>
+            </a:r>
+            <a:r>
+              <a:rPr lang="pt-BR" dirty="0"/>
+              <a:t>)</a:t>
+            </a:r>
+          </a:p>
+          <a:p>
+            <a:pPr marL="0" indent="0">
+              <a:buNone/>
+            </a:pPr>
+            <a:endParaRPr lang="pt-BR" dirty="0"/>
+          </a:p>
+        </p:txBody>
+      </p:sp>
+      <p:pic>
+        <p:nvPicPr>
+          <p:cNvPr id="4" name="Imagem 3"/>
+          <p:cNvPicPr>
+            <a:picLocks noChangeAspect="1"/>
+          </p:cNvPicPr>
+          <p:nvPr/>
+        </p:nvPicPr>
+        <p:blipFill>
+          <a:blip r:embed="rId3"/>
+          <a:stretch>
+            <a:fillRect/>
+          </a:stretch>
+        </p:blipFill>
+        <p:spPr>
+          <a:xfrm>
+            <a:off x="2450104" y="3855904"/>
+            <a:ext cx="7023509" cy="1107310"/>
+          </a:xfrm>
+          <a:prstGeom prst="rect">
+            <a:avLst/>
+          </a:prstGeom>
+        </p:spPr>
+      </p:pic>
+      <p:pic>
+        <p:nvPicPr>
+          <p:cNvPr id="5" name="Imagem 4"/>
+          <p:cNvPicPr>
+            <a:picLocks noChangeAspect="1"/>
+          </p:cNvPicPr>
+          <p:nvPr/>
+        </p:nvPicPr>
+        <p:blipFill>
+          <a:blip r:embed="rId4"/>
+          <a:stretch>
+            <a:fillRect/>
+          </a:stretch>
+        </p:blipFill>
+        <p:spPr>
+          <a:xfrm>
+            <a:off x="1645873" y="5040332"/>
+            <a:ext cx="8642406" cy="1225511"/>
+          </a:xfrm>
+          <a:prstGeom prst="rect">
+            <a:avLst/>
+          </a:prstGeom>
+        </p:spPr>
+      </p:pic>
+      <p:sp>
+        <p:nvSpPr>
+          <p:cNvPr id="6" name="Retângulo 5"/>
+          <p:cNvSpPr/>
+          <p:nvPr/>
+        </p:nvSpPr>
+        <p:spPr>
+          <a:xfrm>
+            <a:off x="1645873" y="5993176"/>
+            <a:ext cx="7332874" cy="272667"/>
+          </a:xfrm>
+          <a:prstGeom prst="rect">
+            <a:avLst/>
+          </a:prstGeom>
+          <a:noFill/>
+          <a:ln w="38100">
+            <a:solidFill>
+              <a:srgbClr val="FF0000"/>
+            </a:solidFill>
+          </a:ln>
+        </p:spPr>
+        <p:style>
+          <a:lnRef idx="2">
+            <a:schemeClr val="accent1">
+              <a:shade val="50000"/>
+            </a:schemeClr>
+          </a:lnRef>
+          <a:fillRef idx="1">
+            <a:schemeClr val="accent1"/>
+          </a:fillRef>
+          <a:effectRef idx="0">
+            <a:schemeClr val="accent1"/>
+          </a:effectRef>
+          <a:fontRef idx="minor">
+            <a:schemeClr val="lt1"/>
+          </a:fontRef>
+        </p:style>
+        <p:txBody>
+          <a:bodyPr rtlCol="0" anchor="ctr"/>
+          <a:lstStyle/>
+          <a:p>
+            <a:pPr algn="ctr"/>
+            <a:endParaRPr lang="pt-BR"/>
+          </a:p>
+        </p:txBody>
+      </p:sp>
+    </p:spTree>
+    <p:extLst>
+      <p:ext uri="{BB962C8B-B14F-4D97-AF65-F5344CB8AC3E}">
+        <p14:creationId xmlns:p14="http://schemas.microsoft.com/office/powerpoint/2010/main" val="3673853666"/>
+      </p:ext>
+    </p:extLst>
+  </p:cSld>
+  <p:clrMapOvr>
+    <a:masterClrMapping/>
+  </p:clrMapOvr>
+</p:sld>
+</file>
+
+<file path=ppt/slides/slide17.xml><?xml version="1.0" encoding="utf-8"?>
+<p:sld xmlns:a="http://schemas.openxmlformats.org/drawingml/2006/main" xmlns:r="http://schemas.openxmlformats.org/officeDocument/2006/relationships" xmlns:p="http://schemas.openxmlformats.org/presentationml/2006/main">
+  <p:cSld>
+    <p:spTree>
+      <p:nvGrpSpPr>
+        <p:cNvPr id="1" name=""/>
+        <p:cNvGrpSpPr/>
+        <p:nvPr/>
+      </p:nvGrpSpPr>
+      <p:grpSpPr>
+        <a:xfrm>
+          <a:off x="0" y="0"/>
+          <a:ext cx="0" cy="0"/>
+          <a:chOff x="0" y="0"/>
+          <a:chExt cx="0" cy="0"/>
+        </a:xfrm>
+      </p:grpSpPr>
+      <p:sp>
+        <p:nvSpPr>
+          <p:cNvPr id="2" name="Título 1"/>
+          <p:cNvSpPr>
+            <a:spLocks noGrp="1"/>
+          </p:cNvSpPr>
+          <p:nvPr>
+            <p:ph type="title"/>
+          </p:nvPr>
+        </p:nvSpPr>
+        <p:spPr/>
+        <p:txBody>
+          <a:bodyPr/>
+          <a:lstStyle/>
+          <a:p>
+            <a:r>
+              <a:rPr lang="pt-BR" dirty="0"/>
+              <a:t>Previsão de Fechamento das Ações do Google</a:t>
+            </a:r>
+          </a:p>
+        </p:txBody>
+      </p:sp>
+      <p:pic>
+        <p:nvPicPr>
+          <p:cNvPr id="4" name="Imagem 3"/>
+          <p:cNvPicPr>
+            <a:picLocks noChangeAspect="1"/>
+          </p:cNvPicPr>
+          <p:nvPr/>
+        </p:nvPicPr>
+        <p:blipFill>
+          <a:blip r:embed="rId2"/>
+          <a:stretch>
+            <a:fillRect/>
+          </a:stretch>
+        </p:blipFill>
+        <p:spPr>
+          <a:xfrm>
+            <a:off x="557065" y="1575412"/>
+            <a:ext cx="11078566" cy="1932829"/>
+          </a:xfrm>
+          <a:prstGeom prst="rect">
+            <a:avLst/>
+          </a:prstGeom>
+        </p:spPr>
+      </p:pic>
+      <p:pic>
+        <p:nvPicPr>
+          <p:cNvPr id="5" name="Imagem 4"/>
+          <p:cNvPicPr>
+            <a:picLocks noChangeAspect="1"/>
+          </p:cNvPicPr>
+          <p:nvPr/>
+        </p:nvPicPr>
+        <p:blipFill>
+          <a:blip r:embed="rId3"/>
+          <a:stretch>
+            <a:fillRect/>
+          </a:stretch>
+        </p:blipFill>
+        <p:spPr>
+          <a:xfrm>
+            <a:off x="557064" y="3756752"/>
+            <a:ext cx="5627129" cy="2462843"/>
+          </a:xfrm>
+          <a:prstGeom prst="rect">
+            <a:avLst/>
+          </a:prstGeom>
+        </p:spPr>
+      </p:pic>
+      <p:pic>
+        <p:nvPicPr>
+          <p:cNvPr id="6" name="Imagem 5"/>
+          <p:cNvPicPr>
+            <a:picLocks noChangeAspect="1"/>
+          </p:cNvPicPr>
+          <p:nvPr/>
+        </p:nvPicPr>
+        <p:blipFill>
+          <a:blip r:embed="rId4"/>
+          <a:stretch>
+            <a:fillRect/>
+          </a:stretch>
+        </p:blipFill>
+        <p:spPr>
+          <a:xfrm>
+            <a:off x="6184193" y="3508241"/>
+            <a:ext cx="4669697" cy="3349759"/>
+          </a:xfrm>
+          <a:prstGeom prst="rect">
+            <a:avLst/>
+          </a:prstGeom>
+        </p:spPr>
+      </p:pic>
+    </p:spTree>
+    <p:extLst>
+      <p:ext uri="{BB962C8B-B14F-4D97-AF65-F5344CB8AC3E}">
+        <p14:creationId xmlns:p14="http://schemas.microsoft.com/office/powerpoint/2010/main" val="688990774"/>
+      </p:ext>
+    </p:extLst>
+  </p:cSld>
+  <p:clrMapOvr>
+    <a:masterClrMapping/>
+  </p:clrMapOvr>
+</p:sld>
+</file>
+
+<file path=ppt/slides/slide18.xml><?xml version="1.0" encoding="utf-8"?>
+<p:sld xmlns:a="http://schemas.openxmlformats.org/drawingml/2006/main" xmlns:r="http://schemas.openxmlformats.org/officeDocument/2006/relationships" xmlns:p="http://schemas.openxmlformats.org/presentationml/2006/main">
+  <p:cSld>
+    <p:spTree>
+      <p:nvGrpSpPr>
+        <p:cNvPr id="1" name=""/>
+        <p:cNvGrpSpPr/>
+        <p:nvPr/>
+      </p:nvGrpSpPr>
+      <p:grpSpPr>
+        <a:xfrm>
+          <a:off x="0" y="0"/>
+          <a:ext cx="0" cy="0"/>
+          <a:chOff x="0" y="0"/>
+          <a:chExt cx="0" cy="0"/>
+        </a:xfrm>
+      </p:grpSpPr>
+      <p:sp>
+        <p:nvSpPr>
+          <p:cNvPr id="2" name="Título 1"/>
+          <p:cNvSpPr>
+            <a:spLocks noGrp="1"/>
+          </p:cNvSpPr>
+          <p:nvPr>
+            <p:ph type="title"/>
+          </p:nvPr>
+        </p:nvSpPr>
+        <p:spPr/>
+        <p:txBody>
+          <a:bodyPr/>
+          <a:lstStyle/>
+          <a:p>
+            <a:r>
+              <a:rPr lang="pt-BR" dirty="0"/>
+              <a:t>Previsão de Fechamento das Ações do Google</a:t>
+            </a:r>
+          </a:p>
+        </p:txBody>
+      </p:sp>
+      <p:pic>
+        <p:nvPicPr>
+          <p:cNvPr id="4" name="Imagem 3"/>
+          <p:cNvPicPr>
+            <a:picLocks noChangeAspect="1"/>
+          </p:cNvPicPr>
+          <p:nvPr/>
+        </p:nvPicPr>
+        <p:blipFill>
+          <a:blip r:embed="rId2"/>
+          <a:stretch>
+            <a:fillRect/>
+          </a:stretch>
+        </p:blipFill>
+        <p:spPr>
+          <a:xfrm>
+            <a:off x="497574" y="1613570"/>
+            <a:ext cx="11196852" cy="4414263"/>
+          </a:xfrm>
+          <a:prstGeom prst="rect">
+            <a:avLst/>
+          </a:prstGeom>
+        </p:spPr>
+      </p:pic>
+      <p:pic>
+        <p:nvPicPr>
+          <p:cNvPr id="5" name="Imagem 4"/>
+          <p:cNvPicPr>
+            <a:picLocks noChangeAspect="1"/>
+          </p:cNvPicPr>
+          <p:nvPr/>
+        </p:nvPicPr>
+        <p:blipFill>
+          <a:blip r:embed="rId3"/>
+          <a:stretch>
+            <a:fillRect/>
+          </a:stretch>
+        </p:blipFill>
+        <p:spPr>
+          <a:xfrm>
+            <a:off x="1916992" y="3459297"/>
+            <a:ext cx="10094628" cy="2661606"/>
+          </a:xfrm>
+          <a:prstGeom prst="rect">
+            <a:avLst/>
+          </a:prstGeom>
+        </p:spPr>
+      </p:pic>
+    </p:spTree>
+    <p:extLst>
+      <p:ext uri="{BB962C8B-B14F-4D97-AF65-F5344CB8AC3E}">
+        <p14:creationId xmlns:p14="http://schemas.microsoft.com/office/powerpoint/2010/main" val="2091938719"/>
+      </p:ext>
+    </p:extLst>
+  </p:cSld>
+  <p:clrMapOvr>
+    <a:masterClrMapping/>
+  </p:clrMapOvr>
+  <p:timing>
+    <p:tnLst>
+      <p:par>
+        <p:cTn id="1" dur="indefinite" restart="never" nodeType="tmRoot">
+          <p:childTnLst>
+            <p:seq concurrent="1" nextAc="seek">
+              <p:cTn id="2" dur="indefinite" nodeType="mainSeq">
+                <p:childTnLst>
+                  <p:par>
+                    <p:cTn id="3" fill="hold">
+                      <p:stCondLst>
+                        <p:cond delay="indefinite"/>
+                      </p:stCondLst>
+                      <p:childTnLst>
+                        <p:par>
+                          <p:cTn id="4" fill="hold">
+                            <p:stCondLst>
+                              <p:cond delay="0"/>
+                            </p:stCondLst>
+                            <p:childTnLst>
+                              <p:par>
+                                <p:cTn id="5" presetID="1" presetClass="entr" presetSubtype="0" fill="hold" nodeType="clickEffect">
+                                  <p:stCondLst>
+                                    <p:cond delay="0"/>
+                                  </p:stCondLst>
+                                  <p:childTnLst>
+                                    <p:set>
+                                      <p:cBhvr>
+                                        <p:cTn id="6" dur="1" fill="hold">
+                                          <p:stCondLst>
+                                            <p:cond delay="0"/>
+                                          </p:stCondLst>
+                                        </p:cTn>
+                                        <p:tgtEl>
+                                          <p:spTgt spid="5"/>
+                                        </p:tgtEl>
+                                        <p:attrNameLst>
+                                          <p:attrName>style.visibility</p:attrName>
+                                        </p:attrNameLst>
+                                      </p:cBhvr>
+                                      <p:to>
+                                        <p:strVal val="visible"/>
+                                      </p:to>
+                                    </p:set>
+                                  </p:childTnLst>
+                                </p:cTn>
+                              </p:par>
+                            </p:childTnLst>
+                          </p:cTn>
+                        </p:par>
+                      </p:childTnLst>
+                    </p:cTn>
+                  </p:par>
+                </p:childTnLst>
+              </p:cTn>
+              <p:prevCondLst>
+                <p:cond evt="onPrev" delay="0">
+                  <p:tgtEl>
+                    <p:sldTgt/>
+                  </p:tgtEl>
+                </p:cond>
+              </p:prevCondLst>
+              <p:nextCondLst>
+                <p:cond evt="onNext" delay="0">
+                  <p:tgtEl>
+                    <p:sldTgt/>
+                  </p:tgtEl>
+                </p:cond>
+              </p:nextCondLst>
+            </p:seq>
+          </p:childTnLst>
+        </p:cTn>
+      </p:par>
+    </p:tnLst>
+  </p:timing>
+</p:sld>
+</file>
+
+<file path=ppt/slides/slide19.xml><?xml version="1.0" encoding="utf-8"?>
+<p:sld xmlns:a="http://schemas.openxmlformats.org/drawingml/2006/main" xmlns:r="http://schemas.openxmlformats.org/officeDocument/2006/relationships" xmlns:p="http://schemas.openxmlformats.org/presentationml/2006/main">
+  <p:cSld>
+    <p:spTree>
+      <p:nvGrpSpPr>
+        <p:cNvPr id="1" name=""/>
+        <p:cNvGrpSpPr/>
+        <p:nvPr/>
+      </p:nvGrpSpPr>
+      <p:grpSpPr>
+        <a:xfrm>
+          <a:off x="0" y="0"/>
+          <a:ext cx="0" cy="0"/>
+          <a:chOff x="0" y="0"/>
+          <a:chExt cx="0" cy="0"/>
+        </a:xfrm>
+      </p:grpSpPr>
+      <p:sp>
+        <p:nvSpPr>
+          <p:cNvPr id="2" name="Título 1"/>
+          <p:cNvSpPr>
+            <a:spLocks noGrp="1"/>
+          </p:cNvSpPr>
+          <p:nvPr>
+            <p:ph type="title"/>
+          </p:nvPr>
+        </p:nvSpPr>
+        <p:spPr/>
+        <p:txBody>
+          <a:bodyPr/>
+          <a:lstStyle/>
+          <a:p>
+            <a:r>
+              <a:rPr lang="pt-BR" dirty="0"/>
+              <a:t>Previsão de Fechamento das Ações do Google</a:t>
+            </a:r>
+          </a:p>
+        </p:txBody>
+      </p:sp>
+      <p:pic>
+        <p:nvPicPr>
+          <p:cNvPr id="4" name="Imagem 3"/>
+          <p:cNvPicPr>
+            <a:picLocks noChangeAspect="1"/>
+          </p:cNvPicPr>
+          <p:nvPr/>
+        </p:nvPicPr>
+        <p:blipFill>
+          <a:blip r:embed="rId2"/>
+          <a:stretch>
+            <a:fillRect/>
+          </a:stretch>
+        </p:blipFill>
+        <p:spPr>
+          <a:xfrm>
+            <a:off x="2916485" y="1849376"/>
+            <a:ext cx="5756518" cy="5008624"/>
+          </a:xfrm>
+          <a:prstGeom prst="rect">
+            <a:avLst/>
+          </a:prstGeom>
+        </p:spPr>
+      </p:pic>
+    </p:spTree>
+    <p:extLst>
+      <p:ext uri="{BB962C8B-B14F-4D97-AF65-F5344CB8AC3E}">
+        <p14:creationId xmlns:p14="http://schemas.microsoft.com/office/powerpoint/2010/main" val="3873556580"/>
+      </p:ext>
+    </p:extLst>
+  </p:cSld>
+  <p:clrMapOvr>
+    <a:masterClrMapping/>
+  </p:clrMapOvr>
+</p:sld>
+</file>
+
+<file path=ppt/slides/slide2.xml><?xml version="1.0" encoding="utf-8"?>
+<p:sld xmlns:a="http://schemas.openxmlformats.org/drawingml/2006/main" xmlns:r="http://schemas.openxmlformats.org/officeDocument/2006/relationships" xmlns:p="http://schemas.openxmlformats.org/presentationml/2006/main">
+  <p:cSld>
+    <p:spTree>
+      <p:nvGrpSpPr>
+        <p:cNvPr id="1" name=""/>
+        <p:cNvGrpSpPr/>
+        <p:nvPr/>
+      </p:nvGrpSpPr>
+      <p:grpSpPr>
+        <a:xfrm>
+          <a:off x="0" y="0"/>
+          <a:ext cx="0" cy="0"/>
+          <a:chOff x="0" y="0"/>
+          <a:chExt cx="0" cy="0"/>
+        </a:xfrm>
+      </p:grpSpPr>
+      <p:sp>
+        <p:nvSpPr>
+          <p:cNvPr id="2" name="Título 1"/>
+          <p:cNvSpPr>
+            <a:spLocks noGrp="1"/>
+          </p:cNvSpPr>
+          <p:nvPr>
+            <p:ph type="title"/>
+          </p:nvPr>
+        </p:nvSpPr>
+        <p:spPr/>
+        <p:txBody>
+          <a:bodyPr/>
+          <a:lstStyle/>
+          <a:p>
+            <a:r>
+              <a:rPr lang="pt-BR" dirty="0"/>
+              <a:t>Roteiro da apresentação</a:t>
+            </a:r>
+          </a:p>
+        </p:txBody>
+      </p:sp>
+      <p:sp>
+        <p:nvSpPr>
+          <p:cNvPr id="3" name="Espaço Reservado para Conteúdo 2"/>
+          <p:cNvSpPr>
+            <a:spLocks noGrp="1"/>
+          </p:cNvSpPr>
+          <p:nvPr>
+            <p:ph idx="1"/>
+          </p:nvPr>
+        </p:nvSpPr>
+        <p:spPr>
+          <a:xfrm>
+            <a:off x="838200" y="1825625"/>
+            <a:ext cx="8970818" cy="1998230"/>
+          </a:xfrm>
+        </p:spPr>
+        <p:txBody>
+          <a:bodyPr>
+            <a:normAutofit fontScale="85000" lnSpcReduction="10000"/>
+          </a:bodyPr>
+          <a:lstStyle/>
+          <a:p>
+            <a:r>
+              <a:rPr lang="pt-BR" dirty="0"/>
+              <a:t>Arquitetura do cluster</a:t>
+            </a:r>
+          </a:p>
+          <a:p>
+            <a:r>
+              <a:rPr lang="pt-BR" dirty="0"/>
+              <a:t>Priorização na manutenção de estruturas de linhas de transmissão </a:t>
+            </a:r>
+            <a:r>
+              <a:rPr lang="pt-BR" sz="2200" dirty="0"/>
+              <a:t>(Clusterização)</a:t>
+            </a:r>
+          </a:p>
+          <a:p>
+            <a:r>
+              <a:rPr lang="pt-BR" dirty="0"/>
+              <a:t>Detecção de fraudes em operações de cartão de crédito </a:t>
+            </a:r>
+            <a:r>
+              <a:rPr lang="pt-BR" sz="2200" dirty="0"/>
+              <a:t>(Classificação)</a:t>
+            </a:r>
+          </a:p>
+          <a:p>
+            <a:r>
+              <a:rPr lang="pt-BR" dirty="0"/>
+              <a:t>Série histórica do papel GOOG (Alphabet Inc.)  </a:t>
+            </a:r>
+            <a:r>
+              <a:rPr lang="pt-BR" sz="2200" dirty="0"/>
+              <a:t>(Regressão)</a:t>
+            </a:r>
+          </a:p>
+          <a:p>
+            <a:pPr marL="0" indent="0">
+              <a:buNone/>
+            </a:pPr>
+            <a:endParaRPr lang="pt-BR" dirty="0"/>
+          </a:p>
+          <a:p>
+            <a:pPr marL="0" indent="0">
+              <a:buNone/>
+            </a:pPr>
+            <a:endParaRPr lang="pt-BR" dirty="0"/>
+          </a:p>
+        </p:txBody>
+      </p:sp>
+      <p:sp>
+        <p:nvSpPr>
+          <p:cNvPr id="7" name="TextBox 6">
+            <a:extLst>
+              <a:ext uri="{FF2B5EF4-FFF2-40B4-BE49-F238E27FC236}">
+                <a16:creationId xmlns:a16="http://schemas.microsoft.com/office/drawing/2014/main" id="{F78CD7E1-1764-4D7B-A72C-537BFD184A2F}"/>
+              </a:ext>
+            </a:extLst>
+          </p:cNvPr>
+          <p:cNvSpPr txBox="1"/>
+          <p:nvPr/>
+        </p:nvSpPr>
+        <p:spPr>
+          <a:xfrm>
+            <a:off x="5106534" y="6378719"/>
+            <a:ext cx="7085466" cy="646331"/>
+          </a:xfrm>
+          <a:prstGeom prst="rect">
+            <a:avLst/>
+          </a:prstGeom>
+          <a:noFill/>
+        </p:spPr>
+        <p:txBody>
+          <a:bodyPr wrap="none" rtlCol="0">
+            <a:spAutoFit/>
+          </a:bodyPr>
+          <a:lstStyle/>
+          <a:p>
+            <a:r>
+              <a:rPr lang="pt-BR" dirty="0"/>
+              <a:t>Repositório github: </a:t>
+            </a:r>
+            <a:r>
+              <a:rPr lang="pt-BR" dirty="0">
+                <a:hlinkClick r:id="rId2"/>
+              </a:rPr>
+              <a:t>https://github.com/macio-matheus/spark_ml_project</a:t>
+            </a:r>
+            <a:endParaRPr lang="pt-BR" dirty="0"/>
+          </a:p>
+          <a:p>
+            <a:endParaRPr lang="pt-BR" dirty="0"/>
+          </a:p>
+        </p:txBody>
+      </p:sp>
+    </p:spTree>
+    <p:extLst>
+      <p:ext uri="{BB962C8B-B14F-4D97-AF65-F5344CB8AC3E}">
+        <p14:creationId xmlns:p14="http://schemas.microsoft.com/office/powerpoint/2010/main" val="3727133856"/>
+      </p:ext>
+    </p:extLst>
+  </p:cSld>
+  <p:clrMapOvr>
+    <a:masterClrMapping/>
+  </p:clrMapOvr>
+</p:sld>
+</file>
+
+<file path=ppt/slides/slide20.xml><?xml version="1.0" encoding="utf-8"?>
+<p:sld xmlns:a="http://schemas.openxmlformats.org/drawingml/2006/main" xmlns:r="http://schemas.openxmlformats.org/officeDocument/2006/relationships" xmlns:p="http://schemas.openxmlformats.org/presentationml/2006/main">
+  <p:cSld>
+    <p:spTree>
+      <p:nvGrpSpPr>
+        <p:cNvPr id="1" name=""/>
+        <p:cNvGrpSpPr/>
+        <p:nvPr/>
+      </p:nvGrpSpPr>
+      <p:grpSpPr>
+        <a:xfrm>
+          <a:off x="0" y="0"/>
+          <a:ext cx="0" cy="0"/>
+          <a:chOff x="0" y="0"/>
+          <a:chExt cx="0" cy="0"/>
+        </a:xfrm>
+      </p:grpSpPr>
+      <p:sp>
+        <p:nvSpPr>
+          <p:cNvPr id="2" name="Título 1"/>
+          <p:cNvSpPr>
+            <a:spLocks noGrp="1"/>
+          </p:cNvSpPr>
+          <p:nvPr>
+            <p:ph type="title"/>
+          </p:nvPr>
+        </p:nvSpPr>
+        <p:spPr/>
+        <p:txBody>
+          <a:bodyPr/>
+          <a:lstStyle/>
+          <a:p>
+            <a:r>
+              <a:rPr lang="pt-BR" dirty="0"/>
+              <a:t>Previsão de Fechamento das Ações do Google</a:t>
+            </a:r>
+          </a:p>
+        </p:txBody>
+      </p:sp>
+      <p:pic>
+        <p:nvPicPr>
+          <p:cNvPr id="5" name="Imagem 4"/>
+          <p:cNvPicPr>
+            <a:picLocks noChangeAspect="1"/>
+          </p:cNvPicPr>
+          <p:nvPr/>
+        </p:nvPicPr>
+        <p:blipFill>
+          <a:blip r:embed="rId2"/>
+          <a:stretch>
+            <a:fillRect/>
+          </a:stretch>
+        </p:blipFill>
+        <p:spPr>
+          <a:xfrm>
+            <a:off x="874808" y="1690688"/>
+            <a:ext cx="10442384" cy="4812706"/>
+          </a:xfrm>
+          <a:prstGeom prst="rect">
+            <a:avLst/>
+          </a:prstGeom>
+        </p:spPr>
+      </p:pic>
+    </p:spTree>
+    <p:extLst>
+      <p:ext uri="{BB962C8B-B14F-4D97-AF65-F5344CB8AC3E}">
+        <p14:creationId xmlns:p14="http://schemas.microsoft.com/office/powerpoint/2010/main" val="880572389"/>
+      </p:ext>
+    </p:extLst>
+  </p:cSld>
+  <p:clrMapOvr>
+    <a:masterClrMapping/>
+  </p:clrMapOvr>
+</p:sld>
+</file>
+
+<file path=ppt/slides/slide21.xml><?xml version="1.0" encoding="utf-8"?>
+<p:sld xmlns:a="http://schemas.openxmlformats.org/drawingml/2006/main" xmlns:r="http://schemas.openxmlformats.org/officeDocument/2006/relationships" xmlns:p="http://schemas.openxmlformats.org/presentationml/2006/main">
+  <p:cSld>
+    <p:spTree>
+      <p:nvGrpSpPr>
+        <p:cNvPr id="1" name=""/>
+        <p:cNvGrpSpPr/>
+        <p:nvPr/>
+      </p:nvGrpSpPr>
+      <p:grpSpPr>
+        <a:xfrm>
+          <a:off x="0" y="0"/>
+          <a:ext cx="0" cy="0"/>
+          <a:chOff x="0" y="0"/>
+          <a:chExt cx="0" cy="0"/>
+        </a:xfrm>
+      </p:grpSpPr>
+      <p:sp>
+        <p:nvSpPr>
+          <p:cNvPr id="2" name="Título 1"/>
+          <p:cNvSpPr>
+            <a:spLocks noGrp="1"/>
+          </p:cNvSpPr>
+          <p:nvPr>
+            <p:ph type="title"/>
+          </p:nvPr>
+        </p:nvSpPr>
+        <p:spPr/>
+        <p:txBody>
+          <a:bodyPr/>
+          <a:lstStyle/>
+          <a:p>
+            <a:r>
+              <a:rPr lang="pt-BR" dirty="0"/>
+              <a:t>Previsão de Fechamento das Ações do Google</a:t>
+            </a:r>
+          </a:p>
+        </p:txBody>
+      </p:sp>
+      <p:pic>
+        <p:nvPicPr>
+          <p:cNvPr id="4" name="Imagem 3"/>
+          <p:cNvPicPr>
+            <a:picLocks noChangeAspect="1"/>
+          </p:cNvPicPr>
+          <p:nvPr/>
+        </p:nvPicPr>
+        <p:blipFill>
+          <a:blip r:embed="rId2"/>
+          <a:stretch>
+            <a:fillRect/>
+          </a:stretch>
+        </p:blipFill>
+        <p:spPr>
+          <a:xfrm>
+            <a:off x="487853" y="2346592"/>
+            <a:ext cx="11216293" cy="4090874"/>
+          </a:xfrm>
+          <a:prstGeom prst="rect">
+            <a:avLst/>
+          </a:prstGeom>
+        </p:spPr>
+      </p:pic>
+    </p:spTree>
+    <p:extLst>
+      <p:ext uri="{BB962C8B-B14F-4D97-AF65-F5344CB8AC3E}">
+        <p14:creationId xmlns:p14="http://schemas.microsoft.com/office/powerpoint/2010/main" val="1529103570"/>
+      </p:ext>
+    </p:extLst>
+  </p:cSld>
+  <p:clrMapOvr>
+    <a:masterClrMapping/>
+  </p:clrMapOvr>
+</p:sld>
+</file>
+
+<file path=ppt/slides/slide22.xml><?xml version="1.0" encoding="utf-8"?>
+<p:sld xmlns:a="http://schemas.openxmlformats.org/drawingml/2006/main" xmlns:r="http://schemas.openxmlformats.org/officeDocument/2006/relationships" xmlns:p="http://schemas.openxmlformats.org/presentationml/2006/main">
+  <p:cSld>
+    <p:spTree>
+      <p:nvGrpSpPr>
+        <p:cNvPr id="1" name=""/>
+        <p:cNvGrpSpPr/>
+        <p:nvPr/>
+      </p:nvGrpSpPr>
+      <p:grpSpPr>
+        <a:xfrm>
+          <a:off x="0" y="0"/>
+          <a:ext cx="0" cy="0"/>
+          <a:chOff x="0" y="0"/>
+          <a:chExt cx="0" cy="0"/>
+        </a:xfrm>
+      </p:grpSpPr>
+      <p:sp>
+        <p:nvSpPr>
+          <p:cNvPr id="2" name="Título 1"/>
+          <p:cNvSpPr>
+            <a:spLocks noGrp="1"/>
+          </p:cNvSpPr>
+          <p:nvPr>
+            <p:ph type="title"/>
+          </p:nvPr>
+        </p:nvSpPr>
+        <p:spPr/>
+        <p:txBody>
+          <a:bodyPr/>
+          <a:lstStyle/>
+          <a:p>
+            <a:r>
+              <a:rPr lang="pt-BR" dirty="0"/>
+              <a:t>Previsão de Fechamento das Ações do Google</a:t>
+            </a:r>
+          </a:p>
+        </p:txBody>
+      </p:sp>
+      <p:pic>
+        <p:nvPicPr>
+          <p:cNvPr id="4" name="Imagem 3"/>
+          <p:cNvPicPr>
+            <a:picLocks noChangeAspect="1"/>
+          </p:cNvPicPr>
+          <p:nvPr/>
+        </p:nvPicPr>
+        <p:blipFill>
+          <a:blip r:embed="rId2"/>
+          <a:stretch>
+            <a:fillRect/>
+          </a:stretch>
+        </p:blipFill>
+        <p:spPr>
+          <a:xfrm>
+            <a:off x="217026" y="2082190"/>
+            <a:ext cx="11757947" cy="3445238"/>
+          </a:xfrm>
+          <a:prstGeom prst="rect">
+            <a:avLst/>
+          </a:prstGeom>
+        </p:spPr>
+      </p:pic>
+    </p:spTree>
+    <p:extLst>
+      <p:ext uri="{BB962C8B-B14F-4D97-AF65-F5344CB8AC3E}">
+        <p14:creationId xmlns:p14="http://schemas.microsoft.com/office/powerpoint/2010/main" val="1082937483"/>
+      </p:ext>
+    </p:extLst>
+  </p:cSld>
+  <p:clrMapOvr>
+    <a:masterClrMapping/>
+  </p:clrMapOvr>
+</p:sld>
+</file>
+
+<file path=ppt/slides/slide23.xml><?xml version="1.0" encoding="utf-8"?>
+<p:sld xmlns:a="http://schemas.openxmlformats.org/drawingml/2006/main" xmlns:r="http://schemas.openxmlformats.org/officeDocument/2006/relationships" xmlns:p="http://schemas.openxmlformats.org/presentationml/2006/main">
+  <p:cSld>
+    <p:spTree>
+      <p:nvGrpSpPr>
+        <p:cNvPr id="1" name=""/>
+        <p:cNvGrpSpPr/>
+        <p:nvPr/>
+      </p:nvGrpSpPr>
+      <p:grpSpPr>
+        <a:xfrm>
+          <a:off x="0" y="0"/>
+          <a:ext cx="0" cy="0"/>
+          <a:chOff x="0" y="0"/>
+          <a:chExt cx="0" cy="0"/>
+        </a:xfrm>
+      </p:grpSpPr>
+      <p:sp>
+        <p:nvSpPr>
+          <p:cNvPr id="2" name="Título 1"/>
+          <p:cNvSpPr>
+            <a:spLocks noGrp="1"/>
+          </p:cNvSpPr>
+          <p:nvPr>
+            <p:ph type="title"/>
+          </p:nvPr>
+        </p:nvSpPr>
+        <p:spPr/>
+        <p:txBody>
+          <a:bodyPr/>
+          <a:lstStyle/>
+          <a:p>
+            <a:r>
+              <a:rPr lang="pt-BR" dirty="0"/>
+              <a:t>Previsão de Fechamento das Ações do Google</a:t>
+            </a:r>
           </a:p>
         </p:txBody>
       </p:sp>
@@ -3248,7 +5482,7 @@
 </p:sld>
 </file>
 
-<file path=ppt/slides/slide11.xml><?xml version="1.0" encoding="utf-8"?>
+<file path=ppt/slides/slide24.xml><?xml version="1.0" encoding="utf-8"?>
 <p:sld xmlns:a="http://schemas.openxmlformats.org/drawingml/2006/main" xmlns:r="http://schemas.openxmlformats.org/officeDocument/2006/relationships" xmlns:p="http://schemas.openxmlformats.org/presentationml/2006/main">
   <p:cSld>
     <p:spTree>
@@ -3281,10 +5515,9 @@
           <a:lstStyle/>
           <a:p>
             <a:r>
-              <a:rPr lang="pt-BR" dirty="0" smtClean="0"/>
+              <a:rPr lang="pt-BR" dirty="0"/>
               <a:t>Previsão de Fechamento das Ações do Google</a:t>
             </a:r>
-            <a:endParaRPr lang="pt-BR" dirty="0"/>
           </a:p>
         </p:txBody>
       </p:sp>
@@ -3346,17 +5579,10 @@
   <p:clrMapOvr>
     <a:masterClrMapping/>
   </p:clrMapOvr>
-  <p:timing>
-    <p:tnLst>
-      <p:par>
-        <p:cTn id="1" dur="indefinite" restart="never" nodeType="tmRoot"/>
-      </p:par>
-    </p:tnLst>
-  </p:timing>
 </p:sld>
 </file>
 
-<file path=ppt/slides/slide2.xml><?xml version="1.0" encoding="utf-8"?>
+<file path=ppt/slides/slide25.xml><?xml version="1.0" encoding="utf-8"?>
 <p:sld xmlns:a="http://schemas.openxmlformats.org/drawingml/2006/main" xmlns:r="http://schemas.openxmlformats.org/officeDocument/2006/relationships" xmlns:p="http://schemas.openxmlformats.org/presentationml/2006/main">
   <p:cSld>
     <p:spTree>
@@ -3389,10 +5615,98 @@
           <a:lstStyle/>
           <a:p>
             <a:r>
-              <a:rPr lang="pt-BR" dirty="0" smtClean="0"/>
+              <a:rPr lang="pt-BR" dirty="0"/>
+              <a:t>Obrigado!</a:t>
+            </a:r>
+          </a:p>
+        </p:txBody>
+      </p:sp>
+      <p:sp>
+        <p:nvSpPr>
+          <p:cNvPr id="3" name="TextBox 2">
+            <a:extLst>
+              <a:ext uri="{FF2B5EF4-FFF2-40B4-BE49-F238E27FC236}">
+                <a16:creationId xmlns:a16="http://schemas.microsoft.com/office/drawing/2014/main" id="{9FC74909-FB5B-42D8-AC66-FA32A9F12D97}"/>
+              </a:ext>
+            </a:extLst>
+          </p:cNvPr>
+          <p:cNvSpPr txBox="1"/>
+          <p:nvPr/>
+        </p:nvSpPr>
+        <p:spPr>
+          <a:xfrm>
+            <a:off x="4964119" y="3131127"/>
+            <a:ext cx="2263761" cy="769441"/>
+          </a:xfrm>
+          <a:prstGeom prst="rect">
+            <a:avLst/>
+          </a:prstGeom>
+          <a:noFill/>
+        </p:spPr>
+        <p:txBody>
+          <a:bodyPr wrap="none" rtlCol="0">
+            <a:spAutoFit/>
+          </a:bodyPr>
+          <a:lstStyle/>
+          <a:p>
+            <a:r>
+              <a:rPr lang="pt-BR" sz="4400" dirty="0"/>
+              <a:t>Dúvidas?</a:t>
+            </a:r>
+          </a:p>
+        </p:txBody>
+      </p:sp>
+    </p:spTree>
+    <p:extLst>
+      <p:ext uri="{BB962C8B-B14F-4D97-AF65-F5344CB8AC3E}">
+        <p14:creationId xmlns:p14="http://schemas.microsoft.com/office/powerpoint/2010/main" val="4038259637"/>
+      </p:ext>
+    </p:extLst>
+  </p:cSld>
+  <p:clrMapOvr>
+    <a:masterClrMapping/>
+  </p:clrMapOvr>
+</p:sld>
+</file>
+
+<file path=ppt/slides/slide3.xml><?xml version="1.0" encoding="utf-8"?>
+<p:sld xmlns:a="http://schemas.openxmlformats.org/drawingml/2006/main" xmlns:r="http://schemas.openxmlformats.org/officeDocument/2006/relationships" xmlns:p="http://schemas.openxmlformats.org/presentationml/2006/main">
+  <p:cSld>
+    <p:spTree>
+      <p:nvGrpSpPr>
+        <p:cNvPr id="1" name=""/>
+        <p:cNvGrpSpPr/>
+        <p:nvPr/>
+      </p:nvGrpSpPr>
+      <p:grpSpPr>
+        <a:xfrm>
+          <a:off x="0" y="0"/>
+          <a:ext cx="0" cy="0"/>
+          <a:chOff x="0" y="0"/>
+          <a:chExt cx="0" cy="0"/>
+        </a:xfrm>
+      </p:grpSpPr>
+      <p:sp>
+        <p:nvSpPr>
+          <p:cNvPr id="2" name="Título 1"/>
+          <p:cNvSpPr>
+            <a:spLocks noGrp="1"/>
+          </p:cNvSpPr>
+          <p:nvPr>
+            <p:ph type="title"/>
+          </p:nvPr>
+        </p:nvSpPr>
+        <p:spPr/>
+        <p:txBody>
+          <a:bodyPr vert="horz" lIns="91440" tIns="45720" rIns="91440" bIns="45720" rtlCol="0" anchor="ctr">
+            <a:normAutofit/>
+          </a:bodyPr>
+          <a:lstStyle/>
+          <a:p>
+            <a:r>
+              <a:rPr lang="pt-BR" dirty="0"/>
               <a:t>Arquitetura</a:t>
             </a:r>
-            <a:endParaRPr lang="pt-BR" dirty="0"/>
           </a:p>
         </p:txBody>
       </p:sp>
@@ -3405,7 +5719,7 @@
           <p:nvPr/>
         </p:nvPicPr>
         <p:blipFill>
-          <a:blip r:embed="rId2" cstate="print">
+          <a:blip r:embed="rId3" cstate="print">
             <a:extLst>
               <a:ext uri="{28A0092B-C50C-407E-A947-70E740481C1C}">
                 <a14:useLocalDpi xmlns:a14="http://schemas.microsoft.com/office/drawing/2010/main" val="0"/>
@@ -3440,47 +5754,6 @@
       <p:pic>
         <p:nvPicPr>
           <p:cNvPr id="1028" name="Picture 4" descr="Imagem relacionada"/>
-          <p:cNvPicPr>
-            <a:picLocks noChangeAspect="1" noChangeArrowheads="1"/>
-          </p:cNvPicPr>
-          <p:nvPr/>
-        </p:nvPicPr>
-        <p:blipFill>
-          <a:blip r:embed="rId3">
-            <a:extLst>
-              <a:ext uri="{28A0092B-C50C-407E-A947-70E740481C1C}">
-                <a14:useLocalDpi xmlns:a14="http://schemas.microsoft.com/office/drawing/2010/main" val="0"/>
-              </a:ext>
-            </a:extLst>
-          </a:blip>
-          <a:srcRect/>
-          <a:stretch>
-            <a:fillRect/>
-          </a:stretch>
-        </p:blipFill>
-        <p:spPr bwMode="auto">
-          <a:xfrm>
-            <a:off x="2160468" y="4691413"/>
-            <a:ext cx="1882545" cy="1698882"/>
-          </a:xfrm>
-          <a:prstGeom prst="rect">
-            <a:avLst/>
-          </a:prstGeom>
-          <a:noFill/>
-          <a:extLst>
-            <a:ext uri="{909E8E84-426E-40DD-AFC4-6F175D3DCCD1}">
-              <a14:hiddenFill xmlns:a14="http://schemas.microsoft.com/office/drawing/2010/main">
-                <a:solidFill>
-                  <a:srgbClr val="FFFFFF"/>
-                </a:solidFill>
-              </a14:hiddenFill>
-            </a:ext>
-          </a:extLst>
-        </p:spPr>
-      </p:pic>
-      <p:pic>
-        <p:nvPicPr>
-          <p:cNvPr id="1030" name="Picture 6" descr="Resultado de imagem para gcloud icon"/>
           <p:cNvPicPr>
             <a:picLocks noChangeAspect="1" noChangeArrowheads="1"/>
           </p:cNvPicPr>
@@ -3501,8 +5774,8 @@
         </p:blipFill>
         <p:spPr bwMode="auto">
           <a:xfrm>
-            <a:off x="1755147" y="1771757"/>
-            <a:ext cx="891370" cy="891370"/>
+            <a:off x="2160468" y="4691413"/>
+            <a:ext cx="1882545" cy="1698882"/>
           </a:xfrm>
           <a:prstGeom prst="rect">
             <a:avLst/>
@@ -3521,14 +5794,14 @@
       </p:pic>
       <p:pic>
         <p:nvPicPr>
-          <p:cNvPr id="1034" name="Picture 10" descr="network, Servers, Multimedia, Database, files, Hosting, storage, technology, Server, networking Icon"/>
+          <p:cNvPr id="1030" name="Picture 6" descr="Resultado de imagem para gcloud icon"/>
           <p:cNvPicPr>
             <a:picLocks noChangeAspect="1" noChangeArrowheads="1"/>
           </p:cNvPicPr>
           <p:nvPr/>
         </p:nvPicPr>
         <p:blipFill>
-          <a:blip r:embed="rId5" cstate="print">
+          <a:blip r:embed="rId5">
             <a:extLst>
               <a:ext uri="{28A0092B-C50C-407E-A947-70E740481C1C}">
                 <a14:useLocalDpi xmlns:a14="http://schemas.microsoft.com/office/drawing/2010/main" val="0"/>
@@ -3542,8 +5815,8 @@
         </p:blipFill>
         <p:spPr bwMode="auto">
           <a:xfrm>
-            <a:off x="1090862" y="2663127"/>
-            <a:ext cx="2219941" cy="2219941"/>
+            <a:off x="1755147" y="1771757"/>
+            <a:ext cx="891370" cy="891370"/>
           </a:xfrm>
           <a:prstGeom prst="rect">
             <a:avLst/>
@@ -3562,14 +5835,14 @@
       </p:pic>
       <p:pic>
         <p:nvPicPr>
-          <p:cNvPr id="1036" name="Picture 12" descr="Server Storage, Hosting, Cloud storage, Server, web, network, Computer Icon"/>
+          <p:cNvPr id="1034" name="Picture 10" descr="network, Servers, Multimedia, Database, files, Hosting, storage, technology, Server, networking Icon"/>
           <p:cNvPicPr>
             <a:picLocks noChangeAspect="1" noChangeArrowheads="1"/>
           </p:cNvPicPr>
           <p:nvPr/>
         </p:nvPicPr>
         <p:blipFill>
-          <a:blip r:embed="rId6">
+          <a:blip r:embed="rId6" cstate="print">
             <a:extLst>
               <a:ext uri="{28A0092B-C50C-407E-A947-70E740481C1C}">
                 <a14:useLocalDpi xmlns:a14="http://schemas.microsoft.com/office/drawing/2010/main" val="0"/>
@@ -3583,8 +5856,8 @@
         </p:blipFill>
         <p:spPr bwMode="auto">
           <a:xfrm>
-            <a:off x="4945411" y="2875892"/>
-            <a:ext cx="1794410" cy="1794410"/>
+            <a:off x="1090862" y="2663127"/>
+            <a:ext cx="2219941" cy="2219941"/>
           </a:xfrm>
           <a:prstGeom prst="rect">
             <a:avLst/>
@@ -3601,46 +5874,16 @@
           </a:extLst>
         </p:spPr>
       </p:pic>
-      <p:sp>
-        <p:nvSpPr>
-          <p:cNvPr id="5" name="CaixaDeTexto 4"/>
-          <p:cNvSpPr txBox="1"/>
-          <p:nvPr/>
-        </p:nvSpPr>
-        <p:spPr>
-          <a:xfrm>
-            <a:off x="4801209" y="2312912"/>
-            <a:ext cx="2082814" cy="461665"/>
-          </a:xfrm>
-          <a:prstGeom prst="rect">
-            <a:avLst/>
-          </a:prstGeom>
-          <a:noFill/>
-        </p:spPr>
-        <p:txBody>
-          <a:bodyPr wrap="none" rtlCol="0">
-            <a:spAutoFit/>
-          </a:bodyPr>
-          <a:lstStyle/>
-          <a:p>
-            <a:r>
-              <a:rPr lang="pt-BR" sz="2400" b="1" dirty="0" smtClean="0"/>
-              <a:t>MASTER NODE</a:t>
-            </a:r>
-            <a:endParaRPr lang="pt-BR" sz="2400" b="1" dirty="0"/>
-          </a:p>
-        </p:txBody>
-      </p:sp>
       <p:pic>
         <p:nvPicPr>
-          <p:cNvPr id="1038" name="Picture 14" descr="Resultado de imagem para jupyter icon"/>
+          <p:cNvPr id="1036" name="Picture 12" descr="Server Storage, Hosting, Cloud storage, Server, web, network, Computer Icon"/>
           <p:cNvPicPr>
             <a:picLocks noChangeAspect="1" noChangeArrowheads="1"/>
           </p:cNvPicPr>
           <p:nvPr/>
         </p:nvPicPr>
         <p:blipFill>
-          <a:blip r:embed="rId7" cstate="print">
+          <a:blip r:embed="rId7">
             <a:extLst>
               <a:ext uri="{28A0092B-C50C-407E-A947-70E740481C1C}">
                 <a14:useLocalDpi xmlns:a14="http://schemas.microsoft.com/office/drawing/2010/main" val="0"/>
@@ -3654,8 +5897,8 @@
         </p:blipFill>
         <p:spPr bwMode="auto">
           <a:xfrm>
-            <a:off x="5165547" y="4771617"/>
-            <a:ext cx="1354138" cy="1354138"/>
+            <a:off x="4945411" y="2875892"/>
+            <a:ext cx="1794410" cy="1794410"/>
           </a:xfrm>
           <a:prstGeom prst="rect">
             <a:avLst/>
@@ -3672,16 +5915,45 @@
           </a:extLst>
         </p:spPr>
       </p:pic>
+      <p:sp>
+        <p:nvSpPr>
+          <p:cNvPr id="5" name="CaixaDeTexto 4"/>
+          <p:cNvSpPr txBox="1"/>
+          <p:nvPr/>
+        </p:nvSpPr>
+        <p:spPr>
+          <a:xfrm>
+            <a:off x="4801209" y="2312912"/>
+            <a:ext cx="2082814" cy="461665"/>
+          </a:xfrm>
+          <a:prstGeom prst="rect">
+            <a:avLst/>
+          </a:prstGeom>
+          <a:noFill/>
+        </p:spPr>
+        <p:txBody>
+          <a:bodyPr wrap="none" rtlCol="0">
+            <a:spAutoFit/>
+          </a:bodyPr>
+          <a:lstStyle/>
+          <a:p>
+            <a:r>
+              <a:rPr lang="pt-BR" sz="2400" b="1" dirty="0"/>
+              <a:t>MASTER NODE</a:t>
+            </a:r>
+          </a:p>
+        </p:txBody>
+      </p:sp>
       <p:pic>
         <p:nvPicPr>
-          <p:cNvPr id="1040" name="Picture 16" descr="Laptop Screen, Computer, Laptop, Open Laptop, laptop computer, technology Icon"/>
+          <p:cNvPr id="1038" name="Picture 14" descr="Resultado de imagem para jupyter icon"/>
           <p:cNvPicPr>
             <a:picLocks noChangeAspect="1" noChangeArrowheads="1"/>
           </p:cNvPicPr>
           <p:nvPr/>
         </p:nvPicPr>
         <p:blipFill>
-          <a:blip r:embed="rId8">
+          <a:blip r:embed="rId8" cstate="print">
             <a:extLst>
               <a:ext uri="{28A0092B-C50C-407E-A947-70E740481C1C}">
                 <a14:useLocalDpi xmlns:a14="http://schemas.microsoft.com/office/drawing/2010/main" val="0"/>
@@ -3695,8 +5967,8 @@
         </p:blipFill>
         <p:spPr bwMode="auto">
           <a:xfrm>
-            <a:off x="9674412" y="2875892"/>
-            <a:ext cx="1792128" cy="1792128"/>
+            <a:off x="5165547" y="4771617"/>
+            <a:ext cx="1354138" cy="1354138"/>
           </a:xfrm>
           <a:prstGeom prst="rect">
             <a:avLst/>
@@ -3715,7 +5987,7 @@
       </p:pic>
       <p:pic>
         <p:nvPicPr>
-          <p:cNvPr id="1042" name="Picture 18" descr="Arrows, right, line, Arrow, Left Icon"/>
+          <p:cNvPr id="1040" name="Picture 16" descr="Laptop Screen, Computer, Laptop, Open Laptop, laptop computer, technology Icon"/>
           <p:cNvPicPr>
             <a:picLocks noChangeAspect="1" noChangeArrowheads="1"/>
           </p:cNvPicPr>
@@ -3736,8 +6008,8 @@
         </p:blipFill>
         <p:spPr bwMode="auto">
           <a:xfrm>
-            <a:off x="6943850" y="2543744"/>
-            <a:ext cx="2438400" cy="2438400"/>
+            <a:off x="9674412" y="2875892"/>
+            <a:ext cx="1792128" cy="1792128"/>
           </a:xfrm>
           <a:prstGeom prst="rect">
             <a:avLst/>
@@ -3754,21 +6026,62 @@
           </a:extLst>
         </p:spPr>
       </p:pic>
-      <p:sp>
-        <p:nvSpPr>
-          <p:cNvPr id="14" name="CaixaDeTexto 13"/>
-          <p:cNvSpPr txBox="1"/>
+      <p:pic>
+        <p:nvPicPr>
+          <p:cNvPr id="1042" name="Picture 18" descr="Arrows, right, line, Arrow, Left Icon"/>
+          <p:cNvPicPr>
+            <a:picLocks noChangeAspect="1" noChangeArrowheads="1"/>
+          </p:cNvPicPr>
           <p:nvPr/>
-        </p:nvSpPr>
-        <p:spPr>
-          <a:xfrm>
-            <a:off x="7737805" y="4309952"/>
-            <a:ext cx="850489" cy="461665"/>
+        </p:nvPicPr>
+        <p:blipFill>
+          <a:blip r:embed="rId10">
+            <a:extLst>
+              <a:ext uri="{28A0092B-C50C-407E-A947-70E740481C1C}">
+                <a14:useLocalDpi xmlns:a14="http://schemas.microsoft.com/office/drawing/2010/main" val="0"/>
+              </a:ext>
+            </a:extLst>
+          </a:blip>
+          <a:srcRect/>
+          <a:stretch>
+            <a:fillRect/>
+          </a:stretch>
+        </p:blipFill>
+        <p:spPr bwMode="auto">
+          <a:xfrm>
+            <a:off x="6943850" y="2543744"/>
+            <a:ext cx="2438400" cy="2438400"/>
           </a:xfrm>
           <a:prstGeom prst="rect">
             <a:avLst/>
           </a:prstGeom>
           <a:noFill/>
+          <a:extLst>
+            <a:ext uri="{909E8E84-426E-40DD-AFC4-6F175D3DCCD1}">
+              <a14:hiddenFill xmlns:a14="http://schemas.microsoft.com/office/drawing/2010/main">
+                <a:solidFill>
+                  <a:srgbClr val="FFFFFF"/>
+                </a:solidFill>
+              </a14:hiddenFill>
+            </a:ext>
+          </a:extLst>
+        </p:spPr>
+      </p:pic>
+      <p:sp>
+        <p:nvSpPr>
+          <p:cNvPr id="14" name="CaixaDeTexto 13"/>
+          <p:cNvSpPr txBox="1"/>
+          <p:nvPr/>
+        </p:nvSpPr>
+        <p:spPr>
+          <a:xfrm>
+            <a:off x="7737805" y="4309952"/>
+            <a:ext cx="850489" cy="461665"/>
+          </a:xfrm>
+          <a:prstGeom prst="rect">
+            <a:avLst/>
+          </a:prstGeom>
+          <a:noFill/>
         </p:spPr>
         <p:txBody>
           <a:bodyPr wrap="none" rtlCol="0">
@@ -3777,10 +6090,9 @@
           <a:lstStyle/>
           <a:p>
             <a:r>
-              <a:rPr lang="pt-BR" sz="2400" b="1" dirty="0" smtClean="0"/>
+              <a:rPr lang="pt-BR" sz="2400" b="1" dirty="0"/>
               <a:t>HTTP</a:t>
             </a:r>
-            <a:endParaRPr lang="pt-BR" sz="2400" b="1" dirty="0"/>
           </a:p>
         </p:txBody>
       </p:sp>
@@ -3914,238 +6226,6 @@
   <p:clrMapOvr>
     <a:masterClrMapping/>
   </p:clrMapOvr>
-  <p:timing>
-    <p:tnLst>
-      <p:par>
-        <p:cTn id="1" dur="indefinite" restart="never" nodeType="tmRoot"/>
-      </p:par>
-    </p:tnLst>
-  </p:timing>
-</p:sld>
-</file>
-
-<file path=ppt/slides/slide3.xml><?xml version="1.0" encoding="utf-8"?>
-<p:sld xmlns:a="http://schemas.openxmlformats.org/drawingml/2006/main" xmlns:r="http://schemas.openxmlformats.org/officeDocument/2006/relationships" xmlns:p="http://schemas.openxmlformats.org/presentationml/2006/main">
-  <p:cSld>
-    <p:spTree>
-      <p:nvGrpSpPr>
-        <p:cNvPr id="1" name=""/>
-        <p:cNvGrpSpPr/>
-        <p:nvPr/>
-      </p:nvGrpSpPr>
-      <p:grpSpPr>
-        <a:xfrm>
-          <a:off x="0" y="0"/>
-          <a:ext cx="0" cy="0"/>
-          <a:chOff x="0" y="0"/>
-          <a:chExt cx="0" cy="0"/>
-        </a:xfrm>
-      </p:grpSpPr>
-      <p:sp>
-        <p:nvSpPr>
-          <p:cNvPr id="2" name="Título 1"/>
-          <p:cNvSpPr>
-            <a:spLocks noGrp="1"/>
-          </p:cNvSpPr>
-          <p:nvPr>
-            <p:ph type="title"/>
-          </p:nvPr>
-        </p:nvSpPr>
-        <p:spPr/>
-        <p:txBody>
-          <a:bodyPr/>
-          <a:lstStyle/>
-          <a:p>
-            <a:r>
-              <a:rPr lang="pt-BR" dirty="0" smtClean="0"/>
-              <a:t>Previsão de Fechamento das Ações do Google</a:t>
-            </a:r>
-            <a:endParaRPr lang="pt-BR" dirty="0"/>
-          </a:p>
-        </p:txBody>
-      </p:sp>
-      <p:sp>
-        <p:nvSpPr>
-          <p:cNvPr id="3" name="Espaço Reservado para Conteúdo 2"/>
-          <p:cNvSpPr>
-            <a:spLocks noGrp="1"/>
-          </p:cNvSpPr>
-          <p:nvPr>
-            <p:ph idx="1"/>
-          </p:nvPr>
-        </p:nvSpPr>
-        <p:spPr>
-          <a:xfrm>
-            <a:off x="838200" y="1825625"/>
-            <a:ext cx="10515600" cy="2030279"/>
-          </a:xfrm>
-        </p:spPr>
-        <p:txBody>
-          <a:bodyPr/>
-          <a:lstStyle/>
-          <a:p>
-            <a:r>
-              <a:rPr lang="pt-BR" dirty="0" smtClean="0"/>
-              <a:t>Série histórica do papel GOOG (</a:t>
-            </a:r>
-            <a:r>
-              <a:rPr lang="pt-BR" dirty="0" err="1" smtClean="0"/>
-              <a:t>Alphabet</a:t>
-            </a:r>
-            <a:r>
-              <a:rPr lang="pt-BR" dirty="0" smtClean="0"/>
-              <a:t> Inc.)</a:t>
-            </a:r>
-          </a:p>
-          <a:p>
-            <a:pPr lvl="1"/>
-            <a:r>
-              <a:rPr lang="pt-BR" dirty="0" smtClean="0">
-                <a:hlinkClick r:id="rId2"/>
-              </a:rPr>
-              <a:t>https://finance.yahoo.com/quote/GOOG/history?p=GOOG</a:t>
-            </a:r>
-            <a:endParaRPr lang="pt-BR" dirty="0" smtClean="0"/>
-          </a:p>
-          <a:p>
-            <a:r>
-              <a:rPr lang="pt-BR" dirty="0" smtClean="0"/>
-              <a:t>Exportação como CSV</a:t>
-            </a:r>
-          </a:p>
-          <a:p>
-            <a:r>
-              <a:rPr lang="pt-BR" dirty="0" smtClean="0"/>
-              <a:t>Adicionado no cluster (</a:t>
-            </a:r>
-            <a:r>
-              <a:rPr lang="pt-BR" dirty="0" err="1" smtClean="0"/>
-              <a:t>hadoop</a:t>
-            </a:r>
-            <a:r>
-              <a:rPr lang="pt-BR" dirty="0" smtClean="0"/>
-              <a:t>)</a:t>
-            </a:r>
-          </a:p>
-          <a:p>
-            <a:pPr marL="0" indent="0">
-              <a:buNone/>
-            </a:pPr>
-            <a:endParaRPr lang="pt-BR" dirty="0"/>
-          </a:p>
-        </p:txBody>
-      </p:sp>
-      <p:pic>
-        <p:nvPicPr>
-          <p:cNvPr id="4" name="Imagem 3"/>
-          <p:cNvPicPr>
-            <a:picLocks noChangeAspect="1"/>
-          </p:cNvPicPr>
-          <p:nvPr/>
-        </p:nvPicPr>
-        <p:blipFill>
-          <a:blip r:embed="rId3"/>
-          <a:stretch>
-            <a:fillRect/>
-          </a:stretch>
-        </p:blipFill>
-        <p:spPr>
-          <a:xfrm>
-            <a:off x="2450104" y="3855904"/>
-            <a:ext cx="7023509" cy="1107310"/>
-          </a:xfrm>
-          <a:prstGeom prst="rect">
-            <a:avLst/>
-          </a:prstGeom>
-        </p:spPr>
-      </p:pic>
-      <p:pic>
-        <p:nvPicPr>
-          <p:cNvPr id="5" name="Imagem 4"/>
-          <p:cNvPicPr>
-            <a:picLocks noChangeAspect="1"/>
-          </p:cNvPicPr>
-          <p:nvPr/>
-        </p:nvPicPr>
-        <p:blipFill>
-          <a:blip r:embed="rId4"/>
-          <a:stretch>
-            <a:fillRect/>
-          </a:stretch>
-        </p:blipFill>
-        <p:spPr>
-          <a:xfrm>
-            <a:off x="1645873" y="5040332"/>
-            <a:ext cx="8642406" cy="1225511"/>
-          </a:xfrm>
-          <a:prstGeom prst="rect">
-            <a:avLst/>
-          </a:prstGeom>
-        </p:spPr>
-      </p:pic>
-      <p:sp>
-        <p:nvSpPr>
-          <p:cNvPr id="6" name="Retângulo 5"/>
-          <p:cNvSpPr/>
-          <p:nvPr/>
-        </p:nvSpPr>
-        <p:spPr>
-          <a:xfrm>
-            <a:off x="1645873" y="5993176"/>
-            <a:ext cx="7332874" cy="272667"/>
-          </a:xfrm>
-          <a:prstGeom prst="rect">
-            <a:avLst/>
-          </a:prstGeom>
-          <a:noFill/>
-          <a:ln w="38100">
-            <a:solidFill>
-              <a:srgbClr val="FF0000"/>
-            </a:solidFill>
-          </a:ln>
-        </p:spPr>
-        <p:style>
-          <a:lnRef idx="2">
-            <a:schemeClr val="accent1">
-              <a:shade val="50000"/>
-            </a:schemeClr>
-          </a:lnRef>
-          <a:fillRef idx="1">
-            <a:schemeClr val="accent1"/>
-          </a:fillRef>
-          <a:effectRef idx="0">
-            <a:schemeClr val="accent1"/>
-          </a:effectRef>
-          <a:fontRef idx="minor">
-            <a:schemeClr val="lt1"/>
-          </a:fontRef>
-        </p:style>
-        <p:txBody>
-          <a:bodyPr rtlCol="0" anchor="ctr"/>
-          <a:lstStyle/>
-          <a:p>
-            <a:pPr algn="ctr"/>
-            <a:endParaRPr lang="pt-BR"/>
-          </a:p>
-        </p:txBody>
-      </p:sp>
-    </p:spTree>
-    <p:extLst>
-      <p:ext uri="{BB962C8B-B14F-4D97-AF65-F5344CB8AC3E}">
-        <p14:creationId xmlns:p14="http://schemas.microsoft.com/office/powerpoint/2010/main" val="3727133856"/>
-      </p:ext>
-    </p:extLst>
-  </p:cSld>
-  <p:clrMapOvr>
-    <a:masterClrMapping/>
-  </p:clrMapOvr>
-  <p:timing>
-    <p:tnLst>
-      <p:par>
-        <p:cTn id="1" dur="indefinite" restart="never" nodeType="tmRoot"/>
-      </p:par>
-    </p:tnLst>
-  </p:timing>
 </p:sld>
 </file>
 
@@ -4168,30 +6248,72 @@
       </p:grpSpPr>
       <p:sp>
         <p:nvSpPr>
-          <p:cNvPr id="2" name="Título 1"/>
-          <p:cNvSpPr>
-            <a:spLocks noGrp="1"/>
-          </p:cNvSpPr>
-          <p:nvPr>
-            <p:ph type="title"/>
-          </p:nvPr>
-        </p:nvSpPr>
-        <p:spPr/>
-        <p:txBody>
-          <a:bodyPr/>
-          <a:lstStyle/>
-          <a:p>
-            <a:r>
-              <a:rPr lang="pt-BR" dirty="0" smtClean="0"/>
-              <a:t>Previsão de Fechamento das Ações do Google</a:t>
-            </a:r>
+          <p:cNvPr id="3" name="Espaço Reservado para Conteúdo 2"/>
+          <p:cNvSpPr>
+            <a:spLocks noGrp="1"/>
+          </p:cNvSpPr>
+          <p:nvPr>
+            <p:ph idx="1"/>
+          </p:nvPr>
+        </p:nvSpPr>
+        <p:spPr>
+          <a:xfrm>
+            <a:off x="838200" y="1825625"/>
+            <a:ext cx="10515600" cy="2030279"/>
+          </a:xfrm>
+        </p:spPr>
+        <p:txBody>
+          <a:bodyPr>
+            <a:normAutofit fontScale="92500" lnSpcReduction="20000"/>
+          </a:bodyPr>
+          <a:lstStyle/>
+          <a:p>
+            <a:r>
+              <a:rPr lang="pt-BR" dirty="0"/>
+              <a:t>Dados de linhas e estruturas de transmissão extraídos do sistema de gestão de ativos da CHESF.</a:t>
+            </a:r>
+          </a:p>
+          <a:p>
+            <a:r>
+              <a:rPr lang="pt-BR" dirty="0"/>
+              <a:t>Exportação como CSV</a:t>
+            </a:r>
+          </a:p>
+          <a:p>
+            <a:r>
+              <a:rPr lang="pt-BR" dirty="0" err="1"/>
+              <a:t>Clusterização</a:t>
+            </a:r>
+            <a:r>
+              <a:rPr lang="pt-BR" dirty="0"/>
+              <a:t> dos dados</a:t>
+            </a:r>
+          </a:p>
+          <a:p>
+            <a:r>
+              <a:rPr lang="pt-BR" dirty="0"/>
+              <a:t>Adicionado no cluster (</a:t>
+            </a:r>
+            <a:r>
+              <a:rPr lang="pt-BR" dirty="0" err="1"/>
+              <a:t>hadoop</a:t>
+            </a:r>
+            <a:r>
+              <a:rPr lang="pt-BR" dirty="0"/>
+              <a:t>)</a:t>
+            </a:r>
+          </a:p>
+          <a:p>
+            <a:pPr marL="0" indent="0">
+              <a:buNone/>
+            </a:pPr>
             <a:endParaRPr lang="pt-BR" dirty="0"/>
           </a:p>
         </p:txBody>
       </p:sp>
       <p:pic>
         <p:nvPicPr>
-          <p:cNvPr id="4" name="Imagem 3"/>
+          <p:cNvPr id="7" name="Imagem 6"/>
           <p:cNvPicPr>
             <a:picLocks noChangeAspect="1"/>
           </p:cNvPicPr>
@@ -4205,79 +6327,128 @@
         </p:blipFill>
         <p:spPr>
           <a:xfrm>
-            <a:off x="182122" y="1575412"/>
-            <a:ext cx="11828451" cy="1932829"/>
+            <a:off x="968991" y="4173528"/>
+            <a:ext cx="10946872" cy="1502024"/>
           </a:xfrm>
           <a:prstGeom prst="rect">
             <a:avLst/>
           </a:prstGeom>
         </p:spPr>
       </p:pic>
-      <p:pic>
-        <p:nvPicPr>
-          <p:cNvPr id="5" name="Imagem 4"/>
-          <p:cNvPicPr>
-            <a:picLocks noChangeAspect="1"/>
-          </p:cNvPicPr>
+      <p:sp>
+        <p:nvSpPr>
+          <p:cNvPr id="6" name="Retângulo 5"/>
+          <p:cNvSpPr/>
           <p:nvPr/>
-        </p:nvPicPr>
-        <p:blipFill>
-          <a:blip r:embed="rId3"/>
-          <a:stretch>
-            <a:fillRect/>
-          </a:stretch>
-        </p:blipFill>
-        <p:spPr>
-          <a:xfrm>
-            <a:off x="557064" y="3756752"/>
-            <a:ext cx="5627129" cy="2462843"/>
+        </p:nvSpPr>
+        <p:spPr>
+          <a:xfrm>
+            <a:off x="2429563" y="5063319"/>
+            <a:ext cx="7369530" cy="612233"/>
           </a:xfrm>
           <a:prstGeom prst="rect">
             <a:avLst/>
           </a:prstGeom>
-        </p:spPr>
-      </p:pic>
-      <p:pic>
-        <p:nvPicPr>
-          <p:cNvPr id="6" name="Imagem 5"/>
-          <p:cNvPicPr>
-            <a:picLocks noChangeAspect="1"/>
-          </p:cNvPicPr>
+          <a:noFill/>
+          <a:ln w="38100">
+            <a:solidFill>
+              <a:srgbClr val="FF0000"/>
+            </a:solidFill>
+          </a:ln>
+        </p:spPr>
+        <p:style>
+          <a:lnRef idx="2">
+            <a:schemeClr val="accent1">
+              <a:shade val="50000"/>
+            </a:schemeClr>
+          </a:lnRef>
+          <a:fillRef idx="1">
+            <a:schemeClr val="accent1"/>
+          </a:fillRef>
+          <a:effectRef idx="0">
+            <a:schemeClr val="accent1"/>
+          </a:effectRef>
+          <a:fontRef idx="minor">
+            <a:schemeClr val="lt1"/>
+          </a:fontRef>
+        </p:style>
+        <p:txBody>
+          <a:bodyPr rtlCol="0" anchor="ctr"/>
+          <a:lstStyle/>
+          <a:p>
+            <a:pPr algn="ctr"/>
+            <a:endParaRPr lang="pt-BR"/>
+          </a:p>
+        </p:txBody>
+      </p:sp>
+      <p:sp>
+        <p:nvSpPr>
+          <p:cNvPr id="8" name="Título 1">
+            <a:extLst>
+              <a:ext uri="{FF2B5EF4-FFF2-40B4-BE49-F238E27FC236}">
+                <a16:creationId xmlns:a16="http://schemas.microsoft.com/office/drawing/2014/main" id="{812EC321-97E7-4854-8075-53C92323DFF0}"/>
+              </a:ext>
+            </a:extLst>
+          </p:cNvPr>
+          <p:cNvSpPr txBox="1">
+            <a:spLocks/>
+          </p:cNvSpPr>
           <p:nvPr/>
-        </p:nvPicPr>
-        <p:blipFill>
-          <a:blip r:embed="rId4"/>
-          <a:stretch>
-            <a:fillRect/>
-          </a:stretch>
-        </p:blipFill>
-        <p:spPr>
-          <a:xfrm>
-            <a:off x="6184193" y="3508241"/>
-            <a:ext cx="4669697" cy="3349759"/>
+        </p:nvSpPr>
+        <p:spPr>
+          <a:xfrm>
+            <a:off x="838200" y="365125"/>
+            <a:ext cx="11353800" cy="1218015"/>
           </a:xfrm>
           <a:prstGeom prst="rect">
             <a:avLst/>
           </a:prstGeom>
         </p:spPr>
-      </p:pic>
+        <p:txBody>
+          <a:bodyPr vert="horz" lIns="91440" tIns="45720" rIns="91440" bIns="45720" rtlCol="0" anchor="ctr">
+            <a:normAutofit fontScale="97500" lnSpcReduction="10000"/>
+          </a:bodyPr>
+          <a:lstStyle>
+            <a:lvl1pPr algn="l" defTabSz="914400" rtl="0" eaLnBrk="1" latinLnBrk="0" hangingPunct="1">
+              <a:lnSpc>
+                <a:spcPct val="90000"/>
+              </a:lnSpc>
+              <a:spcBef>
+                <a:spcPct val="0"/>
+              </a:spcBef>
+              <a:buNone/>
+              <a:defRPr sz="4400" kern="1200">
+                <a:solidFill>
+                  <a:schemeClr val="tx1"/>
+                </a:solidFill>
+                <a:latin typeface="+mj-lt"/>
+                <a:ea typeface="+mj-ea"/>
+                <a:cs typeface="+mj-cs"/>
+              </a:defRPr>
+            </a:lvl1pPr>
+          </a:lstStyle>
+          <a:p>
+            <a:r>
+              <a:rPr lang="pt-BR" dirty="0"/>
+              <a:t>Priorização na manutenção de estruturas de linhas de </a:t>
+            </a:r>
+            <a:r>
+              <a:rPr lang="pt-BR" sz="4500" dirty="0"/>
+              <a:t>transmissão</a:t>
+            </a:r>
+          </a:p>
+        </p:txBody>
+      </p:sp>
     </p:spTree>
     <p:extLst>
       <p:ext uri="{BB962C8B-B14F-4D97-AF65-F5344CB8AC3E}">
-        <p14:creationId xmlns:p14="http://schemas.microsoft.com/office/powerpoint/2010/main" val="688990774"/>
+        <p14:creationId xmlns:p14="http://schemas.microsoft.com/office/powerpoint/2010/main" val="2376814320"/>
       </p:ext>
     </p:extLst>
   </p:cSld>
   <p:clrMapOvr>
     <a:masterClrMapping/>
   </p:clrMapOvr>
-  <p:timing>
-    <p:tnLst>
-      <p:par>
-        <p:cTn id="1" dur="indefinite" restart="never" nodeType="tmRoot"/>
-      </p:par>
-    </p:tnLst>
-  </p:timing>
 </p:sld>
 </file>
 
@@ -4308,22 +6479,28 @@
             <p:ph type="title"/>
           </p:nvPr>
         </p:nvSpPr>
-        <p:spPr/>
-        <p:txBody>
-          <a:bodyPr/>
-          <a:lstStyle/>
-          <a:p>
-            <a:r>
-              <a:rPr lang="pt-BR" dirty="0" smtClean="0"/>
-              <a:t>Previsão de Fechamento das Ações do Google</a:t>
-            </a:r>
-            <a:endParaRPr lang="pt-BR" dirty="0"/>
+        <p:spPr>
+          <a:xfrm>
+            <a:off x="838200" y="365125"/>
+            <a:ext cx="10515600" cy="1218015"/>
+          </a:xfrm>
+        </p:spPr>
+        <p:txBody>
+          <a:bodyPr>
+            <a:normAutofit fontScale="90000"/>
+          </a:bodyPr>
+          <a:lstStyle/>
+          <a:p>
+            <a:r>
+              <a:rPr lang="pt-BR" dirty="0"/>
+              <a:t>Priorização na manutenção de estruturas de linhas de transmissão</a:t>
+            </a:r>
           </a:p>
         </p:txBody>
       </p:sp>
       <p:pic>
         <p:nvPicPr>
-          <p:cNvPr id="4" name="Imagem 3"/>
+          <p:cNvPr id="3" name="Imagem 2"/>
           <p:cNvPicPr>
             <a:picLocks noChangeAspect="1"/>
           </p:cNvPicPr>
@@ -4337,8 +6514,8 @@
         </p:blipFill>
         <p:spPr>
           <a:xfrm>
-            <a:off x="497574" y="1613570"/>
-            <a:ext cx="11196852" cy="4414263"/>
+            <a:off x="307430" y="1690688"/>
+            <a:ext cx="9229725" cy="4371975"/>
           </a:xfrm>
           <a:prstGeom prst="rect">
             <a:avLst/>
@@ -4347,7 +6524,7 @@
       </p:pic>
       <p:pic>
         <p:nvPicPr>
-          <p:cNvPr id="5" name="Imagem 4"/>
+          <p:cNvPr id="7" name="Imagem 6"/>
           <p:cNvPicPr>
             <a:picLocks noChangeAspect="1"/>
           </p:cNvPicPr>
@@ -4361,8 +6538,8 @@
         </p:blipFill>
         <p:spPr>
           <a:xfrm>
-            <a:off x="1916992" y="3459297"/>
-            <a:ext cx="10094628" cy="2661606"/>
+            <a:off x="5749652" y="5000625"/>
+            <a:ext cx="5100318" cy="1857375"/>
           </a:xfrm>
           <a:prstGeom prst="rect">
             <a:avLst/>
@@ -4372,88 +6549,13 @@
     </p:spTree>
     <p:extLst>
       <p:ext uri="{BB962C8B-B14F-4D97-AF65-F5344CB8AC3E}">
-        <p14:creationId xmlns:p14="http://schemas.microsoft.com/office/powerpoint/2010/main" val="2091938719"/>
+        <p14:creationId xmlns:p14="http://schemas.microsoft.com/office/powerpoint/2010/main" val="3192414125"/>
       </p:ext>
     </p:extLst>
   </p:cSld>
   <p:clrMapOvr>
     <a:masterClrMapping/>
   </p:clrMapOvr>
-  <p:timing>
-    <p:tnLst>
-      <p:par>
-        <p:cTn id="1" dur="indefinite" restart="never" nodeType="tmRoot">
-          <p:childTnLst>
-            <p:seq concurrent="1" nextAc="seek">
-              <p:cTn id="2" dur="indefinite" nodeType="mainSeq">
-                <p:childTnLst>
-                  <p:par>
-                    <p:cTn id="3" fill="hold">
-                      <p:stCondLst>
-                        <p:cond delay="indefinite"/>
-                      </p:stCondLst>
-                      <p:childTnLst>
-                        <p:par>
-                          <p:cTn id="4" fill="hold">
-                            <p:stCondLst>
-                              <p:cond delay="0"/>
-                            </p:stCondLst>
-                            <p:childTnLst>
-                              <p:par>
-                                <p:cTn id="5" presetID="1" presetClass="entr" presetSubtype="0" fill="hold" nodeType="clickEffect">
-                                  <p:stCondLst>
-                                    <p:cond delay="0"/>
-                                  </p:stCondLst>
-                                  <p:childTnLst>
-                                    <p:set>
-                                      <p:cBhvr>
-                                        <p:cTn id="6" dur="1" fill="hold">
-                                          <p:stCondLst>
-                                            <p:cond delay="0"/>
-                                          </p:stCondLst>
-                                        </p:cTn>
-                                        <p:tgtEl>
-                                          <p:spTgt spid="5"/>
-                                        </p:tgtEl>
-                                        <p:attrNameLst>
-                                          <p:attrName>style.visibility</p:attrName>
-                                        </p:attrNameLst>
-                                      </p:cBhvr>
-                                      <p:to>
-                                        <p:strVal val="visible"/>
-                                      </p:to>
-                                    </p:set>
-                                  </p:childTnLst>
-                                </p:cTn>
-                              </p:par>
-                            </p:childTnLst>
-                          </p:cTn>
-                        </p:par>
-                      </p:childTnLst>
-                    </p:cTn>
-                  </p:par>
-                </p:childTnLst>
-              </p:cTn>
-              <p:prevCondLst>
-                <p:cond evt="onPrev" delay="0">
-                  <p:tgtEl>
-                    <p:sldTgt/>
-                  </p:tgtEl>
-                </p:cond>
-              </p:prevCondLst>
-              <p:nextCondLst>
-                <p:cond evt="onNext" delay="0">
-                  <p:tgtEl>
-                    <p:sldTgt/>
-                  </p:tgtEl>
-                </p:cond>
-              </p:nextCondLst>
-            </p:seq>
-          </p:childTnLst>
-        </p:cTn>
-      </p:par>
-    </p:tnLst>
-  </p:timing>
 </p:sld>
 </file>
 
@@ -4484,16 +6586,22 @@
             <p:ph type="title"/>
           </p:nvPr>
         </p:nvSpPr>
-        <p:spPr/>
-        <p:txBody>
-          <a:bodyPr/>
-          <a:lstStyle/>
-          <a:p>
-            <a:r>
-              <a:rPr lang="pt-BR" dirty="0" smtClean="0"/>
-              <a:t>Previsão de Fechamento das Ações do Google</a:t>
-            </a:r>
-            <a:endParaRPr lang="pt-BR" dirty="0"/>
+        <p:spPr>
+          <a:xfrm>
+            <a:off x="838200" y="365125"/>
+            <a:ext cx="10515600" cy="1218015"/>
+          </a:xfrm>
+        </p:spPr>
+        <p:txBody>
+          <a:bodyPr>
+            <a:normAutofit fontScale="90000"/>
+          </a:bodyPr>
+          <a:lstStyle/>
+          <a:p>
+            <a:r>
+              <a:rPr lang="pt-BR" dirty="0"/>
+              <a:t>Priorização na manutenção de estruturas de linhas de transmissão</a:t>
+            </a:r>
           </a:p>
         </p:txBody>
       </p:sp>
@@ -4513,8 +6621,8 @@
         </p:blipFill>
         <p:spPr>
           <a:xfrm>
-            <a:off x="2916485" y="1849376"/>
-            <a:ext cx="5756518" cy="5008624"/>
+            <a:off x="1123950" y="1583140"/>
+            <a:ext cx="10229850" cy="4981575"/>
           </a:xfrm>
           <a:prstGeom prst="rect">
             <a:avLst/>
@@ -4524,20 +6632,13 @@
     </p:spTree>
     <p:extLst>
       <p:ext uri="{BB962C8B-B14F-4D97-AF65-F5344CB8AC3E}">
-        <p14:creationId xmlns:p14="http://schemas.microsoft.com/office/powerpoint/2010/main" val="3873556580"/>
+        <p14:creationId xmlns:p14="http://schemas.microsoft.com/office/powerpoint/2010/main" val="4129435060"/>
       </p:ext>
     </p:extLst>
   </p:cSld>
   <p:clrMapOvr>
     <a:masterClrMapping/>
   </p:clrMapOvr>
-  <p:timing>
-    <p:tnLst>
-      <p:par>
-        <p:cTn id="1" dur="indefinite" restart="never" nodeType="tmRoot"/>
-      </p:par>
-    </p:tnLst>
-  </p:timing>
 </p:sld>
 </file>
 
@@ -4568,22 +6669,28 @@
             <p:ph type="title"/>
           </p:nvPr>
         </p:nvSpPr>
-        <p:spPr/>
-        <p:txBody>
-          <a:bodyPr/>
-          <a:lstStyle/>
-          <a:p>
-            <a:r>
-              <a:rPr lang="pt-BR" dirty="0" smtClean="0"/>
-              <a:t>Previsão de Fechamento das Ações do Google</a:t>
-            </a:r>
-            <a:endParaRPr lang="pt-BR" dirty="0"/>
+        <p:spPr>
+          <a:xfrm>
+            <a:off x="838200" y="365125"/>
+            <a:ext cx="10515600" cy="1218015"/>
+          </a:xfrm>
+        </p:spPr>
+        <p:txBody>
+          <a:bodyPr>
+            <a:normAutofit fontScale="90000"/>
+          </a:bodyPr>
+          <a:lstStyle/>
+          <a:p>
+            <a:r>
+              <a:rPr lang="pt-BR" dirty="0"/>
+              <a:t>Priorização na manutenção de estruturas de linhas de transmissão</a:t>
+            </a:r>
           </a:p>
         </p:txBody>
       </p:sp>
       <p:pic>
         <p:nvPicPr>
-          <p:cNvPr id="5" name="Imagem 4"/>
+          <p:cNvPr id="3" name="Imagem 2"/>
           <p:cNvPicPr>
             <a:picLocks noChangeAspect="1"/>
           </p:cNvPicPr>
@@ -4597,8 +6704,32 @@
         </p:blipFill>
         <p:spPr>
           <a:xfrm>
-            <a:off x="874808" y="1690688"/>
-            <a:ext cx="10442384" cy="4812706"/>
+            <a:off x="838200" y="1583140"/>
+            <a:ext cx="9544050" cy="5057775"/>
+          </a:xfrm>
+          <a:prstGeom prst="rect">
+            <a:avLst/>
+          </a:prstGeom>
+        </p:spPr>
+      </p:pic>
+      <p:pic>
+        <p:nvPicPr>
+          <p:cNvPr id="6" name="Imagem 5"/>
+          <p:cNvPicPr>
+            <a:picLocks noChangeAspect="1"/>
+          </p:cNvPicPr>
+          <p:nvPr/>
+        </p:nvPicPr>
+        <p:blipFill>
+          <a:blip r:embed="rId3"/>
+          <a:stretch>
+            <a:fillRect/>
+          </a:stretch>
+        </p:blipFill>
+        <p:spPr>
+          <a:xfrm>
+            <a:off x="9157648" y="4744658"/>
+            <a:ext cx="2673575" cy="1778972"/>
           </a:xfrm>
           <a:prstGeom prst="rect">
             <a:avLst/>
@@ -4608,20 +6739,13 @@
     </p:spTree>
     <p:extLst>
       <p:ext uri="{BB962C8B-B14F-4D97-AF65-F5344CB8AC3E}">
-        <p14:creationId xmlns:p14="http://schemas.microsoft.com/office/powerpoint/2010/main" val="880572389"/>
+        <p14:creationId xmlns:p14="http://schemas.microsoft.com/office/powerpoint/2010/main" val="3816641778"/>
       </p:ext>
     </p:extLst>
   </p:cSld>
   <p:clrMapOvr>
     <a:masterClrMapping/>
   </p:clrMapOvr>
-  <p:timing>
-    <p:tnLst>
-      <p:par>
-        <p:cTn id="1" dur="indefinite" restart="never" nodeType="tmRoot"/>
-      </p:par>
-    </p:tnLst>
-  </p:timing>
 </p:sld>
 </file>
 
@@ -4652,16 +6776,22 @@
             <p:ph type="title"/>
           </p:nvPr>
         </p:nvSpPr>
-        <p:spPr/>
-        <p:txBody>
-          <a:bodyPr/>
-          <a:lstStyle/>
-          <a:p>
-            <a:r>
-              <a:rPr lang="pt-BR" dirty="0" smtClean="0"/>
-              <a:t>Previsão de Fechamento das Ações do Google</a:t>
-            </a:r>
-            <a:endParaRPr lang="pt-BR" dirty="0"/>
+        <p:spPr>
+          <a:xfrm>
+            <a:off x="838200" y="365125"/>
+            <a:ext cx="10515600" cy="1218015"/>
+          </a:xfrm>
+        </p:spPr>
+        <p:txBody>
+          <a:bodyPr>
+            <a:normAutofit fontScale="90000"/>
+          </a:bodyPr>
+          <a:lstStyle/>
+          <a:p>
+            <a:r>
+              <a:rPr lang="pt-BR" dirty="0"/>
+              <a:t>Priorização na manutenção de estruturas de linhas de transmissão</a:t>
+            </a:r>
           </a:p>
         </p:txBody>
       </p:sp>
@@ -4681,8 +6811,8 @@
         </p:blipFill>
         <p:spPr>
           <a:xfrm>
-            <a:off x="487853" y="2346592"/>
-            <a:ext cx="11216293" cy="4090874"/>
+            <a:off x="971550" y="2150944"/>
+            <a:ext cx="10248900" cy="3238500"/>
           </a:xfrm>
           <a:prstGeom prst="rect">
             <a:avLst/>
@@ -4692,20 +6822,13 @@
     </p:spTree>
     <p:extLst>
       <p:ext uri="{BB962C8B-B14F-4D97-AF65-F5344CB8AC3E}">
-        <p14:creationId xmlns:p14="http://schemas.microsoft.com/office/powerpoint/2010/main" val="1529103570"/>
+        <p14:creationId xmlns:p14="http://schemas.microsoft.com/office/powerpoint/2010/main" val="1619046753"/>
       </p:ext>
     </p:extLst>
   </p:cSld>
   <p:clrMapOvr>
     <a:masterClrMapping/>
   </p:clrMapOvr>
-  <p:timing>
-    <p:tnLst>
-      <p:par>
-        <p:cTn id="1" dur="indefinite" restart="never" nodeType="tmRoot"/>
-      </p:par>
-    </p:tnLst>
-  </p:timing>
 </p:sld>
 </file>
 
@@ -4736,22 +6859,28 @@
             <p:ph type="title"/>
           </p:nvPr>
         </p:nvSpPr>
-        <p:spPr/>
-        <p:txBody>
-          <a:bodyPr/>
-          <a:lstStyle/>
-          <a:p>
-            <a:r>
-              <a:rPr lang="pt-BR" dirty="0" smtClean="0"/>
-              <a:t>Previsão de Fechamento das Ações do Google</a:t>
-            </a:r>
-            <a:endParaRPr lang="pt-BR" dirty="0"/>
+        <p:spPr>
+          <a:xfrm>
+            <a:off x="838200" y="365125"/>
+            <a:ext cx="10515600" cy="1218015"/>
+          </a:xfrm>
+        </p:spPr>
+        <p:txBody>
+          <a:bodyPr>
+            <a:normAutofit fontScale="90000"/>
+          </a:bodyPr>
+          <a:lstStyle/>
+          <a:p>
+            <a:r>
+              <a:rPr lang="pt-BR" dirty="0"/>
+              <a:t>Priorização na manutenção de estruturas de linhas de transmissão</a:t>
+            </a:r>
           </a:p>
         </p:txBody>
       </p:sp>
       <p:pic>
         <p:nvPicPr>
-          <p:cNvPr id="4" name="Imagem 3"/>
+          <p:cNvPr id="3" name="Imagem 2"/>
           <p:cNvPicPr>
             <a:picLocks noChangeAspect="1"/>
           </p:cNvPicPr>
@@ -4765,8 +6894,32 @@
         </p:blipFill>
         <p:spPr>
           <a:xfrm>
-            <a:off x="217026" y="2082190"/>
-            <a:ext cx="11757947" cy="3445238"/>
+            <a:off x="415120" y="1583140"/>
+            <a:ext cx="5838825" cy="3028950"/>
+          </a:xfrm>
+          <a:prstGeom prst="rect">
+            <a:avLst/>
+          </a:prstGeom>
+        </p:spPr>
+      </p:pic>
+      <p:pic>
+        <p:nvPicPr>
+          <p:cNvPr id="5" name="Imagem 4"/>
+          <p:cNvPicPr>
+            <a:picLocks noChangeAspect="1"/>
+          </p:cNvPicPr>
+          <p:nvPr/>
+        </p:nvPicPr>
+        <p:blipFill>
+          <a:blip r:embed="rId3"/>
+          <a:stretch>
+            <a:fillRect/>
+          </a:stretch>
+        </p:blipFill>
+        <p:spPr>
+          <a:xfrm>
+            <a:off x="619837" y="4483858"/>
+            <a:ext cx="10401300" cy="2135306"/>
           </a:xfrm>
           <a:prstGeom prst="rect">
             <a:avLst/>
@@ -4776,20 +6929,13 @@
     </p:spTree>
     <p:extLst>
       <p:ext uri="{BB962C8B-B14F-4D97-AF65-F5344CB8AC3E}">
-        <p14:creationId xmlns:p14="http://schemas.microsoft.com/office/powerpoint/2010/main" val="1082937483"/>
+        <p14:creationId xmlns:p14="http://schemas.microsoft.com/office/powerpoint/2010/main" val="4115965325"/>
       </p:ext>
     </p:extLst>
   </p:cSld>
   <p:clrMapOvr>
     <a:masterClrMapping/>
   </p:clrMapOvr>
-  <p:timing>
-    <p:tnLst>
-      <p:par>
-        <p:cTn id="1" dur="indefinite" restart="never" nodeType="tmRoot"/>
-      </p:par>
-    </p:tnLst>
-  </p:timing>
 </p:sld>
 </file>
 
@@ -5052,4 +7198,299 @@
     </a:ext>
   </a:extLst>
 </a:theme>
+</file>
+
+<file path=ppt/theme/theme2.xml><?xml version="1.0" encoding="utf-8"?>
+<a:theme xmlns:a="http://schemas.openxmlformats.org/drawingml/2006/main" name="Office Theme">
+  <a:themeElements>
+    <a:clrScheme name="Office">
+      <a:dk1>
+        <a:sysClr val="windowText" lastClr="000000"/>
+      </a:dk1>
+      <a:lt1>
+        <a:sysClr val="window" lastClr="FFFFFF"/>
+      </a:lt1>
+      <a:dk2>
+        <a:srgbClr val="44546A"/>
+      </a:dk2>
+      <a:lt2>
+        <a:srgbClr val="E7E6E6"/>
+      </a:lt2>
+      <a:accent1>
+        <a:srgbClr val="4472C4"/>
+      </a:accent1>
+      <a:accent2>
+        <a:srgbClr val="ED7D31"/>
+      </a:accent2>
+      <a:accent3>
+        <a:srgbClr val="A5A5A5"/>
+      </a:accent3>
+      <a:accent4>
+        <a:srgbClr val="FFC000"/>
+      </a:accent4>
+      <a:accent5>
+        <a:srgbClr val="5B9BD5"/>
+      </a:accent5>
+      <a:accent6>
+        <a:srgbClr val="70AD47"/>
+      </a:accent6>
+      <a:hlink>
+        <a:srgbClr val="0563C1"/>
+      </a:hlink>
+      <a:folHlink>
+        <a:srgbClr val="954F72"/>
+      </a:folHlink>
+    </a:clrScheme>
+    <a:fontScheme name="Office">
+      <a:majorFont>
+        <a:latin typeface="Calibri Light" panose="020F0302020204030204"/>
+        <a:ea typeface=""/>
+        <a:cs typeface=""/>
+        <a:font script="Jpan" typeface="游ゴシック Light"/>
+        <a:font script="Hang" typeface="맑은 고딕"/>
+        <a:font script="Hans" typeface="等线 Light"/>
+        <a:font script="Hant" typeface="新細明體"/>
+        <a:font script="Arab" typeface="Times New Roman"/>
+        <a:font script="Hebr" typeface="Times New Roman"/>
+        <a:font script="Thai" typeface="Angsana New"/>
+        <a:font script="Ethi" typeface="Nyala"/>
+        <a:font script="Beng" typeface="Vrinda"/>
+        <a:font script="Gujr" typeface="Shruti"/>
+        <a:font script="Khmr" typeface="MoolBoran"/>
+        <a:font script="Knda" typeface="Tunga"/>
+        <a:font script="Guru" typeface="Raavi"/>
+        <a:font script="Cans" typeface="Euphemia"/>
+        <a:font script="Cher" typeface="Plantagenet Cherokee"/>
+        <a:font script="Yiii" typeface="Microsoft Yi Baiti"/>
+        <a:font script="Tibt" typeface="Microsoft Himalaya"/>
+        <a:font script="Thaa" typeface="MV Boli"/>
+        <a:font script="Deva" typeface="Mangal"/>
+        <a:font script="Telu" typeface="Gautami"/>
+        <a:font script="Taml" typeface="Latha"/>
+        <a:font script="Syrc" typeface="Estrangelo Edessa"/>
+        <a:font script="Orya" typeface="Kalinga"/>
+        <a:font script="Mlym" typeface="Kartika"/>
+        <a:font script="Laoo" typeface="DokChampa"/>
+        <a:font script="Sinh" typeface="Iskoola Pota"/>
+        <a:font script="Mong" typeface="Mongolian Baiti"/>
+        <a:font script="Viet" typeface="Times New Roman"/>
+        <a:font script="Uigh" typeface="Microsoft Uighur"/>
+        <a:font script="Geor" typeface="Sylfaen"/>
+        <a:font script="Armn" typeface="Arial"/>
+        <a:font script="Bugi" typeface="Leelawadee UI"/>
+        <a:font script="Bopo" typeface="Microsoft JhengHei"/>
+        <a:font script="Java" typeface="Javanese Text"/>
+        <a:font script="Lisu" typeface="Segoe UI"/>
+        <a:font script="Mymr" typeface="Myanmar Text"/>
+        <a:font script="Nkoo" typeface="Ebrima"/>
+        <a:font script="Olck" typeface="Nirmala UI"/>
+        <a:font script="Osma" typeface="Ebrima"/>
+        <a:font script="Phag" typeface="Phagspa"/>
+        <a:font script="Syrn" typeface="Estrangelo Edessa"/>
+        <a:font script="Syrj" typeface="Estrangelo Edessa"/>
+        <a:font script="Syre" typeface="Estrangelo Edessa"/>
+        <a:font script="Sora" typeface="Nirmala UI"/>
+        <a:font script="Tale" typeface="Microsoft Tai Le"/>
+        <a:font script="Talu" typeface="Microsoft New Tai Lue"/>
+        <a:font script="Tfng" typeface="Ebrima"/>
+      </a:majorFont>
+      <a:minorFont>
+        <a:latin typeface="Calibri" panose="020F0502020204030204"/>
+        <a:ea typeface=""/>
+        <a:cs typeface=""/>
+        <a:font script="Jpan" typeface="游ゴシック"/>
+        <a:font script="Hang" typeface="맑은 고딕"/>
+        <a:font script="Hans" typeface="等线"/>
+        <a:font script="Hant" typeface="新細明體"/>
+        <a:font script="Arab" typeface="Arial"/>
+        <a:font script="Hebr" typeface="Arial"/>
+        <a:font script="Thai" typeface="Cordia New"/>
+        <a:font script="Ethi" typeface="Nyala"/>
+        <a:font script="Beng" typeface="Vrinda"/>
+        <a:font script="Gujr" typeface="Shruti"/>
+        <a:font script="Khmr" typeface="DaunPenh"/>
+        <a:font script="Knda" typeface="Tunga"/>
+        <a:font script="Guru" typeface="Raavi"/>
+        <a:font script="Cans" typeface="Euphemia"/>
+        <a:font script="Cher" typeface="Plantagenet Cherokee"/>
+        <a:font script="Yiii" typeface="Microsoft Yi Baiti"/>
+        <a:font script="Tibt" typeface="Microsoft Himalaya"/>
+        <a:font script="Thaa" typeface="MV Boli"/>
+        <a:font script="Deva" typeface="Mangal"/>
+        <a:font script="Telu" typeface="Gautami"/>
+        <a:font script="Taml" typeface="Latha"/>
+        <a:font script="Syrc" typeface="Estrangelo Edessa"/>
+        <a:font script="Orya" typeface="Kalinga"/>
+        <a:font script="Mlym" typeface="Kartika"/>
+        <a:font script="Laoo" typeface="DokChampa"/>
+        <a:font script="Sinh" typeface="Iskoola Pota"/>
+        <a:font script="Mong" typeface="Mongolian Baiti"/>
+        <a:font script="Viet" typeface="Arial"/>
+        <a:font script="Uigh" typeface="Microsoft Uighur"/>
+        <a:font script="Geor" typeface="Sylfaen"/>
+        <a:font script="Armn" typeface="Arial"/>
+        <a:font script="Bugi" typeface="Leelawadee UI"/>
+        <a:font script="Bopo" typeface="Microsoft JhengHei"/>
+        <a:font script="Java" typeface="Javanese Text"/>
+        <a:font script="Lisu" typeface="Segoe UI"/>
+        <a:font script="Mymr" typeface="Myanmar Text"/>
+        <a:font script="Nkoo" typeface="Ebrima"/>
+        <a:font script="Olck" typeface="Nirmala UI"/>
+        <a:font script="Osma" typeface="Ebrima"/>
+        <a:font script="Phag" typeface="Phagspa"/>
+        <a:font script="Syrn" typeface="Estrangelo Edessa"/>
+        <a:font script="Syrj" typeface="Estrangelo Edessa"/>
+        <a:font script="Syre" typeface="Estrangelo Edessa"/>
+        <a:font script="Sora" typeface="Nirmala UI"/>
+        <a:font script="Tale" typeface="Microsoft Tai Le"/>
+        <a:font script="Talu" typeface="Microsoft New Tai Lue"/>
+        <a:font script="Tfng" typeface="Ebrima"/>
+      </a:minorFont>
+    </a:fontScheme>
+    <a:fmtScheme name="Office">
+      <a:fillStyleLst>
+        <a:solidFill>
+          <a:schemeClr val="phClr"/>
+        </a:solidFill>
+        <a:gradFill rotWithShape="1">
+          <a:gsLst>
+            <a:gs pos="0">
+              <a:schemeClr val="phClr">
+                <a:lumMod val="110000"/>
+                <a:satMod val="105000"/>
+                <a:tint val="67000"/>
+              </a:schemeClr>
+            </a:gs>
+            <a:gs pos="50000">
+              <a:schemeClr val="phClr">
+                <a:lumMod val="105000"/>
+                <a:satMod val="103000"/>
+                <a:tint val="73000"/>
+              </a:schemeClr>
+            </a:gs>
+            <a:gs pos="100000">
+              <a:schemeClr val="phClr">
+                <a:lumMod val="105000"/>
+                <a:satMod val="109000"/>
+                <a:tint val="81000"/>
+              </a:schemeClr>
+            </a:gs>
+          </a:gsLst>
+          <a:lin ang="5400000" scaled="0"/>
+        </a:gradFill>
+        <a:gradFill rotWithShape="1">
+          <a:gsLst>
+            <a:gs pos="0">
+              <a:schemeClr val="phClr">
+                <a:satMod val="103000"/>
+                <a:lumMod val="102000"/>
+                <a:tint val="94000"/>
+              </a:schemeClr>
+            </a:gs>
+            <a:gs pos="50000">
+              <a:schemeClr val="phClr">
+                <a:satMod val="110000"/>
+                <a:lumMod val="100000"/>
+                <a:shade val="100000"/>
+              </a:schemeClr>
+            </a:gs>
+            <a:gs pos="100000">
+              <a:schemeClr val="phClr">
+                <a:lumMod val="99000"/>
+                <a:satMod val="120000"/>
+                <a:shade val="78000"/>
+              </a:schemeClr>
+            </a:gs>
+          </a:gsLst>
+          <a:lin ang="5400000" scaled="0"/>
+        </a:gradFill>
+      </a:fillStyleLst>
+      <a:lnStyleLst>
+        <a:ln w="6350" cap="flat" cmpd="sng" algn="ctr">
+          <a:solidFill>
+            <a:schemeClr val="phClr"/>
+          </a:solidFill>
+          <a:prstDash val="solid"/>
+          <a:miter lim="800000"/>
+        </a:ln>
+        <a:ln w="12700" cap="flat" cmpd="sng" algn="ctr">
+          <a:solidFill>
+            <a:schemeClr val="phClr"/>
+          </a:solidFill>
+          <a:prstDash val="solid"/>
+          <a:miter lim="800000"/>
+        </a:ln>
+        <a:ln w="19050" cap="flat" cmpd="sng" algn="ctr">
+          <a:solidFill>
+            <a:schemeClr val="phClr"/>
+          </a:solidFill>
+          <a:prstDash val="solid"/>
+          <a:miter lim="800000"/>
+        </a:ln>
+      </a:lnStyleLst>
+      <a:effectStyleLst>
+        <a:effectStyle>
+          <a:effectLst/>
+        </a:effectStyle>
+        <a:effectStyle>
+          <a:effectLst/>
+        </a:effectStyle>
+        <a:effectStyle>
+          <a:effectLst>
+            <a:outerShdw blurRad="57150" dist="19050" dir="5400000" algn="ctr" rotWithShape="0">
+              <a:srgbClr val="000000">
+                <a:alpha val="63000"/>
+              </a:srgbClr>
+            </a:outerShdw>
+          </a:effectLst>
+        </a:effectStyle>
+      </a:effectStyleLst>
+      <a:bgFillStyleLst>
+        <a:solidFill>
+          <a:schemeClr val="phClr"/>
+        </a:solidFill>
+        <a:solidFill>
+          <a:schemeClr val="phClr">
+            <a:tint val="95000"/>
+            <a:satMod val="170000"/>
+          </a:schemeClr>
+        </a:solidFill>
+        <a:gradFill rotWithShape="1">
+          <a:gsLst>
+            <a:gs pos="0">
+              <a:schemeClr val="phClr">
+                <a:tint val="93000"/>
+                <a:satMod val="150000"/>
+                <a:shade val="98000"/>
+                <a:lumMod val="102000"/>
+              </a:schemeClr>
+            </a:gs>
+            <a:gs pos="50000">
+              <a:schemeClr val="phClr">
+                <a:tint val="98000"/>
+                <a:satMod val="130000"/>
+                <a:shade val="90000"/>
+                <a:lumMod val="103000"/>
+              </a:schemeClr>
+            </a:gs>
+            <a:gs pos="100000">
+              <a:schemeClr val="phClr">
+                <a:shade val="63000"/>
+                <a:satMod val="120000"/>
+              </a:schemeClr>
+            </a:gs>
+          </a:gsLst>
+          <a:lin ang="5400000" scaled="0"/>
+        </a:gradFill>
+      </a:bgFillStyleLst>
+    </a:fmtScheme>
+  </a:themeElements>
+  <a:objectDefaults/>
+  <a:extraClrSchemeLst/>
+  <a:extLst>
+    <a:ext uri="{05A4C25C-085E-4340-85A3-A5531E510DB2}">
+      <thm15:themeFamily xmlns:thm15="http://schemas.microsoft.com/office/thememl/2012/main" name="Office Theme" id="{62F939B6-93AF-4DB8-9C6B-D6C7DFDC589F}" vid="{4A3C46E8-61CC-4603-A589-7422A47A8E4A}"/>
+    </a:ext>
+  </a:extLst>
+</a:theme>
 </file>
</xml_diff>

<commit_message>
Ajuste na url do repositorio
</commit_message>
<xml_diff>
--- a/apresentacao.pptx
+++ b/apresentacao.pptx
@@ -139,10 +139,6 @@
 </p:presentation>
 </file>
 
-<file path=ppt/revisionInfo.xml><?xml version="1.0" encoding="utf-8"?>
-<p1510:revInfo xmlns:a="http://schemas.openxmlformats.org/drawingml/2006/main" xmlns:r="http://schemas.openxmlformats.org/officeDocument/2006/relationships" xmlns:p1510="http://schemas.microsoft.com/office/powerpoint/2015/10/main"/>
-</file>
-
 <file path=ppt/notesMasters/notesMaster1.xml><?xml version="1.0" encoding="utf-8"?>
 <p:notesMaster xmlns:a="http://schemas.openxmlformats.org/drawingml/2006/main" xmlns:r="http://schemas.openxmlformats.org/officeDocument/2006/relationships" xmlns:p="http://schemas.openxmlformats.org/presentationml/2006/main">
   <p:cSld>
@@ -384,7 +380,7 @@
           <a:p>
             <a:fld id="{53464B15-064D-4369-BCA4-E8218B20B9AB}" type="slidenum">
               <a:rPr lang="pt-BR" smtClean="0"/>
-              <a:t>‹#›</a:t>
+              <a:t>‹nº›</a:t>
             </a:fld>
             <a:endParaRPr lang="pt-BR"/>
           </a:p>
@@ -748,7 +744,7 @@
           <a:p>
             <a:fld id="{1D74CD81-846E-42DB-BD4B-54247C8E2E62}" type="slidenum">
               <a:rPr lang="pt-BR" smtClean="0"/>
-              <a:t>‹#›</a:t>
+              <a:t>‹nº›</a:t>
             </a:fld>
             <a:endParaRPr lang="pt-BR"/>
           </a:p>
@@ -916,7 +912,7 @@
           <a:p>
             <a:fld id="{1D74CD81-846E-42DB-BD4B-54247C8E2E62}" type="slidenum">
               <a:rPr lang="pt-BR" smtClean="0"/>
-              <a:t>‹#›</a:t>
+              <a:t>‹nº›</a:t>
             </a:fld>
             <a:endParaRPr lang="pt-BR"/>
           </a:p>
@@ -1094,7 +1090,7 @@
           <a:p>
             <a:fld id="{1D74CD81-846E-42DB-BD4B-54247C8E2E62}" type="slidenum">
               <a:rPr lang="pt-BR" smtClean="0"/>
-              <a:t>‹#›</a:t>
+              <a:t>‹nº›</a:t>
             </a:fld>
             <a:endParaRPr lang="pt-BR"/>
           </a:p>
@@ -1262,7 +1258,7 @@
           <a:p>
             <a:fld id="{1D74CD81-846E-42DB-BD4B-54247C8E2E62}" type="slidenum">
               <a:rPr lang="pt-BR" smtClean="0"/>
-              <a:t>‹#›</a:t>
+              <a:t>‹nº›</a:t>
             </a:fld>
             <a:endParaRPr lang="pt-BR"/>
           </a:p>
@@ -1507,7 +1503,7 @@
           <a:p>
             <a:fld id="{1D74CD81-846E-42DB-BD4B-54247C8E2E62}" type="slidenum">
               <a:rPr lang="pt-BR" smtClean="0"/>
-              <a:t>‹#›</a:t>
+              <a:t>‹nº›</a:t>
             </a:fld>
             <a:endParaRPr lang="pt-BR"/>
           </a:p>
@@ -1736,7 +1732,7 @@
           <a:p>
             <a:fld id="{1D74CD81-846E-42DB-BD4B-54247C8E2E62}" type="slidenum">
               <a:rPr lang="pt-BR" smtClean="0"/>
-              <a:t>‹#›</a:t>
+              <a:t>‹nº›</a:t>
             </a:fld>
             <a:endParaRPr lang="pt-BR"/>
           </a:p>
@@ -2100,7 +2096,7 @@
           <a:p>
             <a:fld id="{1D74CD81-846E-42DB-BD4B-54247C8E2E62}" type="slidenum">
               <a:rPr lang="pt-BR" smtClean="0"/>
-              <a:t>‹#›</a:t>
+              <a:t>‹nº›</a:t>
             </a:fld>
             <a:endParaRPr lang="pt-BR"/>
           </a:p>
@@ -2217,7 +2213,7 @@
           <a:p>
             <a:fld id="{1D74CD81-846E-42DB-BD4B-54247C8E2E62}" type="slidenum">
               <a:rPr lang="pt-BR" smtClean="0"/>
-              <a:t>‹#›</a:t>
+              <a:t>‹nº›</a:t>
             </a:fld>
             <a:endParaRPr lang="pt-BR"/>
           </a:p>
@@ -2312,7 +2308,7 @@
           <a:p>
             <a:fld id="{1D74CD81-846E-42DB-BD4B-54247C8E2E62}" type="slidenum">
               <a:rPr lang="pt-BR" smtClean="0"/>
-              <a:t>‹#›</a:t>
+              <a:t>‹nº›</a:t>
             </a:fld>
             <a:endParaRPr lang="pt-BR"/>
           </a:p>
@@ -2587,7 +2583,7 @@
           <a:p>
             <a:fld id="{1D74CD81-846E-42DB-BD4B-54247C8E2E62}" type="slidenum">
               <a:rPr lang="pt-BR" smtClean="0"/>
-              <a:t>‹#›</a:t>
+              <a:t>‹nº›</a:t>
             </a:fld>
             <a:endParaRPr lang="pt-BR"/>
           </a:p>
@@ -2839,7 +2835,7 @@
           <a:p>
             <a:fld id="{1D74CD81-846E-42DB-BD4B-54247C8E2E62}" type="slidenum">
               <a:rPr lang="pt-BR" smtClean="0"/>
-              <a:t>‹#›</a:t>
+              <a:t>‹nº›</a:t>
             </a:fld>
             <a:endParaRPr lang="pt-BR"/>
           </a:p>
@@ -3086,7 +3082,7 @@
           <a:p>
             <a:fld id="{1D74CD81-846E-42DB-BD4B-54247C8E2E62}" type="slidenum">
               <a:rPr lang="pt-BR" smtClean="0"/>
-              <a:t>‹#›</a:t>
+              <a:t>‹nº›</a:t>
             </a:fld>
             <a:endParaRPr lang="pt-BR"/>
           </a:p>
@@ -5035,8 +5031,8 @@
         </p:nvSpPr>
         <p:spPr>
           <a:xfrm>
-            <a:off x="5106534" y="6378719"/>
-            <a:ext cx="7085466" cy="646331"/>
+            <a:off x="1868047" y="5524721"/>
+            <a:ext cx="6911123" cy="1569660"/>
           </a:xfrm>
           <a:prstGeom prst="rect">
             <a:avLst/>
@@ -5049,20 +5045,41 @@
           </a:bodyPr>
           <a:lstStyle/>
           <a:p>
-            <a:r>
-              <a:rPr lang="pt-BR" dirty="0"/>
+            <a:pPr algn="ctr"/>
+            <a:r>
+              <a:rPr lang="pt-BR" sz="2400" dirty="0"/>
               <a:t>Repositório github: </a:t>
             </a:r>
             <a:r>
-              <a:rPr lang="pt-BR" dirty="0">
+              <a:rPr lang="pt-BR" sz="2400" dirty="0">
                 <a:hlinkClick r:id="rId2"/>
               </a:rPr>
+              <a:t>https://bit.ly/2KCQK4V</a:t>
+            </a:r>
+            <a:r>
+              <a:rPr lang="pt-BR" sz="2400" dirty="0"/>
+              <a:t> </a:t>
+            </a:r>
+          </a:p>
+          <a:p>
+            <a:pPr algn="ctr"/>
+            <a:endParaRPr lang="pt-BR" sz="2400" dirty="0">
+              <a:hlinkClick r:id="rId3"/>
+            </a:endParaRPr>
+          </a:p>
+          <a:p>
+            <a:pPr algn="ctr"/>
+            <a:r>
+              <a:rPr lang="pt-BR" sz="2400" dirty="0">
+                <a:hlinkClick r:id="rId3"/>
+              </a:rPr>
               <a:t>https://github.com/macio-matheus/spark_ml_project</a:t>
             </a:r>
-            <a:endParaRPr lang="pt-BR" dirty="0"/>
-          </a:p>
-          <a:p>
-            <a:endParaRPr lang="pt-BR" dirty="0"/>
+            <a:endParaRPr lang="pt-BR" sz="2400" dirty="0"/>
+          </a:p>
+          <a:p>
+            <a:pPr algn="ctr"/>
+            <a:endParaRPr lang="pt-BR" sz="2400" dirty="0"/>
           </a:p>
         </p:txBody>
       </p:sp>

</xml_diff>